<commit_message>
* LTG L00 -> lecture schedule update * ETCE L01 -> minor fixes
</commit_message>
<xml_diff>
--- a/The-Limits-to-Growth/LTG-L00-Organization.pptx
+++ b/The-Limits-to-Growth/LTG-L00-Organization.pptx
@@ -257,7 +257,7 @@
           </a:bodyPr>
           <a:p>
             <a:pPr algn="r"/>
-            <a:fld id="{E25B9D58-8740-49EC-A6AF-C889D48215CB}" type="slidenum">
+            <a:fld id="{40A5E58D-9C78-453D-91FB-9E0E46DEAC5A}" type="slidenum">
               <a:rPr b="0" lang="en-US" sz="1400" spc="-1" strike="noStrike">
                 <a:latin typeface="Times New Roman"/>
               </a:rPr>
@@ -305,7 +305,7 @@
         <p:spPr>
           <a:xfrm>
             <a:off x="533520" y="763560"/>
-            <a:ext cx="6696000" cy="3764160"/>
+            <a:ext cx="6695640" cy="3763800"/>
           </a:xfrm>
           <a:prstGeom prst="rect">
             <a:avLst/>
@@ -325,7 +325,7 @@
         <p:spPr>
           <a:xfrm>
             <a:off x="777240" y="4777560"/>
-            <a:ext cx="6209640" cy="4518000"/>
+            <a:ext cx="6209280" cy="4517640"/>
           </a:xfrm>
           <a:prstGeom prst="rect">
             <a:avLst/>
@@ -351,7 +351,7 @@
         <p:spPr>
           <a:xfrm>
             <a:off x="4399200" y="9555480"/>
-            <a:ext cx="3364920" cy="494640"/>
+            <a:ext cx="3364560" cy="494280"/>
           </a:xfrm>
           <a:prstGeom prst="rect">
             <a:avLst/>
@@ -377,7 +377,7 @@
                 <a:spcPct val="100000"/>
               </a:lnSpc>
             </a:pPr>
-            <a:fld id="{3472A030-CB76-4553-ABEA-82788A0AC85F}" type="slidenum">
+            <a:fld id="{3679EC8B-6A9C-430F-B5DF-7817855B1B7B}" type="slidenum">
               <a:rPr b="0" lang="de-DE" sz="1800" spc="-1" strike="noStrike">
                 <a:solidFill>
                   <a:srgbClr val="000000"/>
@@ -385,7 +385,7 @@
                 <a:latin typeface="+mn-lt"/>
                 <a:ea typeface="+mn-ea"/>
               </a:rPr>
-              <a:t>&lt;number&gt;</a:t>
+              <a:t>8</a:t>
             </a:fld>
             <a:endParaRPr b="0" lang="en-US" sz="1800" spc="-1" strike="noStrike">
               <a:latin typeface="Arial"/>
@@ -428,7 +428,7 @@
         <p:spPr>
           <a:xfrm>
             <a:off x="533520" y="763560"/>
-            <a:ext cx="6696000" cy="3764160"/>
+            <a:ext cx="6695640" cy="3763800"/>
           </a:xfrm>
           <a:prstGeom prst="rect">
             <a:avLst/>
@@ -448,7 +448,7 @@
         <p:spPr>
           <a:xfrm>
             <a:off x="777240" y="4777560"/>
-            <a:ext cx="6209640" cy="4518000"/>
+            <a:ext cx="6209280" cy="4517640"/>
           </a:xfrm>
           <a:prstGeom prst="rect">
             <a:avLst/>
@@ -474,7 +474,7 @@
         <p:spPr>
           <a:xfrm>
             <a:off x="4399200" y="9555480"/>
-            <a:ext cx="3364920" cy="494640"/>
+            <a:ext cx="3364560" cy="494280"/>
           </a:xfrm>
           <a:prstGeom prst="rect">
             <a:avLst/>
@@ -500,7 +500,7 @@
                 <a:spcPct val="100000"/>
               </a:lnSpc>
             </a:pPr>
-            <a:fld id="{D67D254A-CCAA-44E7-BD29-C5C3C8A649B8}" type="slidenum">
+            <a:fld id="{43614119-A1EE-4C9D-A613-066869C54B6A}" type="slidenum">
               <a:rPr b="0" lang="de-DE" sz="1800" spc="-1" strike="noStrike">
                 <a:solidFill>
                   <a:srgbClr val="000000"/>
@@ -508,7 +508,7 @@
                 <a:latin typeface="+mn-lt"/>
                 <a:ea typeface="+mn-ea"/>
               </a:rPr>
-              <a:t>&lt;number&gt;</a:t>
+              <a:t>8</a:t>
             </a:fld>
             <a:endParaRPr b="0" lang="en-US" sz="1800" spc="-1" strike="noStrike">
               <a:latin typeface="Arial"/>
@@ -551,7 +551,7 @@
         <p:spPr>
           <a:xfrm>
             <a:off x="533520" y="763560"/>
-            <a:ext cx="6696000" cy="3764160"/>
+            <a:ext cx="6695640" cy="3763800"/>
           </a:xfrm>
           <a:prstGeom prst="rect">
             <a:avLst/>
@@ -571,7 +571,7 @@
         <p:spPr>
           <a:xfrm>
             <a:off x="777240" y="4777560"/>
-            <a:ext cx="6209640" cy="4518000"/>
+            <a:ext cx="6209280" cy="4517640"/>
           </a:xfrm>
           <a:prstGeom prst="rect">
             <a:avLst/>
@@ -597,7 +597,7 @@
         <p:spPr>
           <a:xfrm>
             <a:off x="4399200" y="9555480"/>
-            <a:ext cx="3364920" cy="494640"/>
+            <a:ext cx="3364560" cy="494280"/>
           </a:xfrm>
           <a:prstGeom prst="rect">
             <a:avLst/>
@@ -623,7 +623,7 @@
                 <a:spcPct val="100000"/>
               </a:lnSpc>
             </a:pPr>
-            <a:fld id="{27448FF1-5B33-4279-B128-C0A6D4024580}" type="slidenum">
+            <a:fld id="{7E1124FD-999C-48F9-818B-DC5913D536A9}" type="slidenum">
               <a:rPr b="0" lang="de-DE" sz="1800" spc="-1" strike="noStrike">
                 <a:solidFill>
                   <a:srgbClr val="000000"/>
@@ -631,7 +631,7 @@
                 <a:latin typeface="+mn-lt"/>
                 <a:ea typeface="+mn-ea"/>
               </a:rPr>
-              <a:t>&lt;number&gt;</a:t>
+              <a:t>8</a:t>
             </a:fld>
             <a:endParaRPr b="0" lang="en-US" sz="1800" spc="-1" strike="noStrike">
               <a:latin typeface="Arial"/>
@@ -674,7 +674,7 @@
         <p:spPr>
           <a:xfrm>
             <a:off x="533520" y="763560"/>
-            <a:ext cx="6696000" cy="3764160"/>
+            <a:ext cx="6695640" cy="3763800"/>
           </a:xfrm>
           <a:prstGeom prst="rect">
             <a:avLst/>
@@ -694,7 +694,7 @@
         <p:spPr>
           <a:xfrm>
             <a:off x="777240" y="4777560"/>
-            <a:ext cx="6209640" cy="4518000"/>
+            <a:ext cx="6209280" cy="4517640"/>
           </a:xfrm>
           <a:prstGeom prst="rect">
             <a:avLst/>
@@ -720,7 +720,7 @@
         <p:spPr>
           <a:xfrm>
             <a:off x="4399200" y="9555480"/>
-            <a:ext cx="3364920" cy="494640"/>
+            <a:ext cx="3364560" cy="494280"/>
           </a:xfrm>
           <a:prstGeom prst="rect">
             <a:avLst/>
@@ -746,7 +746,7 @@
                 <a:spcPct val="100000"/>
               </a:lnSpc>
             </a:pPr>
-            <a:fld id="{A510BB61-764D-4D83-98D6-68403F380302}" type="slidenum">
+            <a:fld id="{9CFE7457-0593-4840-8895-4FC80073C5FA}" type="slidenum">
               <a:rPr b="0" lang="de-DE" sz="1800" spc="-1" strike="noStrike">
                 <a:solidFill>
                   <a:srgbClr val="000000"/>
@@ -797,7 +797,7 @@
         <p:spPr>
           <a:xfrm>
             <a:off x="533520" y="763560"/>
-            <a:ext cx="6696000" cy="3764160"/>
+            <a:ext cx="6695640" cy="3763800"/>
           </a:xfrm>
           <a:prstGeom prst="rect">
             <a:avLst/>
@@ -817,7 +817,7 @@
         <p:spPr>
           <a:xfrm>
             <a:off x="777240" y="4777560"/>
-            <a:ext cx="6209640" cy="4518000"/>
+            <a:ext cx="6209280" cy="4517640"/>
           </a:xfrm>
           <a:prstGeom prst="rect">
             <a:avLst/>
@@ -843,7 +843,7 @@
         <p:spPr>
           <a:xfrm>
             <a:off x="4399200" y="9555480"/>
-            <a:ext cx="3364920" cy="494640"/>
+            <a:ext cx="3364560" cy="494280"/>
           </a:xfrm>
           <a:prstGeom prst="rect">
             <a:avLst/>
@@ -869,7 +869,7 @@
                 <a:spcPct val="100000"/>
               </a:lnSpc>
             </a:pPr>
-            <a:fld id="{334F6CB8-87AE-4155-9FBA-5800EA5FA0F6}" type="slidenum">
+            <a:fld id="{FE656139-ED73-43A6-AA0A-B939A8B66CEC}" type="slidenum">
               <a:rPr b="0" lang="de-DE" sz="1800" spc="-1" strike="noStrike">
                 <a:solidFill>
                   <a:srgbClr val="000000"/>
@@ -3635,7 +3635,7 @@
         <p:spPr>
           <a:xfrm>
             <a:off x="11444760" y="0"/>
-            <a:ext cx="743040" cy="6851880"/>
+            <a:ext cx="742680" cy="6851520"/>
           </a:xfrm>
           <a:prstGeom prst="rect">
             <a:avLst/>
@@ -3665,7 +3665,7 @@
         <p:spPr>
           <a:xfrm>
             <a:off x="11438640" y="6453360"/>
-            <a:ext cx="759960" cy="363960"/>
+            <a:ext cx="759600" cy="363960"/>
           </a:xfrm>
           <a:prstGeom prst="rect">
             <a:avLst/>
@@ -3691,7 +3691,7 @@
                 <a:spcPct val="100000"/>
               </a:lnSpc>
             </a:pPr>
-            <a:fld id="{A3AD593F-3A67-4788-AE6C-3231FFBDA1C7}" type="slidenum">
+            <a:fld id="{E294221B-D5B9-41FE-82E9-9B413819E5EC}" type="slidenum">
               <a:rPr b="0" lang="en-US" sz="1800" spc="-1" strike="noStrike">
                 <a:solidFill>
                   <a:srgbClr val="808080"/>
@@ -3716,7 +3716,7 @@
         <p:spPr>
           <a:xfrm>
             <a:off x="912240" y="1268280"/>
-            <a:ext cx="9209880" cy="363240"/>
+            <a:ext cx="9209520" cy="362880"/>
           </a:xfrm>
           <a:prstGeom prst="rect">
             <a:avLst/>
@@ -3746,7 +3746,7 @@
         <p:spPr>
           <a:xfrm>
             <a:off x="0" y="0"/>
-            <a:ext cx="3053880" cy="563760"/>
+            <a:ext cx="3053520" cy="563400"/>
           </a:xfrm>
           <a:prstGeom prst="rect">
             <a:avLst/>
@@ -3769,7 +3769,7 @@
         <p:spPr>
           <a:xfrm>
             <a:off x="7430400" y="134640"/>
-            <a:ext cx="3699720" cy="515880"/>
+            <a:ext cx="3699360" cy="515520"/>
           </a:xfrm>
           <a:prstGeom prst="rect">
             <a:avLst/>
@@ -3788,7 +3788,7 @@
         <p:spPr>
           <a:xfrm>
             <a:off x="912240" y="1268280"/>
-            <a:ext cx="9209880" cy="363240"/>
+            <a:ext cx="9209520" cy="362880"/>
           </a:xfrm>
           <a:prstGeom prst="rect">
             <a:avLst/>
@@ -3814,7 +3814,7 @@
         <p:spPr>
           <a:xfrm>
             <a:off x="11444760" y="0"/>
-            <a:ext cx="743040" cy="6851880"/>
+            <a:ext cx="742680" cy="6851520"/>
           </a:xfrm>
           <a:prstGeom prst="rect">
             <a:avLst/>
@@ -3844,7 +3844,7 @@
         <p:spPr>
           <a:xfrm>
             <a:off x="0" y="6642720"/>
-            <a:ext cx="12186000" cy="211320"/>
+            <a:ext cx="12185640" cy="211320"/>
           </a:xfrm>
           <a:prstGeom prst="rect">
             <a:avLst/>
@@ -4155,7 +4155,7 @@
         <p:spPr>
           <a:xfrm>
             <a:off x="11444760" y="0"/>
-            <a:ext cx="743040" cy="6851880"/>
+            <a:ext cx="742680" cy="6851520"/>
           </a:xfrm>
           <a:prstGeom prst="rect">
             <a:avLst/>
@@ -4185,7 +4185,7 @@
         <p:spPr>
           <a:xfrm>
             <a:off x="11438640" y="6453360"/>
-            <a:ext cx="759960" cy="363960"/>
+            <a:ext cx="759600" cy="363960"/>
           </a:xfrm>
           <a:prstGeom prst="rect">
             <a:avLst/>
@@ -4211,7 +4211,7 @@
                 <a:spcPct val="100000"/>
               </a:lnSpc>
             </a:pPr>
-            <a:fld id="{2ACA6D53-ACF6-4188-9512-812B024F0DE8}" type="slidenum">
+            <a:fld id="{DF6128A4-B24E-462B-8EE6-7624DA0DD893}" type="slidenum">
               <a:rPr b="0" lang="en-US" sz="1800" spc="-1" strike="noStrike">
                 <a:solidFill>
                   <a:srgbClr val="808080"/>
@@ -4236,7 +4236,7 @@
         <p:spPr>
           <a:xfrm>
             <a:off x="912240" y="1268280"/>
-            <a:ext cx="9209880" cy="363240"/>
+            <a:ext cx="9209520" cy="362880"/>
           </a:xfrm>
           <a:prstGeom prst="rect">
             <a:avLst/>
@@ -4266,7 +4266,7 @@
         <p:spPr>
           <a:xfrm>
             <a:off x="0" y="0"/>
-            <a:ext cx="3053880" cy="563760"/>
+            <a:ext cx="3053520" cy="563400"/>
           </a:xfrm>
           <a:prstGeom prst="rect">
             <a:avLst/>
@@ -4289,7 +4289,7 @@
         <p:spPr>
           <a:xfrm>
             <a:off x="7430400" y="134640"/>
-            <a:ext cx="3699720" cy="515880"/>
+            <a:ext cx="3699360" cy="515520"/>
           </a:xfrm>
           <a:prstGeom prst="rect">
             <a:avLst/>
@@ -4308,7 +4308,7 @@
         <p:spPr>
           <a:xfrm>
             <a:off x="11444760" y="0"/>
-            <a:ext cx="743040" cy="6851880"/>
+            <a:ext cx="742680" cy="6851520"/>
           </a:xfrm>
           <a:prstGeom prst="rect">
             <a:avLst/>
@@ -4338,7 +4338,7 @@
         <p:spPr>
           <a:xfrm>
             <a:off x="11438640" y="6453360"/>
-            <a:ext cx="759960" cy="363960"/>
+            <a:ext cx="759600" cy="363960"/>
           </a:xfrm>
           <a:prstGeom prst="rect">
             <a:avLst/>
@@ -4364,7 +4364,7 @@
                 <a:spcPct val="100000"/>
               </a:lnSpc>
             </a:pPr>
-            <a:fld id="{718B3E1D-0A4B-411F-8166-728B8A00EFC8}" type="slidenum">
+            <a:fld id="{C0BE9AD6-F7BA-4870-8910-8EB1C416D8AC}" type="slidenum">
               <a:rPr b="0" lang="en-US" sz="1800" spc="-1" strike="noStrike">
                 <a:solidFill>
                   <a:srgbClr val="808080"/>
@@ -4389,7 +4389,7 @@
         <p:spPr>
           <a:xfrm>
             <a:off x="0" y="6642720"/>
-            <a:ext cx="12186000" cy="211320"/>
+            <a:ext cx="12185640" cy="211320"/>
           </a:xfrm>
           <a:prstGeom prst="rect">
             <a:avLst/>
@@ -4693,7 +4693,7 @@
         <p:spPr>
           <a:xfrm>
             <a:off x="527400" y="1412640"/>
-            <a:ext cx="10362960" cy="1149480"/>
+            <a:ext cx="10362600" cy="1149120"/>
           </a:xfrm>
           <a:prstGeom prst="rect">
             <a:avLst/>
@@ -4744,7 +4744,7 @@
         <p:spPr>
           <a:xfrm>
             <a:off x="527400" y="2852640"/>
-            <a:ext cx="10362960" cy="2370240"/>
+            <a:ext cx="10362600" cy="2369880"/>
           </a:xfrm>
           <a:prstGeom prst="rect">
             <a:avLst/>
@@ -4941,7 +4941,7 @@
         <p:spPr>
           <a:xfrm>
             <a:off x="335520" y="764640"/>
-            <a:ext cx="10747080" cy="497880"/>
+            <a:ext cx="10746720" cy="497520"/>
           </a:xfrm>
           <a:prstGeom prst="rect">
             <a:avLst/>
@@ -4992,7 +4992,7 @@
         <p:spPr>
           <a:xfrm>
             <a:off x="335520" y="1268280"/>
-            <a:ext cx="10747080" cy="5034600"/>
+            <a:ext cx="10746720" cy="5034240"/>
           </a:xfrm>
           <a:prstGeom prst="rect">
             <a:avLst/>
@@ -5013,7 +5013,7 @@
             <a:noAutofit/>
           </a:bodyPr>
           <a:p>
-            <a:pPr marL="195120" indent="-189720">
+            <a:pPr marL="195120" indent="-189360">
               <a:lnSpc>
                 <a:spcPct val="100000"/>
               </a:lnSpc>
@@ -5077,7 +5077,7 @@
             </a:endParaRPr>
           </a:p>
           <a:p>
-            <a:pPr marL="195120" indent="-189720">
+            <a:pPr marL="195120" indent="-189360">
               <a:lnSpc>
                 <a:spcPct val="100000"/>
               </a:lnSpc>
@@ -5106,7 +5106,7 @@
             </a:endParaRPr>
           </a:p>
           <a:p>
-            <a:pPr lvl="1" marL="432000" indent="-212400">
+            <a:pPr lvl="1" marL="432000" indent="-212040">
               <a:lnSpc>
                 <a:spcPct val="100000"/>
               </a:lnSpc>
@@ -5157,7 +5157,7 @@
             </a:endParaRPr>
           </a:p>
           <a:p>
-            <a:pPr lvl="1" marL="432000" indent="-212400">
+            <a:pPr lvl="1" marL="432000" indent="-212040">
               <a:lnSpc>
                 <a:spcPct val="100000"/>
               </a:lnSpc>
@@ -5221,7 +5221,7 @@
             </a:endParaRPr>
           </a:p>
           <a:p>
-            <a:pPr marL="195120" indent="-189720">
+            <a:pPr marL="195120" indent="-189360">
               <a:lnSpc>
                 <a:spcPct val="100000"/>
               </a:lnSpc>
@@ -5294,7 +5294,7 @@
             </a:endParaRPr>
           </a:p>
           <a:p>
-            <a:pPr lvl="1" marL="744120" indent="-281520">
+            <a:pPr lvl="1" marL="744120" indent="-281160">
               <a:lnSpc>
                 <a:spcPct val="100000"/>
               </a:lnSpc>
@@ -5336,7 +5336,7 @@
             </a:endParaRPr>
           </a:p>
           <a:p>
-            <a:pPr marL="195120" indent="-189720">
+            <a:pPr marL="195120" indent="-189360">
               <a:lnSpc>
                 <a:spcPct val="100000"/>
               </a:lnSpc>
@@ -5378,7 +5378,7 @@
             </a:endParaRPr>
           </a:p>
           <a:p>
-            <a:pPr marL="195120" indent="-189720" algn="ctr">
+            <a:pPr marL="195120" indent="-189360" algn="ctr">
               <a:lnSpc>
                 <a:spcPct val="100000"/>
               </a:lnSpc>
@@ -5500,7 +5500,7 @@
         <p:spPr>
           <a:xfrm>
             <a:off x="335520" y="764640"/>
-            <a:ext cx="10747080" cy="497880"/>
+            <a:ext cx="10746720" cy="497520"/>
           </a:xfrm>
           <a:prstGeom prst="rect">
             <a:avLst/>
@@ -5571,7 +5571,7 @@
         <p:spPr>
           <a:xfrm>
             <a:off x="335520" y="1268640"/>
-            <a:ext cx="10747080" cy="5034600"/>
+            <a:ext cx="10746720" cy="5034240"/>
           </a:xfrm>
           <a:prstGeom prst="rect">
             <a:avLst/>
@@ -5592,7 +5592,7 @@
             <a:noAutofit/>
           </a:bodyPr>
           <a:p>
-            <a:pPr marL="195120" indent="-189720">
+            <a:pPr marL="195120" indent="-189360">
               <a:lnSpc>
                 <a:spcPct val="100000"/>
               </a:lnSpc>
@@ -5632,7 +5632,7 @@
             </a:endParaRPr>
           </a:p>
           <a:p>
-            <a:pPr lvl="1" marL="432000" indent="-212400">
+            <a:pPr lvl="1" marL="432000" indent="-212040">
               <a:lnSpc>
                 <a:spcPct val="100000"/>
               </a:lnSpc>
@@ -5681,7 +5681,7 @@
             </a:endParaRPr>
           </a:p>
           <a:p>
-            <a:pPr lvl="1" marL="432000" indent="-212400">
+            <a:pPr lvl="1" marL="432000" indent="-212040">
               <a:lnSpc>
                 <a:spcPct val="100000"/>
               </a:lnSpc>
@@ -5723,7 +5723,7 @@
             </a:endParaRPr>
           </a:p>
           <a:p>
-            <a:pPr marL="195120" indent="-189720">
+            <a:pPr marL="195120" indent="-189360">
               <a:lnSpc>
                 <a:spcPct val="100000"/>
               </a:lnSpc>
@@ -5753,7 +5753,7 @@
             </a:endParaRPr>
           </a:p>
           <a:p>
-            <a:pPr lvl="1" marL="432000" indent="-212400">
+            <a:pPr lvl="1" marL="432000" indent="-212040">
               <a:lnSpc>
                 <a:spcPct val="100000"/>
               </a:lnSpc>
@@ -5842,7 +5842,7 @@
             </a:endParaRPr>
           </a:p>
           <a:p>
-            <a:pPr lvl="1" marL="432000" indent="-212400">
+            <a:pPr lvl="1" marL="432000" indent="-212040">
               <a:lnSpc>
                 <a:spcPct val="100000"/>
               </a:lnSpc>
@@ -5893,7 +5893,7 @@
             </a:endParaRPr>
           </a:p>
           <a:p>
-            <a:pPr marL="195120" indent="-189720">
+            <a:pPr marL="195120" indent="-189360">
               <a:lnSpc>
                 <a:spcPct val="100000"/>
               </a:lnSpc>
@@ -5923,7 +5923,7 @@
             </a:endParaRPr>
           </a:p>
           <a:p>
-            <a:pPr lvl="1" marL="432000" indent="-212400">
+            <a:pPr lvl="1" marL="432000" indent="-212040">
               <a:lnSpc>
                 <a:spcPct val="100000"/>
               </a:lnSpc>
@@ -6032,7 +6032,7 @@
             </a:endParaRPr>
           </a:p>
           <a:p>
-            <a:pPr lvl="1" marL="432000" indent="-212400">
+            <a:pPr lvl="1" marL="432000" indent="-212040">
               <a:lnSpc>
                 <a:spcPct val="100000"/>
               </a:lnSpc>
@@ -6123,7 +6123,7 @@
         <p:spPr>
           <a:xfrm>
             <a:off x="335520" y="764640"/>
-            <a:ext cx="10747080" cy="497880"/>
+            <a:ext cx="10746720" cy="497520"/>
           </a:xfrm>
           <a:prstGeom prst="rect">
             <a:avLst/>
@@ -6174,7 +6174,7 @@
         <p:spPr>
           <a:xfrm>
             <a:off x="335520" y="1268280"/>
-            <a:ext cx="10747080" cy="5034600"/>
+            <a:ext cx="10746720" cy="5034240"/>
           </a:xfrm>
           <a:prstGeom prst="rect">
             <a:avLst/>
@@ -6218,7 +6218,7 @@
             </a:endParaRPr>
           </a:p>
           <a:p>
-            <a:pPr marL="195120" indent="-189720">
+            <a:pPr marL="195120" indent="-189360">
               <a:lnSpc>
                 <a:spcPct val="100000"/>
               </a:lnSpc>
@@ -6287,7 +6287,7 @@
             </a:endParaRPr>
           </a:p>
           <a:p>
-            <a:pPr marL="195120" indent="-189720">
+            <a:pPr marL="195120" indent="-189360">
               <a:lnSpc>
                 <a:spcPct val="100000"/>
               </a:lnSpc>
@@ -6346,7 +6346,7 @@
             </a:endParaRPr>
           </a:p>
           <a:p>
-            <a:pPr marL="195120" indent="-189720">
+            <a:pPr marL="195120" indent="-189360">
               <a:lnSpc>
                 <a:spcPct val="100000"/>
               </a:lnSpc>
@@ -6375,7 +6375,7 @@
             </a:endParaRPr>
           </a:p>
           <a:p>
-            <a:pPr marL="195120" indent="-189720">
+            <a:pPr marL="195120" indent="-189360">
               <a:lnSpc>
                 <a:spcPct val="100000"/>
               </a:lnSpc>
@@ -6404,7 +6404,7 @@
             </a:endParaRPr>
           </a:p>
           <a:p>
-            <a:pPr marL="195120" indent="-189720">
+            <a:pPr marL="195120" indent="-189360">
               <a:lnSpc>
                 <a:spcPct val="100000"/>
               </a:lnSpc>
@@ -6673,7 +6673,7 @@
         <p:spPr>
           <a:xfrm>
             <a:off x="335520" y="764640"/>
-            <a:ext cx="10747080" cy="497880"/>
+            <a:ext cx="10746720" cy="497520"/>
           </a:xfrm>
           <a:prstGeom prst="rect">
             <a:avLst/>
@@ -6724,7 +6724,7 @@
         <p:spPr>
           <a:xfrm>
             <a:off x="335520" y="1268280"/>
-            <a:ext cx="10747080" cy="5034600"/>
+            <a:ext cx="10746720" cy="5034240"/>
           </a:xfrm>
           <a:prstGeom prst="rect">
             <a:avLst/>
@@ -6768,7 +6768,7 @@
             </a:endParaRPr>
           </a:p>
           <a:p>
-            <a:pPr marL="195120" indent="-189720">
+            <a:pPr marL="195120" indent="-189360">
               <a:lnSpc>
                 <a:spcPct val="100000"/>
               </a:lnSpc>
@@ -6837,7 +6837,7 @@
             </a:endParaRPr>
           </a:p>
           <a:p>
-            <a:pPr marL="195120" indent="-189720">
+            <a:pPr marL="195120" indent="-189360">
               <a:lnSpc>
                 <a:spcPct val="100000"/>
               </a:lnSpc>
@@ -6896,7 +6896,7 @@
             </a:endParaRPr>
           </a:p>
           <a:p>
-            <a:pPr marL="195120" indent="-189720">
+            <a:pPr marL="195120" indent="-189360">
               <a:lnSpc>
                 <a:spcPct val="100000"/>
               </a:lnSpc>
@@ -6925,7 +6925,7 @@
             </a:endParaRPr>
           </a:p>
           <a:p>
-            <a:pPr marL="195120" indent="-189720">
+            <a:pPr marL="195120" indent="-189360">
               <a:lnSpc>
                 <a:spcPct val="100000"/>
               </a:lnSpc>
@@ -6954,7 +6954,7 @@
             </a:endParaRPr>
           </a:p>
           <a:p>
-            <a:pPr marL="195120" indent="-189720">
+            <a:pPr marL="195120" indent="-189360">
               <a:lnSpc>
                 <a:spcPct val="100000"/>
               </a:lnSpc>
@@ -6996,7 +6996,7 @@
             </a:endParaRPr>
           </a:p>
           <a:p>
-            <a:pPr marL="195120" indent="-189720">
+            <a:pPr marL="195120" indent="-189360">
               <a:lnSpc>
                 <a:spcPct val="100000"/>
               </a:lnSpc>
@@ -7025,7 +7025,7 @@
             </a:endParaRPr>
           </a:p>
           <a:p>
-            <a:pPr lvl="1" marL="744120" indent="-281520">
+            <a:pPr lvl="1" marL="744120" indent="-281160">
               <a:lnSpc>
                 <a:spcPct val="100000"/>
               </a:lnSpc>
@@ -7054,7 +7054,7 @@
             </a:endParaRPr>
           </a:p>
           <a:p>
-            <a:pPr lvl="1" marL="744120" indent="-281520">
+            <a:pPr lvl="1" marL="744120" indent="-281160">
               <a:lnSpc>
                 <a:spcPct val="100000"/>
               </a:lnSpc>
@@ -7083,7 +7083,7 @@
             </a:endParaRPr>
           </a:p>
           <a:p>
-            <a:pPr lvl="1" marL="744120" indent="-281520">
+            <a:pPr lvl="1" marL="744120" indent="-281160">
               <a:lnSpc>
                 <a:spcPct val="100000"/>
               </a:lnSpc>
@@ -7112,7 +7112,7 @@
             </a:endParaRPr>
           </a:p>
           <a:p>
-            <a:pPr lvl="1" marL="744120" indent="-281520">
+            <a:pPr lvl="1" marL="744120" indent="-281160">
               <a:lnSpc>
                 <a:spcPct val="100000"/>
               </a:lnSpc>
@@ -7141,7 +7141,7 @@
             </a:endParaRPr>
           </a:p>
           <a:p>
-            <a:pPr lvl="1" marL="744120" indent="-281520">
+            <a:pPr lvl="1" marL="744120" indent="-281160">
               <a:lnSpc>
                 <a:spcPct val="100000"/>
               </a:lnSpc>
@@ -7259,7 +7259,7 @@
         <p:spPr>
           <a:xfrm>
             <a:off x="335520" y="764640"/>
-            <a:ext cx="10747080" cy="497880"/>
+            <a:ext cx="10746720" cy="497520"/>
           </a:xfrm>
           <a:prstGeom prst="rect">
             <a:avLst/>
@@ -7310,7 +7310,7 @@
         <p:spPr>
           <a:xfrm>
             <a:off x="335520" y="1268640"/>
-            <a:ext cx="10747080" cy="5034600"/>
+            <a:ext cx="10746720" cy="5034240"/>
           </a:xfrm>
           <a:prstGeom prst="rect">
             <a:avLst/>
@@ -7331,7 +7331,7 @@
             <a:noAutofit/>
           </a:bodyPr>
           <a:p>
-            <a:pPr marL="195120" indent="-189720">
+            <a:pPr marL="195120" indent="-189360">
               <a:lnSpc>
                 <a:spcPct val="100000"/>
               </a:lnSpc>
@@ -7360,7 +7360,7 @@
             </a:endParaRPr>
           </a:p>
           <a:p>
-            <a:pPr lvl="1" marL="744120" indent="-281520">
+            <a:pPr lvl="1" marL="744120" indent="-281160">
               <a:lnSpc>
                 <a:spcPct val="100000"/>
               </a:lnSpc>
@@ -7402,7 +7402,7 @@
             </a:endParaRPr>
           </a:p>
           <a:p>
-            <a:pPr marL="195120" indent="-189720">
+            <a:pPr marL="195120" indent="-189360">
               <a:lnSpc>
                 <a:spcPct val="100000"/>
               </a:lnSpc>
@@ -7431,7 +7431,7 @@
             </a:endParaRPr>
           </a:p>
           <a:p>
-            <a:pPr lvl="1" marL="744120" indent="-281520">
+            <a:pPr lvl="1" marL="744120" indent="-281160">
               <a:lnSpc>
                 <a:spcPct val="100000"/>
               </a:lnSpc>
@@ -7460,7 +7460,7 @@
             </a:endParaRPr>
           </a:p>
           <a:p>
-            <a:pPr lvl="1" marL="744120" indent="-281520">
+            <a:pPr lvl="1" marL="744120" indent="-281160">
               <a:lnSpc>
                 <a:spcPct val="100000"/>
               </a:lnSpc>
@@ -7509,7 +7509,7 @@
             </a:endParaRPr>
           </a:p>
           <a:p>
-            <a:pPr lvl="1" marL="744120" indent="-281520">
+            <a:pPr lvl="1" marL="744120" indent="-281160">
               <a:lnSpc>
                 <a:spcPct val="100000"/>
               </a:lnSpc>
@@ -7578,7 +7578,7 @@
         <p:spPr>
           <a:xfrm>
             <a:off x="335520" y="764640"/>
-            <a:ext cx="10747080" cy="497880"/>
+            <a:ext cx="10746720" cy="497520"/>
           </a:xfrm>
           <a:prstGeom prst="rect">
             <a:avLst/>
@@ -7629,7 +7629,7 @@
         <p:spPr>
           <a:xfrm>
             <a:off x="335520" y="1268280"/>
-            <a:ext cx="10747080" cy="5034600"/>
+            <a:ext cx="10746720" cy="5034240"/>
           </a:xfrm>
           <a:prstGeom prst="rect">
             <a:avLst/>
@@ -7663,7 +7663,7 @@
             </a:endParaRPr>
           </a:p>
           <a:p>
-            <a:pPr marL="195120" indent="-189720">
+            <a:pPr marL="195120" indent="-189360">
               <a:lnSpc>
                 <a:spcPct val="100000"/>
               </a:lnSpc>
@@ -7719,7 +7719,7 @@
         <p:spPr>
           <a:xfrm>
             <a:off x="6285600" y="2132640"/>
-            <a:ext cx="516600" cy="496440"/>
+            <a:ext cx="516240" cy="496080"/>
           </a:xfrm>
           <a:prstGeom prst="star5">
             <a:avLst>
@@ -7761,7 +7761,7 @@
         <p:spPr>
           <a:xfrm>
             <a:off x="4089960" y="2247480"/>
-            <a:ext cx="2284920" cy="363960"/>
+            <a:ext cx="2284560" cy="363960"/>
           </a:xfrm>
           <a:prstGeom prst="rect">
             <a:avLst/>
@@ -7862,7 +7862,7 @@
         <p:spPr>
           <a:xfrm>
             <a:off x="335520" y="764640"/>
-            <a:ext cx="10747080" cy="497880"/>
+            <a:ext cx="10746720" cy="497520"/>
           </a:xfrm>
           <a:prstGeom prst="rect">
             <a:avLst/>
@@ -7913,7 +7913,7 @@
         <p:spPr>
           <a:xfrm>
             <a:off x="335520" y="1268640"/>
-            <a:ext cx="10747080" cy="5034600"/>
+            <a:ext cx="10746720" cy="5034240"/>
           </a:xfrm>
           <a:prstGeom prst="rect">
             <a:avLst/>
@@ -7934,7 +7934,7 @@
             <a:noAutofit/>
           </a:bodyPr>
           <a:p>
-            <a:pPr marL="195120" indent="-189720">
+            <a:pPr marL="195120" indent="-189360">
               <a:lnSpc>
                 <a:spcPct val="100000"/>
               </a:lnSpc>
@@ -7996,7 +7996,7 @@
             </a:endParaRPr>
           </a:p>
           <a:p>
-            <a:pPr marL="195120" indent="-189720">
+            <a:pPr marL="195120" indent="-189360">
               <a:lnSpc>
                 <a:spcPct val="100000"/>
               </a:lnSpc>
@@ -8045,7 +8045,7 @@
             </a:endParaRPr>
           </a:p>
           <a:p>
-            <a:pPr marL="195120" indent="-189720">
+            <a:pPr marL="195120" indent="-189360">
               <a:lnSpc>
                 <a:spcPct val="100000"/>
               </a:lnSpc>
@@ -8094,7 +8094,7 @@
             </a:endParaRPr>
           </a:p>
           <a:p>
-            <a:pPr marL="195120" indent="-189720">
+            <a:pPr marL="195120" indent="-189360">
               <a:lnSpc>
                 <a:spcPct val="100000"/>
               </a:lnSpc>
@@ -8143,7 +8143,7 @@
             </a:endParaRPr>
           </a:p>
           <a:p>
-            <a:pPr marL="195120" indent="-189720">
+            <a:pPr marL="195120" indent="-189360">
               <a:lnSpc>
                 <a:spcPct val="100000"/>
               </a:lnSpc>
@@ -8192,7 +8192,7 @@
             </a:endParaRPr>
           </a:p>
           <a:p>
-            <a:pPr marL="195120" indent="-189720">
+            <a:pPr marL="195120" indent="-189360">
               <a:lnSpc>
                 <a:spcPct val="100000"/>
               </a:lnSpc>
@@ -8241,7 +8241,7 @@
             </a:endParaRPr>
           </a:p>
           <a:p>
-            <a:pPr marL="195120" indent="-189720">
+            <a:pPr marL="195120" indent="-189360">
               <a:lnSpc>
                 <a:spcPct val="100000"/>
               </a:lnSpc>
@@ -8290,7 +8290,7 @@
             </a:endParaRPr>
           </a:p>
           <a:p>
-            <a:pPr marL="195120" indent="-189720">
+            <a:pPr marL="195120" indent="-189360">
               <a:lnSpc>
                 <a:spcPct val="100000"/>
               </a:lnSpc>
@@ -8339,7 +8339,7 @@
             </a:endParaRPr>
           </a:p>
           <a:p>
-            <a:pPr marL="195120" indent="-189720">
+            <a:pPr marL="195120" indent="-189360">
               <a:lnSpc>
                 <a:spcPct val="100000"/>
               </a:lnSpc>
@@ -8388,7 +8388,7 @@
             </a:endParaRPr>
           </a:p>
           <a:p>
-            <a:pPr marL="195120" indent="-189720">
+            <a:pPr marL="195120" indent="-189360">
               <a:lnSpc>
                 <a:spcPct val="100000"/>
               </a:lnSpc>
@@ -8477,7 +8477,7 @@
         <p:spPr>
           <a:xfrm>
             <a:off x="335520" y="764640"/>
-            <a:ext cx="10747080" cy="497880"/>
+            <a:ext cx="10746720" cy="497520"/>
           </a:xfrm>
           <a:prstGeom prst="rect">
             <a:avLst/>
@@ -8528,7 +8528,7 @@
         <p:spPr>
           <a:xfrm>
             <a:off x="335520" y="1268640"/>
-            <a:ext cx="10743840" cy="5031360"/>
+            <a:ext cx="10743480" cy="5031000"/>
           </a:xfrm>
           <a:prstGeom prst="rect">
             <a:avLst/>
@@ -8549,7 +8549,7 @@
             <a:noAutofit/>
           </a:bodyPr>
           <a:p>
-            <a:pPr marL="195120" indent="-189720">
+            <a:pPr marL="195120" indent="-189360">
               <a:lnSpc>
                 <a:spcPct val="100000"/>
               </a:lnSpc>
@@ -8590,7 +8590,7 @@
             </a:endParaRPr>
           </a:p>
           <a:p>
-            <a:pPr marL="195120" indent="-189720">
+            <a:pPr marL="195120" indent="-189360">
               <a:lnSpc>
                 <a:spcPct val="100000"/>
               </a:lnSpc>
@@ -8641,7 +8641,7 @@
             </a:endParaRPr>
           </a:p>
           <a:p>
-            <a:pPr marL="195120" indent="-189720">
+            <a:pPr marL="195120" indent="-189360">
               <a:lnSpc>
                 <a:spcPct val="100000"/>
               </a:lnSpc>
@@ -8682,7 +8682,20 @@
             </a:endParaRPr>
           </a:p>
           <a:p>
-            <a:pPr marL="195120" indent="-189720">
+            <a:pPr>
+              <a:lnSpc>
+                <a:spcPct val="100000"/>
+              </a:lnSpc>
+              <a:spcBef>
+                <a:spcPts val="360"/>
+              </a:spcBef>
+            </a:pPr>
+            <a:endParaRPr b="0" lang="en-US" sz="1800" spc="-1" strike="noStrike">
+              <a:latin typeface="Arial"/>
+            </a:endParaRPr>
+          </a:p>
+          <a:p>
+            <a:pPr marL="195120" indent="-189360">
               <a:lnSpc>
                 <a:spcPct val="100000"/>
               </a:lnSpc>
@@ -8711,7 +8724,10 @@
             </a:endParaRPr>
           </a:p>
           <a:p>
-            <a:pPr lvl="1" marL="432000" indent="-216000">
+            <a:pPr lvl="1" marL="432000" indent="-215640">
+              <a:lnSpc>
+                <a:spcPct val="100000"/>
+              </a:lnSpc>
               <a:buClr>
                 <a:srgbClr val="008c4f"/>
               </a:buClr>
@@ -8730,23 +8746,24 @@
               <a:t>Drilled (</a:t>
             </a:r>
             <a:r>
+              <a:rPr b="0" lang="en-US" sz="1800" spc="-1" strike="noStrike" u="sng">
+                <a:solidFill>
+                  <a:srgbClr val="0000ff"/>
+                </a:solidFill>
+                <a:uFillTx/>
+                <a:latin typeface="DejaVu Sans"/>
+                <a:ea typeface="DejaVu Sans"/>
+                <a:hlinkClick r:id="rId4"/>
+              </a:rPr>
+              <a:t>Link</a:t>
+            </a:r>
+            <a:r>
               <a:rPr b="0" lang="en-US" sz="1800" spc="-1" strike="noStrike">
                 <a:solidFill>
                   <a:srgbClr val="000000"/>
                 </a:solidFill>
                 <a:latin typeface="DejaVu Sans"/>
                 <a:ea typeface="DejaVu Sans"/>
-                <a:hlinkClick r:id="rId4"/>
-              </a:rPr>
-              <a:t>Link</a:t>
-            </a:r>
-            <a:r>
-              <a:rPr b="0" lang="en-US" sz="1800" spc="-1" strike="noStrike">
-                <a:solidFill>
-                  <a:srgbClr val="000000"/>
-                </a:solidFill>
-                <a:latin typeface="DejaVu Sans"/>
-                <a:ea typeface="DejaVu Sans"/>
               </a:rPr>
               <a:t>)</a:t>
             </a:r>
@@ -8755,7 +8772,7 @@
             </a:endParaRPr>
           </a:p>
           <a:p>
-            <a:pPr lvl="1" marL="432000" indent="-216000">
+            <a:pPr lvl="1" marL="432000" indent="-215640">
               <a:lnSpc>
                 <a:spcPct val="100000"/>
               </a:lnSpc>
@@ -8780,23 +8797,24 @@
               <a:t>How to Save a Planet (</a:t>
             </a:r>
             <a:r>
+              <a:rPr b="0" lang="en-US" sz="1800" spc="-1" strike="noStrike" u="sng">
+                <a:solidFill>
+                  <a:srgbClr val="0000ff"/>
+                </a:solidFill>
+                <a:uFillTx/>
+                <a:latin typeface="DejaVu Sans"/>
+                <a:ea typeface="DejaVu Sans"/>
+                <a:hlinkClick r:id="rId5"/>
+              </a:rPr>
+              <a:t>Link</a:t>
+            </a:r>
+            <a:r>
               <a:rPr b="0" lang="en-US" sz="1800" spc="-1" strike="noStrike">
                 <a:solidFill>
                   <a:srgbClr val="000000"/>
                 </a:solidFill>
                 <a:latin typeface="DejaVu Sans"/>
                 <a:ea typeface="DejaVu Sans"/>
-                <a:hlinkClick r:id="rId5"/>
-              </a:rPr>
-              <a:t>Link</a:t>
-            </a:r>
-            <a:r>
-              <a:rPr b="0" lang="en-US" sz="1800" spc="-1" strike="noStrike">
-                <a:solidFill>
-                  <a:srgbClr val="000000"/>
-                </a:solidFill>
-                <a:latin typeface="DejaVu Sans"/>
-                <a:ea typeface="DejaVu Sans"/>
               </a:rPr>
               <a:t>)</a:t>
             </a:r>
@@ -8805,7 +8823,7 @@
             </a:endParaRPr>
           </a:p>
           <a:p>
-            <a:pPr lvl="1" marL="432000" indent="-216000">
+            <a:pPr lvl="1" marL="432000" indent="-215640">
               <a:lnSpc>
                 <a:spcPct val="100000"/>
               </a:lnSpc>
@@ -8830,10 +8848,11 @@
               <a:t>1,5 Grad – der Klima-Podcast mit Luisa Neubauer (German) (</a:t>
             </a:r>
             <a:r>
-              <a:rPr b="0" lang="en-US" sz="1800" spc="-1" strike="noStrike">
-                <a:solidFill>
-                  <a:srgbClr val="000000"/>
-                </a:solidFill>
+              <a:rPr b="0" lang="en-US" sz="1800" spc="-1" strike="noStrike" u="sng">
+                <a:solidFill>
+                  <a:srgbClr val="0000ff"/>
+                </a:solidFill>
+                <a:uFillTx/>
                 <a:latin typeface="DejaVu Sans"/>
                 <a:ea typeface="DejaVu Sans"/>
                 <a:hlinkClick r:id="rId6"/>
@@ -8895,7 +8914,7 @@
         <p:spPr>
           <a:xfrm>
             <a:off x="335520" y="1268640"/>
-            <a:ext cx="10747080" cy="5034600"/>
+            <a:ext cx="10746720" cy="5034240"/>
           </a:xfrm>
           <a:prstGeom prst="rect">
             <a:avLst/>
@@ -8952,7 +8971,7 @@
         <p:spPr>
           <a:xfrm>
             <a:off x="335520" y="764640"/>
-            <a:ext cx="10747080" cy="497880"/>
+            <a:ext cx="10746720" cy="497520"/>
           </a:xfrm>
           <a:prstGeom prst="rect">
             <a:avLst/>
@@ -9008,7 +9027,7 @@
         <p:spPr>
           <a:xfrm>
             <a:off x="335520" y="764640"/>
-            <a:ext cx="10744920" cy="495720"/>
+            <a:ext cx="10744560" cy="495360"/>
           </a:xfrm>
           <a:prstGeom prst="rect">
             <a:avLst/>
@@ -9059,7 +9078,7 @@
         <p:spPr>
           <a:xfrm>
             <a:off x="335520" y="1268280"/>
-            <a:ext cx="10744920" cy="5032440"/>
+            <a:ext cx="10744560" cy="5032080"/>
           </a:xfrm>
           <a:prstGeom prst="rect">
             <a:avLst/>
@@ -9090,7 +9109,7 @@
             </a:endParaRPr>
           </a:p>
           <a:p>
-            <a:pPr marL="195120" indent="-187560">
+            <a:pPr marL="195120" indent="-187200">
               <a:lnSpc>
                 <a:spcPct val="100000"/>
               </a:lnSpc>
@@ -9174,7 +9193,7 @@
             </a:endParaRPr>
           </a:p>
           <a:p>
-            <a:pPr marL="195120" indent="-187560">
+            <a:pPr marL="195120" indent="-187200">
               <a:lnSpc>
                 <a:spcPct val="100000"/>
               </a:lnSpc>
@@ -9278,7 +9297,7 @@
         <p:spPr>
           <a:xfrm>
             <a:off x="335520" y="764640"/>
-            <a:ext cx="10747080" cy="497880"/>
+            <a:ext cx="10746720" cy="497520"/>
           </a:xfrm>
           <a:prstGeom prst="rect">
             <a:avLst/>
@@ -9333,7 +9352,7 @@
         <p:spPr>
           <a:xfrm>
             <a:off x="2374920" y="2133000"/>
-            <a:ext cx="1469880" cy="2171160"/>
+            <a:ext cx="1469520" cy="2170800"/>
           </a:xfrm>
           <a:prstGeom prst="rect">
             <a:avLst/>
@@ -9356,7 +9375,7 @@
         <p:spPr>
           <a:xfrm>
             <a:off x="6960240" y="2525760"/>
-            <a:ext cx="1783800" cy="1775880"/>
+            <a:ext cx="1783440" cy="1775520"/>
           </a:xfrm>
           <a:prstGeom prst="rect">
             <a:avLst/>
@@ -9375,7 +9394,7 @@
         <p:spPr>
           <a:xfrm>
             <a:off x="1310400" y="4249080"/>
-            <a:ext cx="3634560" cy="676080"/>
+            <a:ext cx="3634200" cy="675720"/>
           </a:xfrm>
           <a:prstGeom prst="rect">
             <a:avLst/>
@@ -9452,7 +9471,7 @@
         <p:spPr>
           <a:xfrm>
             <a:off x="6013080" y="4269960"/>
-            <a:ext cx="3634560" cy="676080"/>
+            <a:ext cx="3634200" cy="675720"/>
           </a:xfrm>
           <a:prstGeom prst="rect">
             <a:avLst/>
@@ -9559,7 +9578,7 @@
         <p:spPr>
           <a:xfrm>
             <a:off x="542880" y="721800"/>
-            <a:ext cx="10352880" cy="493560"/>
+            <a:ext cx="10352520" cy="493200"/>
           </a:xfrm>
           <a:prstGeom prst="rect">
             <a:avLst/>
@@ -9610,7 +9629,7 @@
         <p:spPr>
           <a:xfrm>
             <a:off x="451800" y="1709280"/>
-            <a:ext cx="8220240" cy="4348440"/>
+            <a:ext cx="8219880" cy="4348080"/>
           </a:xfrm>
           <a:prstGeom prst="rect">
             <a:avLst/>
@@ -9636,7 +9655,7 @@
         <p:spPr>
           <a:xfrm>
             <a:off x="609480" y="1769400"/>
-            <a:ext cx="10583280" cy="4851360"/>
+            <a:ext cx="10582920" cy="4851000"/>
           </a:xfrm>
           <a:prstGeom prst="rect">
             <a:avLst/>
@@ -9657,7 +9676,7 @@
             <a:normAutofit/>
           </a:bodyPr>
           <a:p>
-            <a:pPr marL="216000" indent="-211680">
+            <a:pPr marL="216000" indent="-211320">
               <a:lnSpc>
                 <a:spcPct val="90000"/>
               </a:lnSpc>
@@ -9766,7 +9785,7 @@
             </a:endParaRPr>
           </a:p>
           <a:p>
-            <a:pPr marL="216000" indent="-211680">
+            <a:pPr marL="216000" indent="-211320">
               <a:lnSpc>
                 <a:spcPct val="100000"/>
               </a:lnSpc>
@@ -9795,7 +9814,7 @@
             </a:endParaRPr>
           </a:p>
           <a:p>
-            <a:pPr lvl="1" marL="685800" indent="-224280">
+            <a:pPr lvl="1" marL="685800" indent="-223920">
               <a:lnSpc>
                 <a:spcPct val="100000"/>
               </a:lnSpc>
@@ -9824,7 +9843,7 @@
             </a:endParaRPr>
           </a:p>
           <a:p>
-            <a:pPr lvl="1" marL="685800" indent="-224280">
+            <a:pPr lvl="1" marL="685800" indent="-223920">
               <a:lnSpc>
                 <a:spcPct val="100000"/>
               </a:lnSpc>
@@ -9853,7 +9872,7 @@
             </a:endParaRPr>
           </a:p>
           <a:p>
-            <a:pPr lvl="1" marL="685800" indent="-224280">
+            <a:pPr lvl="1" marL="685800" indent="-223920">
               <a:lnSpc>
                 <a:spcPct val="100000"/>
               </a:lnSpc>
@@ -9882,7 +9901,7 @@
             </a:endParaRPr>
           </a:p>
           <a:p>
-            <a:pPr lvl="1" marL="685800" indent="-224280">
+            <a:pPr lvl="1" marL="685800" indent="-223920">
               <a:lnSpc>
                 <a:spcPct val="100000"/>
               </a:lnSpc>
@@ -9911,7 +9930,7 @@
             </a:endParaRPr>
           </a:p>
           <a:p>
-            <a:pPr marL="216000" indent="-211680">
+            <a:pPr marL="216000" indent="-211320">
               <a:lnSpc>
                 <a:spcPct val="100000"/>
               </a:lnSpc>
@@ -9940,7 +9959,7 @@
             </a:endParaRPr>
           </a:p>
           <a:p>
-            <a:pPr lvl="1" marL="685800" indent="-224280">
+            <a:pPr lvl="1" marL="685800" indent="-223920">
               <a:lnSpc>
                 <a:spcPct val="100000"/>
               </a:lnSpc>
@@ -9969,7 +9988,7 @@
             </a:endParaRPr>
           </a:p>
           <a:p>
-            <a:pPr lvl="1" marL="685800" indent="-224280">
+            <a:pPr lvl="1" marL="685800" indent="-223920">
               <a:lnSpc>
                 <a:spcPct val="100000"/>
               </a:lnSpc>
@@ -10038,7 +10057,7 @@
         <p:spPr>
           <a:xfrm>
             <a:off x="542880" y="721800"/>
-            <a:ext cx="10352880" cy="493560"/>
+            <a:ext cx="10352520" cy="493200"/>
           </a:xfrm>
           <a:prstGeom prst="rect">
             <a:avLst/>
@@ -10089,7 +10108,7 @@
         <p:spPr>
           <a:xfrm>
             <a:off x="451800" y="1709280"/>
-            <a:ext cx="8220240" cy="4348440"/>
+            <a:ext cx="8219880" cy="4348080"/>
           </a:xfrm>
           <a:prstGeom prst="rect">
             <a:avLst/>
@@ -10115,7 +10134,7 @@
         <p:spPr>
           <a:xfrm>
             <a:off x="609480" y="1769400"/>
-            <a:ext cx="10583280" cy="4851360"/>
+            <a:ext cx="10582920" cy="4851000"/>
           </a:xfrm>
           <a:prstGeom prst="rect">
             <a:avLst/>
@@ -10136,7 +10155,7 @@
             <a:normAutofit/>
           </a:bodyPr>
           <a:p>
-            <a:pPr marL="216000" indent="-211680">
+            <a:pPr marL="216000" indent="-211320">
               <a:lnSpc>
                 <a:spcPct val="90000"/>
               </a:lnSpc>
@@ -10187,7 +10206,7 @@
             </a:endParaRPr>
           </a:p>
           <a:p>
-            <a:pPr lvl="1" marL="685800" indent="-224280">
+            <a:pPr lvl="1" marL="685800" indent="-223920">
               <a:lnSpc>
                 <a:spcPct val="100000"/>
               </a:lnSpc>
@@ -10216,7 +10235,7 @@
             </a:endParaRPr>
           </a:p>
           <a:p>
-            <a:pPr lvl="1" marL="685800" indent="-224280">
+            <a:pPr lvl="1" marL="685800" indent="-223920">
               <a:lnSpc>
                 <a:spcPct val="100000"/>
               </a:lnSpc>
@@ -10258,7 +10277,7 @@
             </a:endParaRPr>
           </a:p>
           <a:p>
-            <a:pPr marL="216000" indent="-211680">
+            <a:pPr marL="216000" indent="-211320">
               <a:lnSpc>
                 <a:spcPct val="90000"/>
               </a:lnSpc>
@@ -10290,7 +10309,7 @@
             </a:endParaRPr>
           </a:p>
           <a:p>
-            <a:pPr lvl="1" marL="685800" indent="-224280">
+            <a:pPr lvl="1" marL="685800" indent="-223920">
               <a:lnSpc>
                 <a:spcPct val="100000"/>
               </a:lnSpc>
@@ -10344,7 +10363,7 @@
             </a:endParaRPr>
           </a:p>
           <a:p>
-            <a:pPr lvl="1" marL="685800" indent="-224280">
+            <a:pPr lvl="1" marL="685800" indent="-223920">
               <a:lnSpc>
                 <a:spcPct val="100000"/>
               </a:lnSpc>
@@ -10398,7 +10417,7 @@
             </a:endParaRPr>
           </a:p>
           <a:p>
-            <a:pPr marL="228600" indent="-224280">
+            <a:pPr marL="228600" indent="-223920">
               <a:lnSpc>
                 <a:spcPct val="90000"/>
               </a:lnSpc>
@@ -10414,7 +10433,7 @@
             </a:endParaRPr>
           </a:p>
           <a:p>
-            <a:pPr marL="228600" indent="-224280" algn="ctr">
+            <a:pPr marL="228600" indent="-223920" algn="ctr">
               <a:lnSpc>
                 <a:spcPct val="90000"/>
               </a:lnSpc>
@@ -10440,7 +10459,7 @@
             </a:endParaRPr>
           </a:p>
           <a:p>
-            <a:pPr marL="457200" indent="-224280" algn="ctr">
+            <a:pPr marL="457200" indent="-223920" algn="ctr">
               <a:lnSpc>
                 <a:spcPct val="90000"/>
               </a:lnSpc>
@@ -10516,7 +10535,7 @@
         <p:spPr>
           <a:xfrm>
             <a:off x="542880" y="721800"/>
-            <a:ext cx="10352880" cy="493560"/>
+            <a:ext cx="10352520" cy="493200"/>
           </a:xfrm>
           <a:prstGeom prst="rect">
             <a:avLst/>
@@ -10567,7 +10586,7 @@
         <p:spPr>
           <a:xfrm>
             <a:off x="451800" y="1709280"/>
-            <a:ext cx="8220240" cy="4348440"/>
+            <a:ext cx="8219880" cy="4348080"/>
           </a:xfrm>
           <a:prstGeom prst="rect">
             <a:avLst/>
@@ -10593,7 +10612,7 @@
         <p:spPr>
           <a:xfrm>
             <a:off x="609480" y="1769400"/>
-            <a:ext cx="10583280" cy="4851360"/>
+            <a:ext cx="10582920" cy="4851000"/>
           </a:xfrm>
           <a:prstGeom prst="rect">
             <a:avLst/>
@@ -10614,7 +10633,7 @@
             <a:normAutofit/>
           </a:bodyPr>
           <a:p>
-            <a:pPr marL="216000" indent="-211680">
+            <a:pPr marL="216000" indent="-211320">
               <a:lnSpc>
                 <a:spcPct val="90000"/>
               </a:lnSpc>
@@ -10665,7 +10684,7 @@
             </a:endParaRPr>
           </a:p>
           <a:p>
-            <a:pPr lvl="1" marL="685800" indent="-224280">
+            <a:pPr lvl="1" marL="685800" indent="-223920">
               <a:lnSpc>
                 <a:spcPct val="100000"/>
               </a:lnSpc>
@@ -10694,7 +10713,7 @@
             </a:endParaRPr>
           </a:p>
           <a:p>
-            <a:pPr lvl="1" marL="685800" indent="-224280">
+            <a:pPr lvl="1" marL="685800" indent="-223920">
               <a:lnSpc>
                 <a:spcPct val="100000"/>
               </a:lnSpc>
@@ -10736,7 +10755,7 @@
             </a:endParaRPr>
           </a:p>
           <a:p>
-            <a:pPr marL="216000" indent="-211680">
+            <a:pPr marL="216000" indent="-211320">
               <a:lnSpc>
                 <a:spcPct val="90000"/>
               </a:lnSpc>
@@ -10768,7 +10787,7 @@
             </a:endParaRPr>
           </a:p>
           <a:p>
-            <a:pPr lvl="1" marL="685800" indent="-224280">
+            <a:pPr lvl="1" marL="685800" indent="-223920">
               <a:lnSpc>
                 <a:spcPct val="100000"/>
               </a:lnSpc>
@@ -10822,7 +10841,7 @@
             </a:endParaRPr>
           </a:p>
           <a:p>
-            <a:pPr lvl="1" marL="685800" indent="-224280">
+            <a:pPr lvl="1" marL="685800" indent="-223920">
               <a:lnSpc>
                 <a:spcPct val="100000"/>
               </a:lnSpc>
@@ -10876,7 +10895,7 @@
             </a:endParaRPr>
           </a:p>
           <a:p>
-            <a:pPr marL="228600" indent="-224280">
+            <a:pPr marL="228600" indent="-223920">
               <a:lnSpc>
                 <a:spcPct val="90000"/>
               </a:lnSpc>
@@ -10892,7 +10911,7 @@
             </a:endParaRPr>
           </a:p>
           <a:p>
-            <a:pPr marL="228600" indent="-224280" algn="ctr">
+            <a:pPr marL="228600" indent="-223920" algn="ctr">
               <a:lnSpc>
                 <a:spcPct val="90000"/>
               </a:lnSpc>
@@ -10918,7 +10937,7 @@
             </a:endParaRPr>
           </a:p>
           <a:p>
-            <a:pPr marL="457200" indent="-224280" algn="ctr">
+            <a:pPr marL="457200" indent="-223920" algn="ctr">
               <a:lnSpc>
                 <a:spcPct val="90000"/>
               </a:lnSpc>
@@ -10994,7 +11013,7 @@
         <p:spPr>
           <a:xfrm>
             <a:off x="542880" y="721800"/>
-            <a:ext cx="10352880" cy="493560"/>
+            <a:ext cx="10352520" cy="493200"/>
           </a:xfrm>
           <a:prstGeom prst="rect">
             <a:avLst/>
@@ -11045,7 +11064,7 @@
         <p:spPr>
           <a:xfrm>
             <a:off x="451800" y="1709280"/>
-            <a:ext cx="8220240" cy="4348440"/>
+            <a:ext cx="8219880" cy="4348080"/>
           </a:xfrm>
           <a:prstGeom prst="rect">
             <a:avLst/>
@@ -11071,7 +11090,7 @@
         <p:spPr>
           <a:xfrm>
             <a:off x="609480" y="1769400"/>
-            <a:ext cx="10583280" cy="4851360"/>
+            <a:ext cx="10582920" cy="4851000"/>
           </a:xfrm>
           <a:prstGeom prst="rect">
             <a:avLst/>
@@ -11092,7 +11111,7 @@
             <a:normAutofit/>
           </a:bodyPr>
           <a:p>
-            <a:pPr marL="216000" indent="-211680">
+            <a:pPr marL="216000" indent="-211320">
               <a:lnSpc>
                 <a:spcPct val="90000"/>
               </a:lnSpc>
@@ -11121,7 +11140,7 @@
             </a:endParaRPr>
           </a:p>
           <a:p>
-            <a:pPr marL="216000" indent="-211680">
+            <a:pPr marL="216000" indent="-211320">
               <a:lnSpc>
                 <a:spcPct val="90000"/>
               </a:lnSpc>
@@ -11150,7 +11169,7 @@
             </a:endParaRPr>
           </a:p>
           <a:p>
-            <a:pPr marL="216000" indent="-211680">
+            <a:pPr marL="216000" indent="-211320">
               <a:lnSpc>
                 <a:spcPct val="90000"/>
               </a:lnSpc>
@@ -11179,7 +11198,7 @@
             </a:endParaRPr>
           </a:p>
           <a:p>
-            <a:pPr marL="216000" indent="-211680">
+            <a:pPr marL="216000" indent="-211320">
               <a:lnSpc>
                 <a:spcPct val="90000"/>
               </a:lnSpc>
@@ -11208,7 +11227,7 @@
             </a:endParaRPr>
           </a:p>
           <a:p>
-            <a:pPr marL="216000" indent="-211680">
+            <a:pPr marL="216000" indent="-211320">
               <a:lnSpc>
                 <a:spcPct val="90000"/>
               </a:lnSpc>
@@ -11237,7 +11256,7 @@
             </a:endParaRPr>
           </a:p>
           <a:p>
-            <a:pPr marL="216000" indent="-211680">
+            <a:pPr marL="216000" indent="-211320">
               <a:lnSpc>
                 <a:spcPct val="90000"/>
               </a:lnSpc>
@@ -11266,7 +11285,7 @@
             </a:endParaRPr>
           </a:p>
           <a:p>
-            <a:pPr marL="216000" indent="-211680">
+            <a:pPr marL="216000" indent="-211320">
               <a:lnSpc>
                 <a:spcPct val="90000"/>
               </a:lnSpc>
@@ -11335,7 +11354,7 @@
         <p:spPr>
           <a:xfrm>
             <a:off x="542880" y="721800"/>
-            <a:ext cx="10352880" cy="493560"/>
+            <a:ext cx="10352520" cy="493200"/>
           </a:xfrm>
           <a:prstGeom prst="rect">
             <a:avLst/>
@@ -11386,7 +11405,7 @@
         <p:spPr>
           <a:xfrm>
             <a:off x="451800" y="1709280"/>
-            <a:ext cx="8220240" cy="4348440"/>
+            <a:ext cx="8219880" cy="4348080"/>
           </a:xfrm>
           <a:prstGeom prst="rect">
             <a:avLst/>
@@ -11412,7 +11431,7 @@
         <p:spPr>
           <a:xfrm>
             <a:off x="609480" y="1769400"/>
-            <a:ext cx="10583280" cy="4851360"/>
+            <a:ext cx="10582920" cy="4851000"/>
           </a:xfrm>
           <a:prstGeom prst="rect">
             <a:avLst/>
@@ -11433,7 +11452,7 @@
             <a:normAutofit/>
           </a:bodyPr>
           <a:p>
-            <a:pPr marL="216000" indent="-211680">
+            <a:pPr marL="216000" indent="-211320">
               <a:lnSpc>
                 <a:spcPct val="90000"/>
               </a:lnSpc>
@@ -11462,7 +11481,7 @@
             </a:endParaRPr>
           </a:p>
           <a:p>
-            <a:pPr marL="216000" indent="-211680">
+            <a:pPr marL="216000" indent="-211320">
               <a:lnSpc>
                 <a:spcPct val="90000"/>
               </a:lnSpc>
@@ -11491,7 +11510,7 @@
             </a:endParaRPr>
           </a:p>
           <a:p>
-            <a:pPr marL="216000" indent="-211680">
+            <a:pPr marL="216000" indent="-211320">
               <a:lnSpc>
                 <a:spcPct val="90000"/>
               </a:lnSpc>
@@ -11520,7 +11539,7 @@
             </a:endParaRPr>
           </a:p>
           <a:p>
-            <a:pPr marL="216000" indent="-211680">
+            <a:pPr marL="216000" indent="-211320">
               <a:lnSpc>
                 <a:spcPct val="90000"/>
               </a:lnSpc>
@@ -11549,7 +11568,7 @@
             </a:endParaRPr>
           </a:p>
           <a:p>
-            <a:pPr marL="216000" indent="-211680">
+            <a:pPr marL="216000" indent="-211320">
               <a:lnSpc>
                 <a:spcPct val="90000"/>
               </a:lnSpc>
@@ -11618,7 +11637,7 @@
         <p:spPr>
           <a:xfrm>
             <a:off x="335520" y="764640"/>
-            <a:ext cx="10747080" cy="497880"/>
+            <a:ext cx="10746720" cy="497520"/>
           </a:xfrm>
           <a:prstGeom prst="rect">
             <a:avLst/>
@@ -11669,7 +11688,7 @@
         <p:spPr>
           <a:xfrm>
             <a:off x="335520" y="1268640"/>
-            <a:ext cx="10747080" cy="5034600"/>
+            <a:ext cx="10746720" cy="5034240"/>
           </a:xfrm>
           <a:prstGeom prst="rect">
             <a:avLst/>
@@ -11690,7 +11709,7 @@
             <a:noAutofit/>
           </a:bodyPr>
           <a:p>
-            <a:pPr marL="195120" indent="-189720">
+            <a:pPr marL="195120" indent="-189360">
               <a:lnSpc>
                 <a:spcPct val="100000"/>
               </a:lnSpc>
@@ -11712,14 +11731,14 @@
                 <a:latin typeface="DejaVu Sans"/>
                 <a:ea typeface="DejaVu Sans"/>
               </a:rPr>
-              <a:t>25.04.2022 → Organization (L00) Organization + Introduction (L01)</a:t>
-            </a:r>
-            <a:endParaRPr b="0" lang="en-US" sz="1800" spc="-1" strike="noStrike">
-              <a:latin typeface="Arial"/>
-            </a:endParaRPr>
-          </a:p>
-          <a:p>
-            <a:pPr marL="195120" indent="-189720">
+              <a:t>25.04.2022 → Organization (L00) Organization + Introduction I (L01)</a:t>
+            </a:r>
+            <a:endParaRPr b="0" lang="en-US" sz="1800" spc="-1" strike="noStrike">
+              <a:latin typeface="Arial"/>
+            </a:endParaRPr>
+          </a:p>
+          <a:p>
+            <a:pPr marL="195120" indent="-189360">
               <a:lnSpc>
                 <a:spcPct val="100000"/>
               </a:lnSpc>
@@ -11741,14 +11760,14 @@
                 <a:latin typeface="DejaVu Sans"/>
                 <a:ea typeface="DejaVu Sans"/>
               </a:rPr>
-              <a:t>02.05.2022 → Introduction (L02)</a:t>
-            </a:r>
-            <a:endParaRPr b="0" lang="en-US" sz="1800" spc="-1" strike="noStrike">
-              <a:latin typeface="Arial"/>
-            </a:endParaRPr>
-          </a:p>
-          <a:p>
-            <a:pPr marL="195120" indent="-189720">
+              <a:t>02.05.2022 → Introduction II (L02)</a:t>
+            </a:r>
+            <a:endParaRPr b="0" lang="en-US" sz="1800" spc="-1" strike="noStrike">
+              <a:latin typeface="Arial"/>
+            </a:endParaRPr>
+          </a:p>
+          <a:p>
+            <a:pPr marL="195120" indent="-189360">
               <a:lnSpc>
                 <a:spcPct val="100000"/>
               </a:lnSpc>
@@ -11770,14 +11789,14 @@
                 <a:latin typeface="DejaVu Sans"/>
                 <a:ea typeface="DejaVu Sans"/>
               </a:rPr>
-              <a:t>09.05.2022 → What happened so far? (L03)</a:t>
-            </a:r>
-            <a:endParaRPr b="0" lang="en-US" sz="1800" spc="-1" strike="noStrike">
-              <a:latin typeface="Arial"/>
-            </a:endParaRPr>
-          </a:p>
-          <a:p>
-            <a:pPr marL="195120" indent="-189720">
+              <a:t>09.05.2022 → Introduction III (L03)</a:t>
+            </a:r>
+            <a:endParaRPr b="0" lang="en-US" sz="1800" spc="-1" strike="noStrike">
+              <a:latin typeface="Arial"/>
+            </a:endParaRPr>
+          </a:p>
+          <a:p>
+            <a:pPr marL="195120" indent="-189360">
               <a:lnSpc>
                 <a:spcPct val="100000"/>
               </a:lnSpc>
@@ -11799,14 +11818,14 @@
                 <a:latin typeface="DejaVu Sans"/>
                 <a:ea typeface="DejaVu Sans"/>
               </a:rPr>
-              <a:t>16.05.2022 → Life-cycle assessment – LCA (L04)</a:t>
-            </a:r>
-            <a:endParaRPr b="0" lang="en-US" sz="1800" spc="-1" strike="noStrike">
-              <a:latin typeface="Arial"/>
-            </a:endParaRPr>
-          </a:p>
-          <a:p>
-            <a:pPr marL="195120" indent="-189720">
+              <a:t>16.05.2022 → What Happened So Far? (L04)</a:t>
+            </a:r>
+            <a:endParaRPr b="0" lang="en-US" sz="1800" spc="-1" strike="noStrike">
+              <a:latin typeface="Arial"/>
+            </a:endParaRPr>
+          </a:p>
+          <a:p>
+            <a:pPr marL="195120" indent="-189360">
               <a:lnSpc>
                 <a:spcPct val="100000"/>
               </a:lnSpc>
@@ -11828,14 +11847,14 @@
                 <a:latin typeface="DejaVu Sans"/>
                 <a:ea typeface="DejaVu Sans"/>
               </a:rPr>
-              <a:t>23.05.2022 → World3 (L05)</a:t>
-            </a:r>
-            <a:endParaRPr b="0" lang="en-US" sz="1800" spc="-1" strike="noStrike">
-              <a:latin typeface="Arial"/>
-            </a:endParaRPr>
-          </a:p>
-          <a:p>
-            <a:pPr marL="195120" indent="-189720">
+              <a:t>23.05.2022 → Life-cycle Assessment – LCA (L05)</a:t>
+            </a:r>
+            <a:endParaRPr b="0" lang="en-US" sz="1800" spc="-1" strike="noStrike">
+              <a:latin typeface="Arial"/>
+            </a:endParaRPr>
+          </a:p>
+          <a:p>
+            <a:pPr marL="195120" indent="-189360">
               <a:lnSpc>
                 <a:spcPct val="100000"/>
               </a:lnSpc>
@@ -11857,14 +11876,14 @@
                 <a:latin typeface="DejaVu Sans"/>
                 <a:ea typeface="DejaVu Sans"/>
               </a:rPr>
-              <a:t>30.05.2022 → Circular Economy I (L06)</a:t>
-            </a:r>
-            <a:endParaRPr b="0" lang="en-US" sz="1800" spc="-1" strike="noStrike">
-              <a:latin typeface="Arial"/>
-            </a:endParaRPr>
-          </a:p>
-          <a:p>
-            <a:pPr marL="195120" indent="-189720">
+              <a:t>30.05.2022 → World3 (L06)</a:t>
+            </a:r>
+            <a:endParaRPr b="0" lang="en-US" sz="1800" spc="-1" strike="noStrike">
+              <a:latin typeface="Arial"/>
+            </a:endParaRPr>
+          </a:p>
+          <a:p>
+            <a:pPr marL="195120" indent="-189360">
               <a:lnSpc>
                 <a:spcPct val="100000"/>
               </a:lnSpc>
@@ -11886,14 +11905,14 @@
                 <a:latin typeface="DejaVu Sans"/>
                 <a:ea typeface="DejaVu Sans"/>
               </a:rPr>
-              <a:t>13.06.2022 → Circular Economy II (L07)</a:t>
-            </a:r>
-            <a:endParaRPr b="0" lang="en-US" sz="1800" spc="-1" strike="noStrike">
-              <a:latin typeface="Arial"/>
-            </a:endParaRPr>
-          </a:p>
-          <a:p>
-            <a:pPr marL="195120" indent="-189720">
+              <a:t>13.06.2022 → Circular Economy I (L07)</a:t>
+            </a:r>
+            <a:endParaRPr b="0" lang="en-US" sz="1800" spc="-1" strike="noStrike">
+              <a:latin typeface="Arial"/>
+            </a:endParaRPr>
+          </a:p>
+          <a:p>
+            <a:pPr marL="195120" indent="-189360">
               <a:lnSpc>
                 <a:spcPct val="100000"/>
               </a:lnSpc>
@@ -11915,14 +11934,14 @@
                 <a:latin typeface="DejaVu Sans"/>
                 <a:ea typeface="DejaVu Sans"/>
               </a:rPr>
-              <a:t>20.06.2022 → Beyond the Circular Economy (L08)</a:t>
-            </a:r>
-            <a:endParaRPr b="0" lang="en-US" sz="1800" spc="-1" strike="noStrike">
-              <a:latin typeface="Arial"/>
-            </a:endParaRPr>
-          </a:p>
-          <a:p>
-            <a:pPr marL="195120" indent="-189720">
+              <a:t>20.06.2022 → Circular Economy II (L08)</a:t>
+            </a:r>
+            <a:endParaRPr b="0" lang="en-US" sz="1800" spc="-1" strike="noStrike">
+              <a:latin typeface="Arial"/>
+            </a:endParaRPr>
+          </a:p>
+          <a:p>
+            <a:pPr marL="195120" indent="-189360">
               <a:lnSpc>
                 <a:spcPct val="100000"/>
               </a:lnSpc>
@@ -11944,14 +11963,14 @@
                 <a:latin typeface="DejaVu Sans"/>
                 <a:ea typeface="DejaVu Sans"/>
               </a:rPr>
-              <a:t>27.06.2022 → Technology for Sustainability (L09)</a:t>
-            </a:r>
-            <a:endParaRPr b="0" lang="en-US" sz="1800" spc="-1" strike="noStrike">
-              <a:latin typeface="Arial"/>
-            </a:endParaRPr>
-          </a:p>
-          <a:p>
-            <a:pPr marL="195120" indent="-189720">
+              <a:t>27.06.2022 → Beyond the Circular Economy (L09)</a:t>
+            </a:r>
+            <a:endParaRPr b="0" lang="en-US" sz="1800" spc="-1" strike="noStrike">
+              <a:latin typeface="Arial"/>
+            </a:endParaRPr>
+          </a:p>
+          <a:p>
+            <a:pPr marL="195120" indent="-189360">
               <a:lnSpc>
                 <a:spcPct val="100000"/>
               </a:lnSpc>
@@ -11973,14 +11992,14 @@
                 <a:latin typeface="DejaVu Sans"/>
                 <a:ea typeface="DejaVu Sans"/>
               </a:rPr>
-              <a:t>04.07.2022 → Action Plan</a:t>
-            </a:r>
-            <a:endParaRPr b="0" lang="en-US" sz="1800" spc="-1" strike="noStrike">
-              <a:latin typeface="Arial"/>
-            </a:endParaRPr>
-          </a:p>
-          <a:p>
-            <a:pPr marL="195120" indent="-189720">
+              <a:t>04.07.2022 → Technologies for Sustainability (L10)</a:t>
+            </a:r>
+            <a:endParaRPr b="0" lang="en-US" sz="1800" spc="-1" strike="noStrike">
+              <a:latin typeface="Arial"/>
+            </a:endParaRPr>
+          </a:p>
+          <a:p>
+            <a:pPr marL="195120" indent="-189360">
               <a:lnSpc>
                 <a:spcPct val="100000"/>
               </a:lnSpc>
@@ -12002,14 +12021,14 @@
                 <a:latin typeface="DejaVu Sans"/>
                 <a:ea typeface="DejaVu Sans"/>
               </a:rPr>
-              <a:t>11.07.2022 → Invited Lecture</a:t>
-            </a:r>
-            <a:endParaRPr b="0" lang="en-US" sz="1800" spc="-1" strike="noStrike">
-              <a:latin typeface="Arial"/>
-            </a:endParaRPr>
-          </a:p>
-          <a:p>
-            <a:pPr marL="195120" indent="-189720">
+              <a:t>11.07.2022 → Action Plan (L11)</a:t>
+            </a:r>
+            <a:endParaRPr b="0" lang="en-US" sz="1800" spc="-1" strike="noStrike">
+              <a:latin typeface="Arial"/>
+            </a:endParaRPr>
+          </a:p>
+          <a:p>
+            <a:pPr marL="195120" indent="-189360">
               <a:lnSpc>
                 <a:spcPct val="100000"/>
               </a:lnSpc>
@@ -12038,7 +12057,7 @@
             </a:endParaRPr>
           </a:p>
           <a:p>
-            <a:pPr marL="195120" indent="-189720">
+            <a:pPr marL="195120" indent="-189360">
               <a:lnSpc>
                 <a:spcPct val="100000"/>
               </a:lnSpc>
@@ -12060,7 +12079,7 @@
                 <a:latin typeface="DejaVu Sans"/>
                 <a:ea typeface="DejaVu Sans"/>
               </a:rPr>
-              <a:t>25.07.2022 → Backup</a:t>
+              <a:t>25.07.2022 → Invited Lecture</a:t>
             </a:r>
             <a:endParaRPr b="0" lang="en-US" sz="1800" spc="-1" strike="noStrike">
               <a:latin typeface="Arial"/>

</xml_diff>

<commit_message>
* extended the LTG L00 literature list and added some recmommendations for global warming fundamentals
</commit_message>
<xml_diff>
--- a/The-Limits-to-Growth/LTG-L00-Organization.pptx
+++ b/The-Limits-to-Growth/LTG-L00-Organization.pptx
@@ -27,6 +27,7 @@
     <p:sldId id="271" r:id="rId20"/>
     <p:sldId id="272" r:id="rId21"/>
     <p:sldId id="273" r:id="rId22"/>
+    <p:sldId id="274" r:id="rId23"/>
   </p:sldIdLst>
   <p:sldSz cx="12192000" cy="6858000"/>
   <p:notesSz cx="7772400" cy="10058400"/>
@@ -257,7 +258,7 @@
           </a:bodyPr>
           <a:p>
             <a:pPr algn="r"/>
-            <a:fld id="{40A5E58D-9C78-453D-91FB-9E0E46DEAC5A}" type="slidenum">
+            <a:fld id="{4B28F0B8-28E6-45A2-8A96-24CAA2002DDC}" type="slidenum">
               <a:rPr b="0" lang="en-US" sz="1400" spc="-1" strike="noStrike">
                 <a:latin typeface="Times New Roman"/>
               </a:rPr>
@@ -294,7 +295,7 @@
       </p:grpSpPr>
       <p:sp>
         <p:nvSpPr>
-          <p:cNvPr id="144" name="PlaceHolder 1"/>
+          <p:cNvPr id="146" name="PlaceHolder 1"/>
           <p:cNvSpPr>
             <a:spLocks noGrp="1"/>
           </p:cNvSpPr>
@@ -305,16 +306,16 @@
         <p:spPr>
           <a:xfrm>
             <a:off x="533520" y="763560"/>
-            <a:ext cx="6695640" cy="3763800"/>
-          </a:xfrm>
-          <a:prstGeom prst="rect">
-            <a:avLst/>
-          </a:prstGeom>
-        </p:spPr>
-      </p:sp>
-      <p:sp>
-        <p:nvSpPr>
-          <p:cNvPr id="145" name="PlaceHolder 2"/>
+            <a:ext cx="6695280" cy="3763440"/>
+          </a:xfrm>
+          <a:prstGeom prst="rect">
+            <a:avLst/>
+          </a:prstGeom>
+        </p:spPr>
+      </p:sp>
+      <p:sp>
+        <p:nvSpPr>
+          <p:cNvPr id="147" name="PlaceHolder 2"/>
           <p:cNvSpPr>
             <a:spLocks noGrp="1"/>
           </p:cNvSpPr>
@@ -325,7 +326,7 @@
         <p:spPr>
           <a:xfrm>
             <a:off x="777240" y="4777560"/>
-            <a:ext cx="6209280" cy="4517640"/>
+            <a:ext cx="6208920" cy="4517280"/>
           </a:xfrm>
           <a:prstGeom prst="rect">
             <a:avLst/>
@@ -344,14 +345,14 @@
       </p:sp>
       <p:sp>
         <p:nvSpPr>
-          <p:cNvPr id="146" name="CustomShape 3"/>
+          <p:cNvPr id="148" name="CustomShape 3"/>
           <p:cNvSpPr/>
           <p:nvPr/>
         </p:nvSpPr>
         <p:spPr>
           <a:xfrm>
             <a:off x="4399200" y="9555480"/>
-            <a:ext cx="3364560" cy="494280"/>
+            <a:ext cx="3364200" cy="493920"/>
           </a:xfrm>
           <a:prstGeom prst="rect">
             <a:avLst/>
@@ -377,7 +378,7 @@
                 <a:spcPct val="100000"/>
               </a:lnSpc>
             </a:pPr>
-            <a:fld id="{3679EC8B-6A9C-430F-B5DF-7817855B1B7B}" type="slidenum">
+            <a:fld id="{3A237621-4CE2-4EE1-BED8-F1EDB3538D63}" type="slidenum">
               <a:rPr b="0" lang="de-DE" sz="1800" spc="-1" strike="noStrike">
                 <a:solidFill>
                   <a:srgbClr val="000000"/>
@@ -385,7 +386,7 @@
                 <a:latin typeface="+mn-lt"/>
                 <a:ea typeface="+mn-ea"/>
               </a:rPr>
-              <a:t>8</a:t>
+              <a:t>&lt;number&gt;</a:t>
             </a:fld>
             <a:endParaRPr b="0" lang="en-US" sz="1800" spc="-1" strike="noStrike">
               <a:latin typeface="Arial"/>
@@ -417,7 +418,7 @@
       </p:grpSpPr>
       <p:sp>
         <p:nvSpPr>
-          <p:cNvPr id="147" name="PlaceHolder 1"/>
+          <p:cNvPr id="149" name="PlaceHolder 1"/>
           <p:cNvSpPr>
             <a:spLocks noGrp="1"/>
           </p:cNvSpPr>
@@ -428,16 +429,16 @@
         <p:spPr>
           <a:xfrm>
             <a:off x="533520" y="763560"/>
-            <a:ext cx="6695640" cy="3763800"/>
-          </a:xfrm>
-          <a:prstGeom prst="rect">
-            <a:avLst/>
-          </a:prstGeom>
-        </p:spPr>
-      </p:sp>
-      <p:sp>
-        <p:nvSpPr>
-          <p:cNvPr id="148" name="PlaceHolder 2"/>
+            <a:ext cx="6695280" cy="3763440"/>
+          </a:xfrm>
+          <a:prstGeom prst="rect">
+            <a:avLst/>
+          </a:prstGeom>
+        </p:spPr>
+      </p:sp>
+      <p:sp>
+        <p:nvSpPr>
+          <p:cNvPr id="150" name="PlaceHolder 2"/>
           <p:cNvSpPr>
             <a:spLocks noGrp="1"/>
           </p:cNvSpPr>
@@ -448,7 +449,7 @@
         <p:spPr>
           <a:xfrm>
             <a:off x="777240" y="4777560"/>
-            <a:ext cx="6209280" cy="4517640"/>
+            <a:ext cx="6208920" cy="4517280"/>
           </a:xfrm>
           <a:prstGeom prst="rect">
             <a:avLst/>
@@ -467,14 +468,14 @@
       </p:sp>
       <p:sp>
         <p:nvSpPr>
-          <p:cNvPr id="149" name="CustomShape 3"/>
+          <p:cNvPr id="151" name="CustomShape 3"/>
           <p:cNvSpPr/>
           <p:nvPr/>
         </p:nvSpPr>
         <p:spPr>
           <a:xfrm>
             <a:off x="4399200" y="9555480"/>
-            <a:ext cx="3364560" cy="494280"/>
+            <a:ext cx="3364200" cy="493920"/>
           </a:xfrm>
           <a:prstGeom prst="rect">
             <a:avLst/>
@@ -500,7 +501,7 @@
                 <a:spcPct val="100000"/>
               </a:lnSpc>
             </a:pPr>
-            <a:fld id="{43614119-A1EE-4C9D-A613-066869C54B6A}" type="slidenum">
+            <a:fld id="{8B5A766D-C7DA-45FE-B083-0949704A4CF3}" type="slidenum">
               <a:rPr b="0" lang="de-DE" sz="1800" spc="-1" strike="noStrike">
                 <a:solidFill>
                   <a:srgbClr val="000000"/>
@@ -508,7 +509,7 @@
                 <a:latin typeface="+mn-lt"/>
                 <a:ea typeface="+mn-ea"/>
               </a:rPr>
-              <a:t>8</a:t>
+              <a:t>&lt;number&gt;</a:t>
             </a:fld>
             <a:endParaRPr b="0" lang="en-US" sz="1800" spc="-1" strike="noStrike">
               <a:latin typeface="Arial"/>
@@ -540,7 +541,7 @@
       </p:grpSpPr>
       <p:sp>
         <p:nvSpPr>
-          <p:cNvPr id="150" name="PlaceHolder 1"/>
+          <p:cNvPr id="152" name="PlaceHolder 1"/>
           <p:cNvSpPr>
             <a:spLocks noGrp="1"/>
           </p:cNvSpPr>
@@ -551,16 +552,16 @@
         <p:spPr>
           <a:xfrm>
             <a:off x="533520" y="763560"/>
-            <a:ext cx="6695640" cy="3763800"/>
-          </a:xfrm>
-          <a:prstGeom prst="rect">
-            <a:avLst/>
-          </a:prstGeom>
-        </p:spPr>
-      </p:sp>
-      <p:sp>
-        <p:nvSpPr>
-          <p:cNvPr id="151" name="PlaceHolder 2"/>
+            <a:ext cx="6695280" cy="3763440"/>
+          </a:xfrm>
+          <a:prstGeom prst="rect">
+            <a:avLst/>
+          </a:prstGeom>
+        </p:spPr>
+      </p:sp>
+      <p:sp>
+        <p:nvSpPr>
+          <p:cNvPr id="153" name="PlaceHolder 2"/>
           <p:cNvSpPr>
             <a:spLocks noGrp="1"/>
           </p:cNvSpPr>
@@ -571,7 +572,7 @@
         <p:spPr>
           <a:xfrm>
             <a:off x="777240" y="4777560"/>
-            <a:ext cx="6209280" cy="4517640"/>
+            <a:ext cx="6208920" cy="4517280"/>
           </a:xfrm>
           <a:prstGeom prst="rect">
             <a:avLst/>
@@ -590,14 +591,14 @@
       </p:sp>
       <p:sp>
         <p:nvSpPr>
-          <p:cNvPr id="152" name="CustomShape 3"/>
+          <p:cNvPr id="154" name="CustomShape 3"/>
           <p:cNvSpPr/>
           <p:nvPr/>
         </p:nvSpPr>
         <p:spPr>
           <a:xfrm>
             <a:off x="4399200" y="9555480"/>
-            <a:ext cx="3364560" cy="494280"/>
+            <a:ext cx="3364200" cy="493920"/>
           </a:xfrm>
           <a:prstGeom prst="rect">
             <a:avLst/>
@@ -623,7 +624,7 @@
                 <a:spcPct val="100000"/>
               </a:lnSpc>
             </a:pPr>
-            <a:fld id="{7E1124FD-999C-48F9-818B-DC5913D536A9}" type="slidenum">
+            <a:fld id="{842A4DC3-3F7D-44E9-A589-19BA5D743226}" type="slidenum">
               <a:rPr b="0" lang="de-DE" sz="1800" spc="-1" strike="noStrike">
                 <a:solidFill>
                   <a:srgbClr val="000000"/>
@@ -631,7 +632,7 @@
                 <a:latin typeface="+mn-lt"/>
                 <a:ea typeface="+mn-ea"/>
               </a:rPr>
-              <a:t>8</a:t>
+              <a:t>&lt;number&gt;</a:t>
             </a:fld>
             <a:endParaRPr b="0" lang="en-US" sz="1800" spc="-1" strike="noStrike">
               <a:latin typeface="Arial"/>
@@ -663,7 +664,7 @@
       </p:grpSpPr>
       <p:sp>
         <p:nvSpPr>
-          <p:cNvPr id="153" name="PlaceHolder 1"/>
+          <p:cNvPr id="155" name="PlaceHolder 1"/>
           <p:cNvSpPr>
             <a:spLocks noGrp="1"/>
           </p:cNvSpPr>
@@ -674,16 +675,16 @@
         <p:spPr>
           <a:xfrm>
             <a:off x="533520" y="763560"/>
-            <a:ext cx="6695640" cy="3763800"/>
-          </a:xfrm>
-          <a:prstGeom prst="rect">
-            <a:avLst/>
-          </a:prstGeom>
-        </p:spPr>
-      </p:sp>
-      <p:sp>
-        <p:nvSpPr>
-          <p:cNvPr id="154" name="PlaceHolder 2"/>
+            <a:ext cx="6695280" cy="3763440"/>
+          </a:xfrm>
+          <a:prstGeom prst="rect">
+            <a:avLst/>
+          </a:prstGeom>
+        </p:spPr>
+      </p:sp>
+      <p:sp>
+        <p:nvSpPr>
+          <p:cNvPr id="156" name="PlaceHolder 2"/>
           <p:cNvSpPr>
             <a:spLocks noGrp="1"/>
           </p:cNvSpPr>
@@ -694,7 +695,7 @@
         <p:spPr>
           <a:xfrm>
             <a:off x="777240" y="4777560"/>
-            <a:ext cx="6209280" cy="4517640"/>
+            <a:ext cx="6208920" cy="4517280"/>
           </a:xfrm>
           <a:prstGeom prst="rect">
             <a:avLst/>
@@ -713,14 +714,14 @@
       </p:sp>
       <p:sp>
         <p:nvSpPr>
-          <p:cNvPr id="155" name="CustomShape 3"/>
+          <p:cNvPr id="157" name="CustomShape 3"/>
           <p:cNvSpPr/>
           <p:nvPr/>
         </p:nvSpPr>
         <p:spPr>
           <a:xfrm>
             <a:off x="4399200" y="9555480"/>
-            <a:ext cx="3364560" cy="494280"/>
+            <a:ext cx="3364200" cy="493920"/>
           </a:xfrm>
           <a:prstGeom prst="rect">
             <a:avLst/>
@@ -746,7 +747,7 @@
                 <a:spcPct val="100000"/>
               </a:lnSpc>
             </a:pPr>
-            <a:fld id="{9CFE7457-0593-4840-8895-4FC80073C5FA}" type="slidenum">
+            <a:fld id="{3749BCBD-4973-4906-A48D-F8626D8C0836}" type="slidenum">
               <a:rPr b="0" lang="de-DE" sz="1800" spc="-1" strike="noStrike">
                 <a:solidFill>
                   <a:srgbClr val="000000"/>
@@ -786,7 +787,7 @@
       </p:grpSpPr>
       <p:sp>
         <p:nvSpPr>
-          <p:cNvPr id="156" name="PlaceHolder 1"/>
+          <p:cNvPr id="158" name="PlaceHolder 1"/>
           <p:cNvSpPr>
             <a:spLocks noGrp="1"/>
           </p:cNvSpPr>
@@ -797,16 +798,16 @@
         <p:spPr>
           <a:xfrm>
             <a:off x="533520" y="763560"/>
-            <a:ext cx="6695640" cy="3763800"/>
-          </a:xfrm>
-          <a:prstGeom prst="rect">
-            <a:avLst/>
-          </a:prstGeom>
-        </p:spPr>
-      </p:sp>
-      <p:sp>
-        <p:nvSpPr>
-          <p:cNvPr id="157" name="PlaceHolder 2"/>
+            <a:ext cx="6695280" cy="3763440"/>
+          </a:xfrm>
+          <a:prstGeom prst="rect">
+            <a:avLst/>
+          </a:prstGeom>
+        </p:spPr>
+      </p:sp>
+      <p:sp>
+        <p:nvSpPr>
+          <p:cNvPr id="159" name="PlaceHolder 2"/>
           <p:cNvSpPr>
             <a:spLocks noGrp="1"/>
           </p:cNvSpPr>
@@ -817,7 +818,7 @@
         <p:spPr>
           <a:xfrm>
             <a:off x="777240" y="4777560"/>
-            <a:ext cx="6209280" cy="4517640"/>
+            <a:ext cx="6208920" cy="4517280"/>
           </a:xfrm>
           <a:prstGeom prst="rect">
             <a:avLst/>
@@ -836,14 +837,14 @@
       </p:sp>
       <p:sp>
         <p:nvSpPr>
-          <p:cNvPr id="158" name="CustomShape 3"/>
+          <p:cNvPr id="160" name="CustomShape 3"/>
           <p:cNvSpPr/>
           <p:nvPr/>
         </p:nvSpPr>
         <p:spPr>
           <a:xfrm>
             <a:off x="4399200" y="9555480"/>
-            <a:ext cx="3364560" cy="494280"/>
+            <a:ext cx="3364200" cy="493920"/>
           </a:xfrm>
           <a:prstGeom prst="rect">
             <a:avLst/>
@@ -869,7 +870,7 @@
                 <a:spcPct val="100000"/>
               </a:lnSpc>
             </a:pPr>
-            <a:fld id="{FE656139-ED73-43A6-AA0A-B939A8B66CEC}" type="slidenum">
+            <a:fld id="{74F3D403-F1E9-4453-A4F4-F470476A86C1}" type="slidenum">
               <a:rPr b="0" lang="de-DE" sz="1800" spc="-1" strike="noStrike">
                 <a:solidFill>
                   <a:srgbClr val="000000"/>
@@ -3635,7 +3636,7 @@
         <p:spPr>
           <a:xfrm>
             <a:off x="11444760" y="0"/>
-            <a:ext cx="742680" cy="6851520"/>
+            <a:ext cx="742320" cy="6851160"/>
           </a:xfrm>
           <a:prstGeom prst="rect">
             <a:avLst/>
@@ -3665,7 +3666,7 @@
         <p:spPr>
           <a:xfrm>
             <a:off x="11438640" y="6453360"/>
-            <a:ext cx="759600" cy="363960"/>
+            <a:ext cx="759240" cy="363960"/>
           </a:xfrm>
           <a:prstGeom prst="rect">
             <a:avLst/>
@@ -3691,7 +3692,7 @@
                 <a:spcPct val="100000"/>
               </a:lnSpc>
             </a:pPr>
-            <a:fld id="{E294221B-D5B9-41FE-82E9-9B413819E5EC}" type="slidenum">
+            <a:fld id="{45FAEB25-36C3-409F-8FA3-858EA52B074D}" type="slidenum">
               <a:rPr b="0" lang="en-US" sz="1800" spc="-1" strike="noStrike">
                 <a:solidFill>
                   <a:srgbClr val="808080"/>
@@ -3716,7 +3717,7 @@
         <p:spPr>
           <a:xfrm>
             <a:off x="912240" y="1268280"/>
-            <a:ext cx="9209520" cy="362880"/>
+            <a:ext cx="9209160" cy="362520"/>
           </a:xfrm>
           <a:prstGeom prst="rect">
             <a:avLst/>
@@ -3746,7 +3747,7 @@
         <p:spPr>
           <a:xfrm>
             <a:off x="0" y="0"/>
-            <a:ext cx="3053520" cy="563400"/>
+            <a:ext cx="3053160" cy="563040"/>
           </a:xfrm>
           <a:prstGeom prst="rect">
             <a:avLst/>
@@ -3769,7 +3770,7 @@
         <p:spPr>
           <a:xfrm>
             <a:off x="7430400" y="134640"/>
-            <a:ext cx="3699360" cy="515520"/>
+            <a:ext cx="3699000" cy="515160"/>
           </a:xfrm>
           <a:prstGeom prst="rect">
             <a:avLst/>
@@ -3788,7 +3789,7 @@
         <p:spPr>
           <a:xfrm>
             <a:off x="912240" y="1268280"/>
-            <a:ext cx="9209520" cy="362880"/>
+            <a:ext cx="9209160" cy="362520"/>
           </a:xfrm>
           <a:prstGeom prst="rect">
             <a:avLst/>
@@ -3814,7 +3815,7 @@
         <p:spPr>
           <a:xfrm>
             <a:off x="11444760" y="0"/>
-            <a:ext cx="742680" cy="6851520"/>
+            <a:ext cx="742320" cy="6851160"/>
           </a:xfrm>
           <a:prstGeom prst="rect">
             <a:avLst/>
@@ -3844,7 +3845,7 @@
         <p:spPr>
           <a:xfrm>
             <a:off x="0" y="6642720"/>
-            <a:ext cx="12185640" cy="211320"/>
+            <a:ext cx="12185280" cy="211320"/>
           </a:xfrm>
           <a:prstGeom prst="rect">
             <a:avLst/>
@@ -4155,7 +4156,7 @@
         <p:spPr>
           <a:xfrm>
             <a:off x="11444760" y="0"/>
-            <a:ext cx="742680" cy="6851520"/>
+            <a:ext cx="742320" cy="6851160"/>
           </a:xfrm>
           <a:prstGeom prst="rect">
             <a:avLst/>
@@ -4185,7 +4186,7 @@
         <p:spPr>
           <a:xfrm>
             <a:off x="11438640" y="6453360"/>
-            <a:ext cx="759600" cy="363960"/>
+            <a:ext cx="759240" cy="363960"/>
           </a:xfrm>
           <a:prstGeom prst="rect">
             <a:avLst/>
@@ -4211,7 +4212,7 @@
                 <a:spcPct val="100000"/>
               </a:lnSpc>
             </a:pPr>
-            <a:fld id="{DF6128A4-B24E-462B-8EE6-7624DA0DD893}" type="slidenum">
+            <a:fld id="{39C4D889-09C3-482F-AFC7-B479BA88DEF6}" type="slidenum">
               <a:rPr b="0" lang="en-US" sz="1800" spc="-1" strike="noStrike">
                 <a:solidFill>
                   <a:srgbClr val="808080"/>
@@ -4236,7 +4237,7 @@
         <p:spPr>
           <a:xfrm>
             <a:off x="912240" y="1268280"/>
-            <a:ext cx="9209520" cy="362880"/>
+            <a:ext cx="9209160" cy="362520"/>
           </a:xfrm>
           <a:prstGeom prst="rect">
             <a:avLst/>
@@ -4266,7 +4267,7 @@
         <p:spPr>
           <a:xfrm>
             <a:off x="0" y="0"/>
-            <a:ext cx="3053520" cy="563400"/>
+            <a:ext cx="3053160" cy="563040"/>
           </a:xfrm>
           <a:prstGeom prst="rect">
             <a:avLst/>
@@ -4289,7 +4290,7 @@
         <p:spPr>
           <a:xfrm>
             <a:off x="7430400" y="134640"/>
-            <a:ext cx="3699360" cy="515520"/>
+            <a:ext cx="3699000" cy="515160"/>
           </a:xfrm>
           <a:prstGeom prst="rect">
             <a:avLst/>
@@ -4308,7 +4309,7 @@
         <p:spPr>
           <a:xfrm>
             <a:off x="11444760" y="0"/>
-            <a:ext cx="742680" cy="6851520"/>
+            <a:ext cx="742320" cy="6851160"/>
           </a:xfrm>
           <a:prstGeom prst="rect">
             <a:avLst/>
@@ -4338,7 +4339,7 @@
         <p:spPr>
           <a:xfrm>
             <a:off x="11438640" y="6453360"/>
-            <a:ext cx="759600" cy="363960"/>
+            <a:ext cx="759240" cy="363960"/>
           </a:xfrm>
           <a:prstGeom prst="rect">
             <a:avLst/>
@@ -4364,7 +4365,7 @@
                 <a:spcPct val="100000"/>
               </a:lnSpc>
             </a:pPr>
-            <a:fld id="{C0BE9AD6-F7BA-4870-8910-8EB1C416D8AC}" type="slidenum">
+            <a:fld id="{26633E3B-1C47-4214-B58F-DEE30A0E8F48}" type="slidenum">
               <a:rPr b="0" lang="en-US" sz="1800" spc="-1" strike="noStrike">
                 <a:solidFill>
                   <a:srgbClr val="808080"/>
@@ -4389,7 +4390,7 @@
         <p:spPr>
           <a:xfrm>
             <a:off x="0" y="6642720"/>
-            <a:ext cx="12185640" cy="211320"/>
+            <a:ext cx="12185280" cy="211320"/>
           </a:xfrm>
           <a:prstGeom prst="rect">
             <a:avLst/>
@@ -4693,7 +4694,7 @@
         <p:spPr>
           <a:xfrm>
             <a:off x="527400" y="1412640"/>
-            <a:ext cx="10362600" cy="1149120"/>
+            <a:ext cx="10362240" cy="1148760"/>
           </a:xfrm>
           <a:prstGeom prst="rect">
             <a:avLst/>
@@ -4744,7 +4745,7 @@
         <p:spPr>
           <a:xfrm>
             <a:off x="527400" y="2852640"/>
-            <a:ext cx="10362600" cy="2369880"/>
+            <a:ext cx="10362240" cy="2369520"/>
           </a:xfrm>
           <a:prstGeom prst="rect">
             <a:avLst/>
@@ -4941,7 +4942,7 @@
         <p:spPr>
           <a:xfrm>
             <a:off x="335520" y="764640"/>
-            <a:ext cx="10746720" cy="497520"/>
+            <a:ext cx="10746360" cy="497160"/>
           </a:xfrm>
           <a:prstGeom prst="rect">
             <a:avLst/>
@@ -4992,7 +4993,7 @@
         <p:spPr>
           <a:xfrm>
             <a:off x="335520" y="1268280"/>
-            <a:ext cx="10746720" cy="5034240"/>
+            <a:ext cx="10746360" cy="5033880"/>
           </a:xfrm>
           <a:prstGeom prst="rect">
             <a:avLst/>
@@ -5013,7 +5014,7 @@
             <a:noAutofit/>
           </a:bodyPr>
           <a:p>
-            <a:pPr marL="195120" indent="-189360">
+            <a:pPr marL="195120" indent="-189000">
               <a:lnSpc>
                 <a:spcPct val="100000"/>
               </a:lnSpc>
@@ -5077,7 +5078,7 @@
             </a:endParaRPr>
           </a:p>
           <a:p>
-            <a:pPr marL="195120" indent="-189360">
+            <a:pPr marL="195120" indent="-189000">
               <a:lnSpc>
                 <a:spcPct val="100000"/>
               </a:lnSpc>
@@ -5106,7 +5107,7 @@
             </a:endParaRPr>
           </a:p>
           <a:p>
-            <a:pPr lvl="1" marL="432000" indent="-212040">
+            <a:pPr lvl="1" marL="432000" indent="-211680">
               <a:lnSpc>
                 <a:spcPct val="100000"/>
               </a:lnSpc>
@@ -5157,7 +5158,7 @@
             </a:endParaRPr>
           </a:p>
           <a:p>
-            <a:pPr lvl="1" marL="432000" indent="-212040">
+            <a:pPr lvl="1" marL="432000" indent="-211680">
               <a:lnSpc>
                 <a:spcPct val="100000"/>
               </a:lnSpc>
@@ -5221,7 +5222,7 @@
             </a:endParaRPr>
           </a:p>
           <a:p>
-            <a:pPr marL="195120" indent="-189360">
+            <a:pPr marL="195120" indent="-189000">
               <a:lnSpc>
                 <a:spcPct val="100000"/>
               </a:lnSpc>
@@ -5294,7 +5295,7 @@
             </a:endParaRPr>
           </a:p>
           <a:p>
-            <a:pPr lvl="1" marL="744120" indent="-281160">
+            <a:pPr lvl="1" marL="744120" indent="-280800">
               <a:lnSpc>
                 <a:spcPct val="100000"/>
               </a:lnSpc>
@@ -5336,7 +5337,7 @@
             </a:endParaRPr>
           </a:p>
           <a:p>
-            <a:pPr marL="195120" indent="-189360">
+            <a:pPr marL="195120" indent="-189000">
               <a:lnSpc>
                 <a:spcPct val="100000"/>
               </a:lnSpc>
@@ -5378,7 +5379,7 @@
             </a:endParaRPr>
           </a:p>
           <a:p>
-            <a:pPr marL="195120" indent="-189360" algn="ctr">
+            <a:pPr marL="195120" indent="-189000" algn="ctr">
               <a:lnSpc>
                 <a:spcPct val="100000"/>
               </a:lnSpc>
@@ -5500,7 +5501,7 @@
         <p:spPr>
           <a:xfrm>
             <a:off x="335520" y="764640"/>
-            <a:ext cx="10746720" cy="497520"/>
+            <a:ext cx="10746360" cy="497160"/>
           </a:xfrm>
           <a:prstGeom prst="rect">
             <a:avLst/>
@@ -5571,7 +5572,7 @@
         <p:spPr>
           <a:xfrm>
             <a:off x="335520" y="1268640"/>
-            <a:ext cx="10746720" cy="5034240"/>
+            <a:ext cx="10746360" cy="5033880"/>
           </a:xfrm>
           <a:prstGeom prst="rect">
             <a:avLst/>
@@ -5592,7 +5593,7 @@
             <a:noAutofit/>
           </a:bodyPr>
           <a:p>
-            <a:pPr marL="195120" indent="-189360">
+            <a:pPr marL="195120" indent="-189000">
               <a:lnSpc>
                 <a:spcPct val="100000"/>
               </a:lnSpc>
@@ -5632,7 +5633,7 @@
             </a:endParaRPr>
           </a:p>
           <a:p>
-            <a:pPr lvl="1" marL="432000" indent="-212040">
+            <a:pPr lvl="1" marL="432000" indent="-211680">
               <a:lnSpc>
                 <a:spcPct val="100000"/>
               </a:lnSpc>
@@ -5681,7 +5682,7 @@
             </a:endParaRPr>
           </a:p>
           <a:p>
-            <a:pPr lvl="1" marL="432000" indent="-212040">
+            <a:pPr lvl="1" marL="432000" indent="-211680">
               <a:lnSpc>
                 <a:spcPct val="100000"/>
               </a:lnSpc>
@@ -5723,7 +5724,7 @@
             </a:endParaRPr>
           </a:p>
           <a:p>
-            <a:pPr marL="195120" indent="-189360">
+            <a:pPr marL="195120" indent="-189000">
               <a:lnSpc>
                 <a:spcPct val="100000"/>
               </a:lnSpc>
@@ -5753,7 +5754,7 @@
             </a:endParaRPr>
           </a:p>
           <a:p>
-            <a:pPr lvl="1" marL="432000" indent="-212040">
+            <a:pPr lvl="1" marL="432000" indent="-211680">
               <a:lnSpc>
                 <a:spcPct val="100000"/>
               </a:lnSpc>
@@ -5842,7 +5843,7 @@
             </a:endParaRPr>
           </a:p>
           <a:p>
-            <a:pPr lvl="1" marL="432000" indent="-212040">
+            <a:pPr lvl="1" marL="432000" indent="-211680">
               <a:lnSpc>
                 <a:spcPct val="100000"/>
               </a:lnSpc>
@@ -5893,7 +5894,7 @@
             </a:endParaRPr>
           </a:p>
           <a:p>
-            <a:pPr marL="195120" indent="-189360">
+            <a:pPr marL="195120" indent="-189000">
               <a:lnSpc>
                 <a:spcPct val="100000"/>
               </a:lnSpc>
@@ -5923,7 +5924,7 @@
             </a:endParaRPr>
           </a:p>
           <a:p>
-            <a:pPr lvl="1" marL="432000" indent="-212040">
+            <a:pPr lvl="1" marL="432000" indent="-211680">
               <a:lnSpc>
                 <a:spcPct val="100000"/>
               </a:lnSpc>
@@ -6032,7 +6033,7 @@
             </a:endParaRPr>
           </a:p>
           <a:p>
-            <a:pPr lvl="1" marL="432000" indent="-212040">
+            <a:pPr lvl="1" marL="432000" indent="-211680">
               <a:lnSpc>
                 <a:spcPct val="100000"/>
               </a:lnSpc>
@@ -6123,7 +6124,7 @@
         <p:spPr>
           <a:xfrm>
             <a:off x="335520" y="764640"/>
-            <a:ext cx="10746720" cy="497520"/>
+            <a:ext cx="10746360" cy="497160"/>
           </a:xfrm>
           <a:prstGeom prst="rect">
             <a:avLst/>
@@ -6174,7 +6175,7 @@
         <p:spPr>
           <a:xfrm>
             <a:off x="335520" y="1268280"/>
-            <a:ext cx="10746720" cy="5034240"/>
+            <a:ext cx="10746360" cy="5033880"/>
           </a:xfrm>
           <a:prstGeom prst="rect">
             <a:avLst/>
@@ -6218,7 +6219,7 @@
             </a:endParaRPr>
           </a:p>
           <a:p>
-            <a:pPr marL="195120" indent="-189360">
+            <a:pPr marL="195120" indent="-189000">
               <a:lnSpc>
                 <a:spcPct val="100000"/>
               </a:lnSpc>
@@ -6287,7 +6288,7 @@
             </a:endParaRPr>
           </a:p>
           <a:p>
-            <a:pPr marL="195120" indent="-189360">
+            <a:pPr marL="195120" indent="-189000">
               <a:lnSpc>
                 <a:spcPct val="100000"/>
               </a:lnSpc>
@@ -6346,7 +6347,7 @@
             </a:endParaRPr>
           </a:p>
           <a:p>
-            <a:pPr marL="195120" indent="-189360">
+            <a:pPr marL="195120" indent="-189000">
               <a:lnSpc>
                 <a:spcPct val="100000"/>
               </a:lnSpc>
@@ -6375,7 +6376,7 @@
             </a:endParaRPr>
           </a:p>
           <a:p>
-            <a:pPr marL="195120" indent="-189360">
+            <a:pPr marL="195120" indent="-189000">
               <a:lnSpc>
                 <a:spcPct val="100000"/>
               </a:lnSpc>
@@ -6404,7 +6405,7 @@
             </a:endParaRPr>
           </a:p>
           <a:p>
-            <a:pPr marL="195120" indent="-189360">
+            <a:pPr marL="195120" indent="-189000">
               <a:lnSpc>
                 <a:spcPct val="100000"/>
               </a:lnSpc>
@@ -6673,7 +6674,7 @@
         <p:spPr>
           <a:xfrm>
             <a:off x="335520" y="764640"/>
-            <a:ext cx="10746720" cy="497520"/>
+            <a:ext cx="10746360" cy="497160"/>
           </a:xfrm>
           <a:prstGeom prst="rect">
             <a:avLst/>
@@ -6724,7 +6725,7 @@
         <p:spPr>
           <a:xfrm>
             <a:off x="335520" y="1268280"/>
-            <a:ext cx="10746720" cy="5034240"/>
+            <a:ext cx="10746360" cy="5033880"/>
           </a:xfrm>
           <a:prstGeom prst="rect">
             <a:avLst/>
@@ -6768,7 +6769,7 @@
             </a:endParaRPr>
           </a:p>
           <a:p>
-            <a:pPr marL="195120" indent="-189360">
+            <a:pPr marL="195120" indent="-189000">
               <a:lnSpc>
                 <a:spcPct val="100000"/>
               </a:lnSpc>
@@ -6837,7 +6838,7 @@
             </a:endParaRPr>
           </a:p>
           <a:p>
-            <a:pPr marL="195120" indent="-189360">
+            <a:pPr marL="195120" indent="-189000">
               <a:lnSpc>
                 <a:spcPct val="100000"/>
               </a:lnSpc>
@@ -6896,7 +6897,7 @@
             </a:endParaRPr>
           </a:p>
           <a:p>
-            <a:pPr marL="195120" indent="-189360">
+            <a:pPr marL="195120" indent="-189000">
               <a:lnSpc>
                 <a:spcPct val="100000"/>
               </a:lnSpc>
@@ -6925,7 +6926,7 @@
             </a:endParaRPr>
           </a:p>
           <a:p>
-            <a:pPr marL="195120" indent="-189360">
+            <a:pPr marL="195120" indent="-189000">
               <a:lnSpc>
                 <a:spcPct val="100000"/>
               </a:lnSpc>
@@ -6954,7 +6955,7 @@
             </a:endParaRPr>
           </a:p>
           <a:p>
-            <a:pPr marL="195120" indent="-189360">
+            <a:pPr marL="195120" indent="-189000">
               <a:lnSpc>
                 <a:spcPct val="100000"/>
               </a:lnSpc>
@@ -6996,7 +6997,7 @@
             </a:endParaRPr>
           </a:p>
           <a:p>
-            <a:pPr marL="195120" indent="-189360">
+            <a:pPr marL="195120" indent="-189000">
               <a:lnSpc>
                 <a:spcPct val="100000"/>
               </a:lnSpc>
@@ -7025,7 +7026,7 @@
             </a:endParaRPr>
           </a:p>
           <a:p>
-            <a:pPr lvl="1" marL="744120" indent="-281160">
+            <a:pPr lvl="1" marL="744120" indent="-280800">
               <a:lnSpc>
                 <a:spcPct val="100000"/>
               </a:lnSpc>
@@ -7054,7 +7055,7 @@
             </a:endParaRPr>
           </a:p>
           <a:p>
-            <a:pPr lvl="1" marL="744120" indent="-281160">
+            <a:pPr lvl="1" marL="744120" indent="-280800">
               <a:lnSpc>
                 <a:spcPct val="100000"/>
               </a:lnSpc>
@@ -7083,7 +7084,7 @@
             </a:endParaRPr>
           </a:p>
           <a:p>
-            <a:pPr lvl="1" marL="744120" indent="-281160">
+            <a:pPr lvl="1" marL="744120" indent="-280800">
               <a:lnSpc>
                 <a:spcPct val="100000"/>
               </a:lnSpc>
@@ -7112,7 +7113,7 @@
             </a:endParaRPr>
           </a:p>
           <a:p>
-            <a:pPr lvl="1" marL="744120" indent="-281160">
+            <a:pPr lvl="1" marL="744120" indent="-280800">
               <a:lnSpc>
                 <a:spcPct val="100000"/>
               </a:lnSpc>
@@ -7141,7 +7142,7 @@
             </a:endParaRPr>
           </a:p>
           <a:p>
-            <a:pPr lvl="1" marL="744120" indent="-281160">
+            <a:pPr lvl="1" marL="744120" indent="-280800">
               <a:lnSpc>
                 <a:spcPct val="100000"/>
               </a:lnSpc>
@@ -7259,7 +7260,7 @@
         <p:spPr>
           <a:xfrm>
             <a:off x="335520" y="764640"/>
-            <a:ext cx="10746720" cy="497520"/>
+            <a:ext cx="10746360" cy="497160"/>
           </a:xfrm>
           <a:prstGeom prst="rect">
             <a:avLst/>
@@ -7310,7 +7311,7 @@
         <p:spPr>
           <a:xfrm>
             <a:off x="335520" y="1268640"/>
-            <a:ext cx="10746720" cy="5034240"/>
+            <a:ext cx="10746360" cy="5033880"/>
           </a:xfrm>
           <a:prstGeom prst="rect">
             <a:avLst/>
@@ -7331,7 +7332,7 @@
             <a:noAutofit/>
           </a:bodyPr>
           <a:p>
-            <a:pPr marL="195120" indent="-189360">
+            <a:pPr marL="195120" indent="-189000">
               <a:lnSpc>
                 <a:spcPct val="100000"/>
               </a:lnSpc>
@@ -7360,7 +7361,7 @@
             </a:endParaRPr>
           </a:p>
           <a:p>
-            <a:pPr lvl="1" marL="744120" indent="-281160">
+            <a:pPr lvl="1" marL="744120" indent="-280800">
               <a:lnSpc>
                 <a:spcPct val="100000"/>
               </a:lnSpc>
@@ -7402,7 +7403,7 @@
             </a:endParaRPr>
           </a:p>
           <a:p>
-            <a:pPr marL="195120" indent="-189360">
+            <a:pPr marL="195120" indent="-189000">
               <a:lnSpc>
                 <a:spcPct val="100000"/>
               </a:lnSpc>
@@ -7431,7 +7432,7 @@
             </a:endParaRPr>
           </a:p>
           <a:p>
-            <a:pPr lvl="1" marL="744120" indent="-281160">
+            <a:pPr lvl="1" marL="744120" indent="-280800">
               <a:lnSpc>
                 <a:spcPct val="100000"/>
               </a:lnSpc>
@@ -7460,7 +7461,7 @@
             </a:endParaRPr>
           </a:p>
           <a:p>
-            <a:pPr lvl="1" marL="744120" indent="-281160">
+            <a:pPr lvl="1" marL="744120" indent="-280800">
               <a:lnSpc>
                 <a:spcPct val="100000"/>
               </a:lnSpc>
@@ -7509,7 +7510,7 @@
             </a:endParaRPr>
           </a:p>
           <a:p>
-            <a:pPr lvl="1" marL="744120" indent="-281160">
+            <a:pPr lvl="1" marL="744120" indent="-280800">
               <a:lnSpc>
                 <a:spcPct val="100000"/>
               </a:lnSpc>
@@ -7578,7 +7579,7 @@
         <p:spPr>
           <a:xfrm>
             <a:off x="335520" y="764640"/>
-            <a:ext cx="10746720" cy="497520"/>
+            <a:ext cx="10746360" cy="497160"/>
           </a:xfrm>
           <a:prstGeom prst="rect">
             <a:avLst/>
@@ -7629,7 +7630,7 @@
         <p:spPr>
           <a:xfrm>
             <a:off x="335520" y="1268280"/>
-            <a:ext cx="10746720" cy="5034240"/>
+            <a:ext cx="10746360" cy="5033880"/>
           </a:xfrm>
           <a:prstGeom prst="rect">
             <a:avLst/>
@@ -7663,7 +7664,7 @@
             </a:endParaRPr>
           </a:p>
           <a:p>
-            <a:pPr marL="195120" indent="-189360">
+            <a:pPr marL="195120" indent="-189000">
               <a:lnSpc>
                 <a:spcPct val="100000"/>
               </a:lnSpc>
@@ -7719,7 +7720,7 @@
         <p:spPr>
           <a:xfrm>
             <a:off x="6285600" y="2132640"/>
-            <a:ext cx="516240" cy="496080"/>
+            <a:ext cx="515880" cy="495720"/>
           </a:xfrm>
           <a:prstGeom prst="star5">
             <a:avLst>
@@ -7761,7 +7762,7 @@
         <p:spPr>
           <a:xfrm>
             <a:off x="4089960" y="2247480"/>
-            <a:ext cx="2284560" cy="363960"/>
+            <a:ext cx="2284200" cy="363960"/>
           </a:xfrm>
           <a:prstGeom prst="rect">
             <a:avLst/>
@@ -7862,7 +7863,7 @@
         <p:spPr>
           <a:xfrm>
             <a:off x="335520" y="764640"/>
-            <a:ext cx="10746720" cy="497520"/>
+            <a:ext cx="10746360" cy="497160"/>
           </a:xfrm>
           <a:prstGeom prst="rect">
             <a:avLst/>
@@ -7913,7 +7914,7 @@
         <p:spPr>
           <a:xfrm>
             <a:off x="335520" y="1268640"/>
-            <a:ext cx="10746720" cy="5034240"/>
+            <a:ext cx="10746360" cy="5033880"/>
           </a:xfrm>
           <a:prstGeom prst="rect">
             <a:avLst/>
@@ -7934,7 +7935,7 @@
             <a:noAutofit/>
           </a:bodyPr>
           <a:p>
-            <a:pPr marL="195120" indent="-189360">
+            <a:pPr marL="195120" indent="-189000">
               <a:lnSpc>
                 <a:spcPct val="100000"/>
               </a:lnSpc>
@@ -7996,7 +7997,7 @@
             </a:endParaRPr>
           </a:p>
           <a:p>
-            <a:pPr marL="195120" indent="-189360">
+            <a:pPr marL="195120" indent="-189000">
               <a:lnSpc>
                 <a:spcPct val="100000"/>
               </a:lnSpc>
@@ -8045,7 +8046,7 @@
             </a:endParaRPr>
           </a:p>
           <a:p>
-            <a:pPr marL="195120" indent="-189360">
+            <a:pPr marL="195120" indent="-189000">
               <a:lnSpc>
                 <a:spcPct val="100000"/>
               </a:lnSpc>
@@ -8094,7 +8095,7 @@
             </a:endParaRPr>
           </a:p>
           <a:p>
-            <a:pPr marL="195120" indent="-189360">
+            <a:pPr marL="195120" indent="-189000">
               <a:lnSpc>
                 <a:spcPct val="100000"/>
               </a:lnSpc>
@@ -8143,7 +8144,7 @@
             </a:endParaRPr>
           </a:p>
           <a:p>
-            <a:pPr marL="195120" indent="-189360">
+            <a:pPr marL="195120" indent="-189000">
               <a:lnSpc>
                 <a:spcPct val="100000"/>
               </a:lnSpc>
@@ -8192,7 +8193,7 @@
             </a:endParaRPr>
           </a:p>
           <a:p>
-            <a:pPr marL="195120" indent="-189360">
+            <a:pPr marL="195120" indent="-189000">
               <a:lnSpc>
                 <a:spcPct val="100000"/>
               </a:lnSpc>
@@ -8241,7 +8242,7 @@
             </a:endParaRPr>
           </a:p>
           <a:p>
-            <a:pPr marL="195120" indent="-189360">
+            <a:pPr marL="195120" indent="-189000">
               <a:lnSpc>
                 <a:spcPct val="100000"/>
               </a:lnSpc>
@@ -8290,7 +8291,7 @@
             </a:endParaRPr>
           </a:p>
           <a:p>
-            <a:pPr marL="195120" indent="-189360">
+            <a:pPr marL="195120" indent="-189000">
               <a:lnSpc>
                 <a:spcPct val="100000"/>
               </a:lnSpc>
@@ -8339,7 +8340,7 @@
             </a:endParaRPr>
           </a:p>
           <a:p>
-            <a:pPr marL="195120" indent="-189360">
+            <a:pPr marL="195120" indent="-189000">
               <a:lnSpc>
                 <a:spcPct val="100000"/>
               </a:lnSpc>
@@ -8388,7 +8389,7 @@
             </a:endParaRPr>
           </a:p>
           <a:p>
-            <a:pPr marL="195120" indent="-189360">
+            <a:pPr marL="195120" indent="-189000">
               <a:lnSpc>
                 <a:spcPct val="100000"/>
               </a:lnSpc>
@@ -8477,7 +8478,7 @@
         <p:spPr>
           <a:xfrm>
             <a:off x="335520" y="764640"/>
-            <a:ext cx="10746720" cy="497520"/>
+            <a:ext cx="10746360" cy="497160"/>
           </a:xfrm>
           <a:prstGeom prst="rect">
             <a:avLst/>
@@ -8511,7 +8512,7 @@
                 <a:latin typeface="DejaVu Sans"/>
                 <a:ea typeface="DejaVu Sans"/>
               </a:rPr>
-              <a:t>Further Resources </a:t>
+              <a:t>Literature</a:t>
             </a:r>
             <a:endParaRPr b="0" lang="en-US" sz="2400" spc="-1" strike="noStrike">
               <a:latin typeface="Arial"/>
@@ -8528,7 +8529,7 @@
         <p:spPr>
           <a:xfrm>
             <a:off x="335520" y="1268640"/>
-            <a:ext cx="10743480" cy="5031000"/>
+            <a:ext cx="10746360" cy="5033880"/>
           </a:xfrm>
           <a:prstGeom prst="rect">
             <a:avLst/>
@@ -8549,7 +8550,7 @@
             <a:noAutofit/>
           </a:bodyPr>
           <a:p>
-            <a:pPr marL="195120" indent="-189360">
+            <a:pPr marL="195120" indent="-189000">
               <a:lnSpc>
                 <a:spcPct val="100000"/>
               </a:lnSpc>
@@ -8571,26 +8572,34 @@
                 <a:latin typeface="DejaVu Sans"/>
                 <a:ea typeface="DejaVu Sans"/>
               </a:rPr>
-              <a:t>Climate University – Teaching and learning for a sustainable future – </a:t>
-            </a:r>
-            <a:r>
-              <a:rPr b="0" lang="en-US" sz="1800" spc="-1" strike="noStrike" u="sng">
-                <a:solidFill>
-                  <a:srgbClr val="0000ff"/>
-                </a:solidFill>
-                <a:uFillTx/>
-                <a:latin typeface="DejaVu Sans"/>
-                <a:ea typeface="DejaVu Sans"/>
-                <a:hlinkClick r:id="rId1"/>
-              </a:rPr>
-              <a:t>Link</a:t>
-            </a:r>
-            <a:endParaRPr b="0" lang="en-US" sz="1800" spc="-1" strike="noStrike">
-              <a:latin typeface="Arial"/>
-            </a:endParaRPr>
-          </a:p>
-          <a:p>
-            <a:pPr marL="195120" indent="-189360">
+              <a:t>(German) Stefan Rahmstorf, Hans Joachim Schellnhuber. </a:t>
+            </a:r>
+            <a:r>
+              <a:rPr b="0" i="1" lang="en-US" sz="1800" spc="-1" strike="noStrike">
+                <a:solidFill>
+                  <a:srgbClr val="000000"/>
+                </a:solidFill>
+                <a:latin typeface="DejaVu Sans"/>
+                <a:ea typeface="DejaVu Sans"/>
+              </a:rPr>
+              <a:t>Der Klimawandel</a:t>
+            </a:r>
+            <a:r>
+              <a:rPr b="0" lang="en-US" sz="1800" spc="-1" strike="noStrike">
+                <a:solidFill>
+                  <a:srgbClr val="000000"/>
+                </a:solidFill>
+                <a:latin typeface="DejaVu Sans"/>
+                <a:ea typeface="DejaVu Sans"/>
+              </a:rPr>
+              <a:t> (2019).</a:t>
+            </a:r>
+            <a:endParaRPr b="0" lang="en-US" sz="1800" spc="-1" strike="noStrike">
+              <a:latin typeface="Arial"/>
+            </a:endParaRPr>
+          </a:p>
+          <a:p>
+            <a:pPr marL="195120" indent="-189000">
               <a:lnSpc>
                 <a:spcPct val="100000"/>
               </a:lnSpc>
@@ -8612,19 +8621,17 @@
                 <a:latin typeface="DejaVu Sans"/>
                 <a:ea typeface="DejaVu Sans"/>
               </a:rPr>
-              <a:t>Circular Societies (German) – </a:t>
-            </a:r>
-            <a:r>
-              <a:rPr b="0" lang="en-US" sz="1800" spc="-1" strike="noStrike" u="sng">
-                <a:solidFill>
-                  <a:srgbClr val="0000ff"/>
-                </a:solidFill>
-                <a:uFillTx/>
-                <a:latin typeface="DejaVu Sans"/>
-                <a:ea typeface="DejaVu Sans"/>
-                <a:hlinkClick r:id="rId2"/>
-              </a:rPr>
-              <a:t>Link</a:t>
+              <a:t>David Archer, Stefan Rahmstorf. </a:t>
+            </a:r>
+            <a:r>
+              <a:rPr b="0" i="1" lang="en-US" sz="1800" spc="-1" strike="noStrike">
+                <a:solidFill>
+                  <a:srgbClr val="000000"/>
+                </a:solidFill>
+                <a:latin typeface="DejaVu Sans"/>
+                <a:ea typeface="DejaVu Sans"/>
+              </a:rPr>
+              <a:t>The Climate Crisis</a:t>
             </a:r>
             <a:r>
               <a:rPr b="0" lang="en-US" sz="1800" spc="-1" strike="noStrike">
@@ -8634,14 +8641,14 @@
                 <a:latin typeface="DejaVu Sans"/>
                 <a:ea typeface="DejaVu Sans"/>
               </a:rPr>
-              <a:t> </a:t>
-            </a:r>
-            <a:endParaRPr b="0" lang="en-US" sz="1800" spc="-1" strike="noStrike">
-              <a:latin typeface="Arial"/>
-            </a:endParaRPr>
-          </a:p>
-          <a:p>
-            <a:pPr marL="195120" indent="-189360">
+              <a:t> (2010).</a:t>
+            </a:r>
+            <a:endParaRPr b="0" lang="en-US" sz="1800" spc="-1" strike="noStrike">
+              <a:latin typeface="Arial"/>
+            </a:endParaRPr>
+          </a:p>
+          <a:p>
+            <a:pPr marL="195120" indent="-189000">
               <a:lnSpc>
                 <a:spcPct val="100000"/>
               </a:lnSpc>
@@ -8663,52 +8670,18 @@
                 <a:latin typeface="DejaVu Sans"/>
                 <a:ea typeface="DejaVu Sans"/>
               </a:rPr>
-              <a:t>Server Infrastructure for a Global Rebellion – </a:t>
-            </a:r>
-            <a:r>
-              <a:rPr b="0" lang="en-US" sz="1800" spc="-1" strike="noStrike" u="sng">
-                <a:solidFill>
-                  <a:srgbClr val="0000ff"/>
-                </a:solidFill>
-                <a:uFillTx/>
-                <a:latin typeface="DejaVu Sans"/>
-                <a:ea typeface="DejaVu Sans"/>
-                <a:hlinkClick r:id="rId3"/>
-              </a:rPr>
-              <a:t>Link</a:t>
-            </a:r>
-            <a:endParaRPr b="0" lang="en-US" sz="1800" spc="-1" strike="noStrike">
-              <a:latin typeface="Arial"/>
-            </a:endParaRPr>
-          </a:p>
-          <a:p>
-            <a:pPr>
-              <a:lnSpc>
-                <a:spcPct val="100000"/>
-              </a:lnSpc>
-              <a:spcBef>
-                <a:spcPts val="360"/>
-              </a:spcBef>
-            </a:pPr>
-            <a:endParaRPr b="0" lang="en-US" sz="1800" spc="-1" strike="noStrike">
-              <a:latin typeface="Arial"/>
-            </a:endParaRPr>
-          </a:p>
-          <a:p>
-            <a:pPr marL="195120" indent="-189360">
-              <a:lnSpc>
-                <a:spcPct val="100000"/>
-              </a:lnSpc>
-              <a:spcBef>
-                <a:spcPts val="360"/>
-              </a:spcBef>
-              <a:buClr>
-                <a:srgbClr val="008c4f"/>
-              </a:buClr>
-              <a:buSzPct val="80000"/>
-              <a:buFont typeface="Wingdings" charset="2"/>
-              <a:buChar char=""/>
-            </a:pPr>
+              <a:t>Gabrielle Walker, David King. </a:t>
+            </a:r>
+            <a:r>
+              <a:rPr b="0" i="1" lang="en-US" sz="1800" spc="-1" strike="noStrike">
+                <a:solidFill>
+                  <a:srgbClr val="000000"/>
+                </a:solidFill>
+                <a:latin typeface="DejaVu Sans"/>
+                <a:ea typeface="DejaVu Sans"/>
+              </a:rPr>
+              <a:t>The Hot Topic: How to Tackle Global Warming and Still Keep the Lights on</a:t>
+            </a:r>
             <a:r>
               <a:rPr b="0" lang="en-US" sz="1800" spc="-1" strike="noStrike">
                 <a:solidFill>
@@ -8717,157 +8690,7 @@
                 <a:latin typeface="DejaVu Sans"/>
                 <a:ea typeface="DejaVu Sans"/>
               </a:rPr>
-              <a:t>Podcasts:</a:t>
-            </a:r>
-            <a:endParaRPr b="0" lang="en-US" sz="1800" spc="-1" strike="noStrike">
-              <a:latin typeface="Arial"/>
-            </a:endParaRPr>
-          </a:p>
-          <a:p>
-            <a:pPr lvl="1" marL="432000" indent="-215640">
-              <a:lnSpc>
-                <a:spcPct val="100000"/>
-              </a:lnSpc>
-              <a:buClr>
-                <a:srgbClr val="008c4f"/>
-              </a:buClr>
-              <a:buSzPct val="45000"/>
-              <a:buFont typeface="OpenSymbol"/>
-              <a:buChar char="—"/>
-            </a:pPr>
-            <a:r>
-              <a:rPr b="0" lang="en-US" sz="1800" spc="-1" strike="noStrike">
-                <a:solidFill>
-                  <a:srgbClr val="000000"/>
-                </a:solidFill>
-                <a:latin typeface="DejaVu Sans"/>
-                <a:ea typeface="DejaVu Sans"/>
-              </a:rPr>
-              <a:t>Drilled (</a:t>
-            </a:r>
-            <a:r>
-              <a:rPr b="0" lang="en-US" sz="1800" spc="-1" strike="noStrike" u="sng">
-                <a:solidFill>
-                  <a:srgbClr val="0000ff"/>
-                </a:solidFill>
-                <a:uFillTx/>
-                <a:latin typeface="DejaVu Sans"/>
-                <a:ea typeface="DejaVu Sans"/>
-                <a:hlinkClick r:id="rId4"/>
-              </a:rPr>
-              <a:t>Link</a:t>
-            </a:r>
-            <a:r>
-              <a:rPr b="0" lang="en-US" sz="1800" spc="-1" strike="noStrike">
-                <a:solidFill>
-                  <a:srgbClr val="000000"/>
-                </a:solidFill>
-                <a:latin typeface="DejaVu Sans"/>
-                <a:ea typeface="DejaVu Sans"/>
-              </a:rPr>
-              <a:t>)</a:t>
-            </a:r>
-            <a:endParaRPr b="0" lang="en-US" sz="1800" spc="-1" strike="noStrike">
-              <a:latin typeface="Arial"/>
-            </a:endParaRPr>
-          </a:p>
-          <a:p>
-            <a:pPr lvl="1" marL="432000" indent="-215640">
-              <a:lnSpc>
-                <a:spcPct val="100000"/>
-              </a:lnSpc>
-              <a:spcBef>
-                <a:spcPts val="360"/>
-              </a:spcBef>
-              <a:buClr>
-                <a:srgbClr val="008c4f"/>
-              </a:buClr>
-              <a:buSzPct val="45000"/>
-              <a:buFont typeface="OpenSymbol"/>
-              <a:buChar char="—"/>
-            </a:pPr>
-            <a:r>
-              <a:rPr b="0" lang="en-US" sz="1800" spc="-1" strike="noStrike">
-                <a:solidFill>
-                  <a:srgbClr val="000000"/>
-                </a:solidFill>
-                <a:latin typeface="DejaVu Sans"/>
-                <a:ea typeface="DejaVu Sans"/>
-              </a:rPr>
-              <a:t>How to Save a Planet (</a:t>
-            </a:r>
-            <a:r>
-              <a:rPr b="0" lang="en-US" sz="1800" spc="-1" strike="noStrike" u="sng">
-                <a:solidFill>
-                  <a:srgbClr val="0000ff"/>
-                </a:solidFill>
-                <a:uFillTx/>
-                <a:latin typeface="DejaVu Sans"/>
-                <a:ea typeface="DejaVu Sans"/>
-                <a:hlinkClick r:id="rId5"/>
-              </a:rPr>
-              <a:t>Link</a:t>
-            </a:r>
-            <a:r>
-              <a:rPr b="0" lang="en-US" sz="1800" spc="-1" strike="noStrike">
-                <a:solidFill>
-                  <a:srgbClr val="000000"/>
-                </a:solidFill>
-                <a:latin typeface="DejaVu Sans"/>
-                <a:ea typeface="DejaVu Sans"/>
-              </a:rPr>
-              <a:t>)</a:t>
-            </a:r>
-            <a:endParaRPr b="0" lang="en-US" sz="1800" spc="-1" strike="noStrike">
-              <a:latin typeface="Arial"/>
-            </a:endParaRPr>
-          </a:p>
-          <a:p>
-            <a:pPr lvl="1" marL="432000" indent="-215640">
-              <a:lnSpc>
-                <a:spcPct val="100000"/>
-              </a:lnSpc>
-              <a:spcBef>
-                <a:spcPts val="360"/>
-              </a:spcBef>
-              <a:buClr>
-                <a:srgbClr val="008c4f"/>
-              </a:buClr>
-              <a:buSzPct val="45000"/>
-              <a:buFont typeface="OpenSymbol"/>
-              <a:buChar char="—"/>
-            </a:pPr>
-            <a:r>
-              <a:rPr b="0" lang="en-US" sz="1800" spc="-1" strike="noStrike">
-                <a:solidFill>
-                  <a:srgbClr val="000000"/>
-                </a:solidFill>
-                <a:latin typeface="DejaVu Sans"/>
-                <a:ea typeface="DejaVu Sans"/>
-              </a:rPr>
-              <a:t>1,5 Grad – der Klima-Podcast mit Luisa Neubauer (German) (</a:t>
-            </a:r>
-            <a:r>
-              <a:rPr b="0" lang="en-US" sz="1800" spc="-1" strike="noStrike" u="sng">
-                <a:solidFill>
-                  <a:srgbClr val="0000ff"/>
-                </a:solidFill>
-                <a:uFillTx/>
-                <a:latin typeface="DejaVu Sans"/>
-                <a:ea typeface="DejaVu Sans"/>
-                <a:hlinkClick r:id="rId6"/>
-              </a:rPr>
-              <a:t>Link</a:t>
-            </a:r>
-            <a:r>
-              <a:rPr b="0" lang="en-US" sz="1800" spc="-1" strike="noStrike">
-                <a:solidFill>
-                  <a:srgbClr val="000000"/>
-                </a:solidFill>
-                <a:latin typeface="DejaVu Sans"/>
-                <a:ea typeface="DejaVu Sans"/>
-              </a:rPr>
-              <a:t>)</a:t>
+              <a:t> (2008).</a:t>
             </a:r>
             <a:endParaRPr b="0" lang="en-US" sz="1800" spc="-1" strike="noStrike">
               <a:latin typeface="Arial"/>
@@ -8913,8 +8736,8 @@
         </p:nvSpPr>
         <p:spPr>
           <a:xfrm>
-            <a:off x="335520" y="1268640"/>
-            <a:ext cx="10746720" cy="5034240"/>
+            <a:off x="335520" y="764640"/>
+            <a:ext cx="10746360" cy="497160"/>
           </a:xfrm>
           <a:prstGeom prst="rect">
             <a:avLst/>
@@ -8931,6 +8754,443 @@
           <a:fontRef idx="minor"/>
         </p:style>
         <p:txBody>
+          <a:bodyPr lIns="90000" rIns="90000" tIns="45000" bIns="45000">
+            <a:noAutofit/>
+          </a:bodyPr>
+          <a:p>
+            <a:pPr>
+              <a:lnSpc>
+                <a:spcPct val="100000"/>
+              </a:lnSpc>
+            </a:pPr>
+            <a:r>
+              <a:rPr b="1" lang="en-US" sz="2400" spc="-1" strike="noStrike">
+                <a:solidFill>
+                  <a:srgbClr val="000000"/>
+                </a:solidFill>
+                <a:latin typeface="DejaVu Sans"/>
+                <a:ea typeface="DejaVu Sans"/>
+              </a:rPr>
+              <a:t>Further Resources </a:t>
+            </a:r>
+            <a:endParaRPr b="0" lang="en-US" sz="2400" spc="-1" strike="noStrike">
+              <a:latin typeface="Arial"/>
+            </a:endParaRPr>
+          </a:p>
+        </p:txBody>
+      </p:sp>
+      <p:sp>
+        <p:nvSpPr>
+          <p:cNvPr id="143" name="CustomShape 2"/>
+          <p:cNvSpPr/>
+          <p:nvPr/>
+        </p:nvSpPr>
+        <p:spPr>
+          <a:xfrm>
+            <a:off x="335520" y="1268640"/>
+            <a:ext cx="10743120" cy="5030640"/>
+          </a:xfrm>
+          <a:prstGeom prst="rect">
+            <a:avLst/>
+          </a:prstGeom>
+          <a:noFill/>
+          <a:ln>
+            <a:noFill/>
+          </a:ln>
+        </p:spPr>
+        <p:style>
+          <a:lnRef idx="0"/>
+          <a:fillRef idx="0"/>
+          <a:effectRef idx="0"/>
+          <a:fontRef idx="minor"/>
+        </p:style>
+        <p:txBody>
+          <a:bodyPr lIns="90000" rIns="90000" tIns="45000" bIns="45000" anchor="ctr">
+            <a:noAutofit/>
+          </a:bodyPr>
+          <a:p>
+            <a:pPr marL="195120" indent="-189000">
+              <a:lnSpc>
+                <a:spcPct val="100000"/>
+              </a:lnSpc>
+              <a:spcBef>
+                <a:spcPts val="360"/>
+              </a:spcBef>
+              <a:buClr>
+                <a:srgbClr val="008c4f"/>
+              </a:buClr>
+              <a:buSzPct val="80000"/>
+              <a:buFont typeface="Wingdings" charset="2"/>
+              <a:buChar char=""/>
+            </a:pPr>
+            <a:r>
+              <a:rPr b="0" lang="en-US" sz="1800" spc="-1" strike="noStrike">
+                <a:solidFill>
+                  <a:srgbClr val="000000"/>
+                </a:solidFill>
+                <a:latin typeface="DejaVu Sans"/>
+                <a:ea typeface="DejaVu Sans"/>
+              </a:rPr>
+              <a:t>Climate University – Teaching and learning for a sustainable future – </a:t>
+            </a:r>
+            <a:r>
+              <a:rPr b="0" lang="en-US" sz="1800" spc="-1" strike="noStrike" u="sng">
+                <a:solidFill>
+                  <a:srgbClr val="0000ff"/>
+                </a:solidFill>
+                <a:uFillTx/>
+                <a:latin typeface="DejaVu Sans"/>
+                <a:ea typeface="DejaVu Sans"/>
+                <a:hlinkClick r:id="rId1"/>
+              </a:rPr>
+              <a:t>Link</a:t>
+            </a:r>
+            <a:endParaRPr b="0" lang="en-US" sz="1800" spc="-1" strike="noStrike">
+              <a:latin typeface="Arial"/>
+            </a:endParaRPr>
+          </a:p>
+          <a:p>
+            <a:pPr marL="195120" indent="-189000">
+              <a:lnSpc>
+                <a:spcPct val="100000"/>
+              </a:lnSpc>
+              <a:spcBef>
+                <a:spcPts val="360"/>
+              </a:spcBef>
+              <a:buClr>
+                <a:srgbClr val="008c4f"/>
+              </a:buClr>
+              <a:buSzPct val="80000"/>
+              <a:buFont typeface="Wingdings" charset="2"/>
+              <a:buChar char=""/>
+            </a:pPr>
+            <a:r>
+              <a:rPr b="0" lang="en-US" sz="1800" spc="-1" strike="noStrike">
+                <a:solidFill>
+                  <a:srgbClr val="000000"/>
+                </a:solidFill>
+                <a:latin typeface="DejaVu Sans"/>
+                <a:ea typeface="DejaVu Sans"/>
+              </a:rPr>
+              <a:t>Circular Societies (German) – </a:t>
+            </a:r>
+            <a:r>
+              <a:rPr b="0" lang="en-US" sz="1800" spc="-1" strike="noStrike" u="sng">
+                <a:solidFill>
+                  <a:srgbClr val="0000ff"/>
+                </a:solidFill>
+                <a:uFillTx/>
+                <a:latin typeface="DejaVu Sans"/>
+                <a:ea typeface="DejaVu Sans"/>
+                <a:hlinkClick r:id="rId2"/>
+              </a:rPr>
+              <a:t>Link</a:t>
+            </a:r>
+            <a:r>
+              <a:rPr b="0" lang="en-US" sz="1800" spc="-1" strike="noStrike">
+                <a:solidFill>
+                  <a:srgbClr val="000000"/>
+                </a:solidFill>
+                <a:latin typeface="DejaVu Sans"/>
+                <a:ea typeface="DejaVu Sans"/>
+              </a:rPr>
+              <a:t> </a:t>
+            </a:r>
+            <a:endParaRPr b="0" lang="en-US" sz="1800" spc="-1" strike="noStrike">
+              <a:latin typeface="Arial"/>
+            </a:endParaRPr>
+          </a:p>
+          <a:p>
+            <a:pPr marL="195120" indent="-189000">
+              <a:lnSpc>
+                <a:spcPct val="100000"/>
+              </a:lnSpc>
+              <a:spcBef>
+                <a:spcPts val="360"/>
+              </a:spcBef>
+              <a:buClr>
+                <a:srgbClr val="008c4f"/>
+              </a:buClr>
+              <a:buSzPct val="80000"/>
+              <a:buFont typeface="Wingdings" charset="2"/>
+              <a:buChar char=""/>
+            </a:pPr>
+            <a:r>
+              <a:rPr b="0" lang="en-US" sz="1800" spc="-1" strike="noStrike">
+                <a:solidFill>
+                  <a:srgbClr val="000000"/>
+                </a:solidFill>
+                <a:latin typeface="DejaVu Sans"/>
+                <a:ea typeface="DejaVu Sans"/>
+              </a:rPr>
+              <a:t>Server Infrastructure for a Global Rebellion – </a:t>
+            </a:r>
+            <a:r>
+              <a:rPr b="0" lang="en-US" sz="1800" spc="-1" strike="noStrike" u="sng">
+                <a:solidFill>
+                  <a:srgbClr val="0000ff"/>
+                </a:solidFill>
+                <a:uFillTx/>
+                <a:latin typeface="DejaVu Sans"/>
+                <a:ea typeface="DejaVu Sans"/>
+                <a:hlinkClick r:id="rId3"/>
+              </a:rPr>
+              <a:t>Link</a:t>
+            </a:r>
+            <a:endParaRPr b="0" lang="en-US" sz="1800" spc="-1" strike="noStrike">
+              <a:latin typeface="Arial"/>
+            </a:endParaRPr>
+          </a:p>
+          <a:p>
+            <a:pPr>
+              <a:lnSpc>
+                <a:spcPct val="100000"/>
+              </a:lnSpc>
+              <a:spcBef>
+                <a:spcPts val="360"/>
+              </a:spcBef>
+            </a:pPr>
+            <a:endParaRPr b="0" lang="en-US" sz="1800" spc="-1" strike="noStrike">
+              <a:latin typeface="Arial"/>
+            </a:endParaRPr>
+          </a:p>
+          <a:p>
+            <a:pPr marL="195120" indent="-189000">
+              <a:lnSpc>
+                <a:spcPct val="100000"/>
+              </a:lnSpc>
+              <a:spcBef>
+                <a:spcPts val="360"/>
+              </a:spcBef>
+              <a:buClr>
+                <a:srgbClr val="008c4f"/>
+              </a:buClr>
+              <a:buSzPct val="80000"/>
+              <a:buFont typeface="Wingdings" charset="2"/>
+              <a:buChar char=""/>
+            </a:pPr>
+            <a:r>
+              <a:rPr b="0" lang="en-US" sz="1800" spc="-1" strike="noStrike">
+                <a:solidFill>
+                  <a:srgbClr val="000000"/>
+                </a:solidFill>
+                <a:latin typeface="DejaVu Sans"/>
+                <a:ea typeface="DejaVu Sans"/>
+              </a:rPr>
+              <a:t>Podcasts:</a:t>
+            </a:r>
+            <a:endParaRPr b="0" lang="en-US" sz="1800" spc="-1" strike="noStrike">
+              <a:latin typeface="Arial"/>
+            </a:endParaRPr>
+          </a:p>
+          <a:p>
+            <a:pPr lvl="1" marL="432000" indent="-215280">
+              <a:lnSpc>
+                <a:spcPct val="100000"/>
+              </a:lnSpc>
+              <a:buClr>
+                <a:srgbClr val="008c4f"/>
+              </a:buClr>
+              <a:buSzPct val="45000"/>
+              <a:buFont typeface="OpenSymbol"/>
+              <a:buChar char="—"/>
+            </a:pPr>
+            <a:r>
+              <a:rPr b="0" lang="en-US" sz="1800" spc="-1" strike="noStrike">
+                <a:solidFill>
+                  <a:srgbClr val="000000"/>
+                </a:solidFill>
+                <a:latin typeface="DejaVu Sans"/>
+                <a:ea typeface="DejaVu Sans"/>
+              </a:rPr>
+              <a:t>Drilled (</a:t>
+            </a:r>
+            <a:r>
+              <a:rPr b="0" lang="en-US" sz="1800" spc="-1" strike="noStrike" u="sng">
+                <a:solidFill>
+                  <a:srgbClr val="0000ff"/>
+                </a:solidFill>
+                <a:uFillTx/>
+                <a:latin typeface="DejaVu Sans"/>
+                <a:ea typeface="DejaVu Sans"/>
+                <a:hlinkClick r:id="rId4"/>
+              </a:rPr>
+              <a:t>Link</a:t>
+            </a:r>
+            <a:r>
+              <a:rPr b="0" lang="en-US" sz="1800" spc="-1" strike="noStrike">
+                <a:solidFill>
+                  <a:srgbClr val="000000"/>
+                </a:solidFill>
+                <a:latin typeface="DejaVu Sans"/>
+                <a:ea typeface="DejaVu Sans"/>
+              </a:rPr>
+              <a:t>)</a:t>
+            </a:r>
+            <a:endParaRPr b="0" lang="en-US" sz="1800" spc="-1" strike="noStrike">
+              <a:latin typeface="Arial"/>
+            </a:endParaRPr>
+          </a:p>
+          <a:p>
+            <a:pPr lvl="1" marL="432000" indent="-215280">
+              <a:lnSpc>
+                <a:spcPct val="100000"/>
+              </a:lnSpc>
+              <a:spcBef>
+                <a:spcPts val="360"/>
+              </a:spcBef>
+              <a:buClr>
+                <a:srgbClr val="008c4f"/>
+              </a:buClr>
+              <a:buSzPct val="45000"/>
+              <a:buFont typeface="OpenSymbol"/>
+              <a:buChar char="—"/>
+            </a:pPr>
+            <a:r>
+              <a:rPr b="0" lang="en-US" sz="1800" spc="-1" strike="noStrike">
+                <a:solidFill>
+                  <a:srgbClr val="000000"/>
+                </a:solidFill>
+                <a:latin typeface="DejaVu Sans"/>
+                <a:ea typeface="DejaVu Sans"/>
+              </a:rPr>
+              <a:t>How to Save a Planet (</a:t>
+            </a:r>
+            <a:r>
+              <a:rPr b="0" lang="en-US" sz="1800" spc="-1" strike="noStrike" u="sng">
+                <a:solidFill>
+                  <a:srgbClr val="0000ff"/>
+                </a:solidFill>
+                <a:uFillTx/>
+                <a:latin typeface="DejaVu Sans"/>
+                <a:ea typeface="DejaVu Sans"/>
+                <a:hlinkClick r:id="rId5"/>
+              </a:rPr>
+              <a:t>Link</a:t>
+            </a:r>
+            <a:r>
+              <a:rPr b="0" lang="en-US" sz="1800" spc="-1" strike="noStrike">
+                <a:solidFill>
+                  <a:srgbClr val="000000"/>
+                </a:solidFill>
+                <a:latin typeface="DejaVu Sans"/>
+                <a:ea typeface="DejaVu Sans"/>
+              </a:rPr>
+              <a:t>)</a:t>
+            </a:r>
+            <a:endParaRPr b="0" lang="en-US" sz="1800" spc="-1" strike="noStrike">
+              <a:latin typeface="Arial"/>
+            </a:endParaRPr>
+          </a:p>
+          <a:p>
+            <a:pPr lvl="1" marL="432000" indent="-215280">
+              <a:lnSpc>
+                <a:spcPct val="100000"/>
+              </a:lnSpc>
+              <a:spcBef>
+                <a:spcPts val="360"/>
+              </a:spcBef>
+              <a:buClr>
+                <a:srgbClr val="008c4f"/>
+              </a:buClr>
+              <a:buSzPct val="45000"/>
+              <a:buFont typeface="OpenSymbol"/>
+              <a:buChar char="—"/>
+            </a:pPr>
+            <a:r>
+              <a:rPr b="0" lang="en-US" sz="1800" spc="-1" strike="noStrike">
+                <a:solidFill>
+                  <a:srgbClr val="000000"/>
+                </a:solidFill>
+                <a:latin typeface="DejaVu Sans"/>
+                <a:ea typeface="DejaVu Sans"/>
+              </a:rPr>
+              <a:t>1,5 Grad – der Klima-Podcast mit Luisa Neubauer (German) (</a:t>
+            </a:r>
+            <a:r>
+              <a:rPr b="0" lang="en-US" sz="1800" spc="-1" strike="noStrike" u="sng">
+                <a:solidFill>
+                  <a:srgbClr val="0000ff"/>
+                </a:solidFill>
+                <a:uFillTx/>
+                <a:latin typeface="DejaVu Sans"/>
+                <a:ea typeface="DejaVu Sans"/>
+                <a:hlinkClick r:id="rId6"/>
+              </a:rPr>
+              <a:t>Link</a:t>
+            </a:r>
+            <a:r>
+              <a:rPr b="0" lang="en-US" sz="1800" spc="-1" strike="noStrike">
+                <a:solidFill>
+                  <a:srgbClr val="000000"/>
+                </a:solidFill>
+                <a:latin typeface="DejaVu Sans"/>
+                <a:ea typeface="DejaVu Sans"/>
+              </a:rPr>
+              <a:t>)</a:t>
+            </a:r>
+            <a:endParaRPr b="0" lang="en-US" sz="1800" spc="-1" strike="noStrike">
+              <a:latin typeface="Arial"/>
+            </a:endParaRPr>
+          </a:p>
+        </p:txBody>
+      </p:sp>
+    </p:spTree>
+  </p:cSld>
+  <mc:AlternateContent>
+    <mc:Choice Requires="p14">
+      <p:transition spd="slow" p14:dur="2000"/>
+    </mc:Choice>
+    <mc:Fallback>
+      <p:transition spd="slow"/>
+    </mc:Fallback>
+  </mc:AlternateContent>
+</p:sld>
+</file>
+
+<file path=ppt/slides/slide19.xml><?xml version="1.0" encoding="utf-8"?>
+<p:sld xmlns:a="http://schemas.openxmlformats.org/drawingml/2006/main" xmlns:p="http://schemas.openxmlformats.org/presentationml/2006/main" xmlns:r="http://schemas.openxmlformats.org/officeDocument/2006/relationships" xmlns:p14="http://schemas.microsoft.com/office/powerpoint/2010/main" xmlns:p15="http://schemas.microsoft.com/office/powerpoint/2012/main" xmlns:mc="http://schemas.openxmlformats.org/markup-compatibility/2006">
+  <p:cSld>
+    <p:spTree>
+      <p:nvGrpSpPr>
+        <p:cNvPr id="1" name=""/>
+        <p:cNvGrpSpPr/>
+        <p:nvPr/>
+      </p:nvGrpSpPr>
+      <p:grpSpPr>
+        <a:xfrm>
+          <a:off x="0" y="0"/>
+          <a:ext cx="0" cy="0"/>
+          <a:chOff x="0" y="0"/>
+          <a:chExt cx="0" cy="0"/>
+        </a:xfrm>
+      </p:grpSpPr>
+      <p:sp>
+        <p:nvSpPr>
+          <p:cNvPr id="144" name="CustomShape 1"/>
+          <p:cNvSpPr/>
+          <p:nvPr/>
+        </p:nvSpPr>
+        <p:spPr>
+          <a:xfrm>
+            <a:off x="335520" y="1268640"/>
+            <a:ext cx="10746360" cy="5033880"/>
+          </a:xfrm>
+          <a:prstGeom prst="rect">
+            <a:avLst/>
+          </a:prstGeom>
+          <a:noFill/>
+          <a:ln>
+            <a:noFill/>
+          </a:ln>
+        </p:spPr>
+        <p:style>
+          <a:lnRef idx="0"/>
+          <a:fillRef idx="0"/>
+          <a:effectRef idx="0"/>
+          <a:fontRef idx="minor"/>
+        </p:style>
+        <p:txBody>
           <a:bodyPr lIns="90000" rIns="90000" tIns="45000" bIns="45000" anchor="ctr">
             <a:noAutofit/>
           </a:bodyPr>
@@ -8964,14 +9224,14 @@
       </p:sp>
       <p:sp>
         <p:nvSpPr>
-          <p:cNvPr id="143" name="CustomShape 2"/>
+          <p:cNvPr id="145" name="CustomShape 2"/>
           <p:cNvSpPr/>
           <p:nvPr/>
         </p:nvSpPr>
         <p:spPr>
           <a:xfrm>
             <a:off x="335520" y="764640"/>
-            <a:ext cx="10746720" cy="497520"/>
+            <a:ext cx="10746360" cy="497160"/>
           </a:xfrm>
           <a:prstGeom prst="rect">
             <a:avLst/>
@@ -9027,7 +9287,7 @@
         <p:spPr>
           <a:xfrm>
             <a:off x="335520" y="764640"/>
-            <a:ext cx="10744560" cy="495360"/>
+            <a:ext cx="10744200" cy="495000"/>
           </a:xfrm>
           <a:prstGeom prst="rect">
             <a:avLst/>
@@ -9078,7 +9338,7 @@
         <p:spPr>
           <a:xfrm>
             <a:off x="335520" y="1268280"/>
-            <a:ext cx="10744560" cy="5032080"/>
+            <a:ext cx="10744200" cy="5031720"/>
           </a:xfrm>
           <a:prstGeom prst="rect">
             <a:avLst/>
@@ -9109,7 +9369,7 @@
             </a:endParaRPr>
           </a:p>
           <a:p>
-            <a:pPr marL="195120" indent="-187200">
+            <a:pPr marL="195120" indent="-186840">
               <a:lnSpc>
                 <a:spcPct val="100000"/>
               </a:lnSpc>
@@ -9193,7 +9453,7 @@
             </a:endParaRPr>
           </a:p>
           <a:p>
-            <a:pPr marL="195120" indent="-187200">
+            <a:pPr marL="195120" indent="-186840">
               <a:lnSpc>
                 <a:spcPct val="100000"/>
               </a:lnSpc>
@@ -9297,7 +9557,7 @@
         <p:spPr>
           <a:xfrm>
             <a:off x="335520" y="764640"/>
-            <a:ext cx="10746720" cy="497520"/>
+            <a:ext cx="10746360" cy="497160"/>
           </a:xfrm>
           <a:prstGeom prst="rect">
             <a:avLst/>
@@ -9352,7 +9612,7 @@
         <p:spPr>
           <a:xfrm>
             <a:off x="2374920" y="2133000"/>
-            <a:ext cx="1469520" cy="2170800"/>
+            <a:ext cx="1469160" cy="2170440"/>
           </a:xfrm>
           <a:prstGeom prst="rect">
             <a:avLst/>
@@ -9375,7 +9635,7 @@
         <p:spPr>
           <a:xfrm>
             <a:off x="6960240" y="2525760"/>
-            <a:ext cx="1783440" cy="1775520"/>
+            <a:ext cx="1783080" cy="1775160"/>
           </a:xfrm>
           <a:prstGeom prst="rect">
             <a:avLst/>
@@ -9394,7 +9654,7 @@
         <p:spPr>
           <a:xfrm>
             <a:off x="1310400" y="4249080"/>
-            <a:ext cx="3634200" cy="675720"/>
+            <a:ext cx="3633840" cy="675360"/>
           </a:xfrm>
           <a:prstGeom prst="rect">
             <a:avLst/>
@@ -9471,7 +9731,7 @@
         <p:spPr>
           <a:xfrm>
             <a:off x="6013080" y="4269960"/>
-            <a:ext cx="3634200" cy="675720"/>
+            <a:ext cx="3633840" cy="675360"/>
           </a:xfrm>
           <a:prstGeom prst="rect">
             <a:avLst/>
@@ -9578,7 +9838,7 @@
         <p:spPr>
           <a:xfrm>
             <a:off x="542880" y="721800"/>
-            <a:ext cx="10352520" cy="493200"/>
+            <a:ext cx="10352160" cy="492840"/>
           </a:xfrm>
           <a:prstGeom prst="rect">
             <a:avLst/>
@@ -9629,7 +9889,7 @@
         <p:spPr>
           <a:xfrm>
             <a:off x="451800" y="1709280"/>
-            <a:ext cx="8219880" cy="4348080"/>
+            <a:ext cx="8219520" cy="4347720"/>
           </a:xfrm>
           <a:prstGeom prst="rect">
             <a:avLst/>
@@ -9655,7 +9915,7 @@
         <p:spPr>
           <a:xfrm>
             <a:off x="609480" y="1769400"/>
-            <a:ext cx="10582920" cy="4851000"/>
+            <a:ext cx="10582560" cy="4850640"/>
           </a:xfrm>
           <a:prstGeom prst="rect">
             <a:avLst/>
@@ -9676,7 +9936,7 @@
             <a:normAutofit/>
           </a:bodyPr>
           <a:p>
-            <a:pPr marL="216000" indent="-211320">
+            <a:pPr marL="216000" indent="-210960">
               <a:lnSpc>
                 <a:spcPct val="90000"/>
               </a:lnSpc>
@@ -9785,7 +10045,7 @@
             </a:endParaRPr>
           </a:p>
           <a:p>
-            <a:pPr marL="216000" indent="-211320">
+            <a:pPr marL="216000" indent="-210960">
               <a:lnSpc>
                 <a:spcPct val="100000"/>
               </a:lnSpc>
@@ -9814,7 +10074,7 @@
             </a:endParaRPr>
           </a:p>
           <a:p>
-            <a:pPr lvl="1" marL="685800" indent="-223920">
+            <a:pPr lvl="1" marL="685800" indent="-223560">
               <a:lnSpc>
                 <a:spcPct val="100000"/>
               </a:lnSpc>
@@ -9843,7 +10103,7 @@
             </a:endParaRPr>
           </a:p>
           <a:p>
-            <a:pPr lvl="1" marL="685800" indent="-223920">
+            <a:pPr lvl="1" marL="685800" indent="-223560">
               <a:lnSpc>
                 <a:spcPct val="100000"/>
               </a:lnSpc>
@@ -9872,7 +10132,7 @@
             </a:endParaRPr>
           </a:p>
           <a:p>
-            <a:pPr lvl="1" marL="685800" indent="-223920">
+            <a:pPr lvl="1" marL="685800" indent="-223560">
               <a:lnSpc>
                 <a:spcPct val="100000"/>
               </a:lnSpc>
@@ -9901,7 +10161,7 @@
             </a:endParaRPr>
           </a:p>
           <a:p>
-            <a:pPr lvl="1" marL="685800" indent="-223920">
+            <a:pPr lvl="1" marL="685800" indent="-223560">
               <a:lnSpc>
                 <a:spcPct val="100000"/>
               </a:lnSpc>
@@ -9930,7 +10190,7 @@
             </a:endParaRPr>
           </a:p>
           <a:p>
-            <a:pPr marL="216000" indent="-211320">
+            <a:pPr marL="216000" indent="-210960">
               <a:lnSpc>
                 <a:spcPct val="100000"/>
               </a:lnSpc>
@@ -9959,7 +10219,7 @@
             </a:endParaRPr>
           </a:p>
           <a:p>
-            <a:pPr lvl="1" marL="685800" indent="-223920">
+            <a:pPr lvl="1" marL="685800" indent="-223560">
               <a:lnSpc>
                 <a:spcPct val="100000"/>
               </a:lnSpc>
@@ -9988,7 +10248,7 @@
             </a:endParaRPr>
           </a:p>
           <a:p>
-            <a:pPr lvl="1" marL="685800" indent="-223920">
+            <a:pPr lvl="1" marL="685800" indent="-223560">
               <a:lnSpc>
                 <a:spcPct val="100000"/>
               </a:lnSpc>
@@ -10057,7 +10317,7 @@
         <p:spPr>
           <a:xfrm>
             <a:off x="542880" y="721800"/>
-            <a:ext cx="10352520" cy="493200"/>
+            <a:ext cx="10352160" cy="492840"/>
           </a:xfrm>
           <a:prstGeom prst="rect">
             <a:avLst/>
@@ -10108,7 +10368,7 @@
         <p:spPr>
           <a:xfrm>
             <a:off x="451800" y="1709280"/>
-            <a:ext cx="8219880" cy="4348080"/>
+            <a:ext cx="8219520" cy="4347720"/>
           </a:xfrm>
           <a:prstGeom prst="rect">
             <a:avLst/>
@@ -10134,7 +10394,7 @@
         <p:spPr>
           <a:xfrm>
             <a:off x="609480" y="1769400"/>
-            <a:ext cx="10582920" cy="4851000"/>
+            <a:ext cx="10582560" cy="4850640"/>
           </a:xfrm>
           <a:prstGeom prst="rect">
             <a:avLst/>
@@ -10155,7 +10415,7 @@
             <a:normAutofit/>
           </a:bodyPr>
           <a:p>
-            <a:pPr marL="216000" indent="-211320">
+            <a:pPr marL="216000" indent="-210960">
               <a:lnSpc>
                 <a:spcPct val="90000"/>
               </a:lnSpc>
@@ -10206,7 +10466,7 @@
             </a:endParaRPr>
           </a:p>
           <a:p>
-            <a:pPr lvl="1" marL="685800" indent="-223920">
+            <a:pPr lvl="1" marL="685800" indent="-223560">
               <a:lnSpc>
                 <a:spcPct val="100000"/>
               </a:lnSpc>
@@ -10235,7 +10495,7 @@
             </a:endParaRPr>
           </a:p>
           <a:p>
-            <a:pPr lvl="1" marL="685800" indent="-223920">
+            <a:pPr lvl="1" marL="685800" indent="-223560">
               <a:lnSpc>
                 <a:spcPct val="100000"/>
               </a:lnSpc>
@@ -10277,7 +10537,7 @@
             </a:endParaRPr>
           </a:p>
           <a:p>
-            <a:pPr marL="216000" indent="-211320">
+            <a:pPr marL="216000" indent="-210960">
               <a:lnSpc>
                 <a:spcPct val="90000"/>
               </a:lnSpc>
@@ -10309,7 +10569,7 @@
             </a:endParaRPr>
           </a:p>
           <a:p>
-            <a:pPr lvl="1" marL="685800" indent="-223920">
+            <a:pPr lvl="1" marL="685800" indent="-223560">
               <a:lnSpc>
                 <a:spcPct val="100000"/>
               </a:lnSpc>
@@ -10363,7 +10623,7 @@
             </a:endParaRPr>
           </a:p>
           <a:p>
-            <a:pPr lvl="1" marL="685800" indent="-223920">
+            <a:pPr lvl="1" marL="685800" indent="-223560">
               <a:lnSpc>
                 <a:spcPct val="100000"/>
               </a:lnSpc>
@@ -10417,7 +10677,7 @@
             </a:endParaRPr>
           </a:p>
           <a:p>
-            <a:pPr marL="228600" indent="-223920">
+            <a:pPr marL="228600" indent="-223560">
               <a:lnSpc>
                 <a:spcPct val="90000"/>
               </a:lnSpc>
@@ -10433,7 +10693,7 @@
             </a:endParaRPr>
           </a:p>
           <a:p>
-            <a:pPr marL="228600" indent="-223920" algn="ctr">
+            <a:pPr marL="228600" indent="-223560" algn="ctr">
               <a:lnSpc>
                 <a:spcPct val="90000"/>
               </a:lnSpc>
@@ -10459,7 +10719,7 @@
             </a:endParaRPr>
           </a:p>
           <a:p>
-            <a:pPr marL="457200" indent="-223920" algn="ctr">
+            <a:pPr marL="457200" indent="-223560" algn="ctr">
               <a:lnSpc>
                 <a:spcPct val="90000"/>
               </a:lnSpc>
@@ -10535,7 +10795,7 @@
         <p:spPr>
           <a:xfrm>
             <a:off x="542880" y="721800"/>
-            <a:ext cx="10352520" cy="493200"/>
+            <a:ext cx="10352160" cy="492840"/>
           </a:xfrm>
           <a:prstGeom prst="rect">
             <a:avLst/>
@@ -10586,7 +10846,7 @@
         <p:spPr>
           <a:xfrm>
             <a:off x="451800" y="1709280"/>
-            <a:ext cx="8219880" cy="4348080"/>
+            <a:ext cx="8219520" cy="4347720"/>
           </a:xfrm>
           <a:prstGeom prst="rect">
             <a:avLst/>
@@ -10612,7 +10872,7 @@
         <p:spPr>
           <a:xfrm>
             <a:off x="609480" y="1769400"/>
-            <a:ext cx="10582920" cy="4851000"/>
+            <a:ext cx="10582560" cy="4850640"/>
           </a:xfrm>
           <a:prstGeom prst="rect">
             <a:avLst/>
@@ -10633,7 +10893,7 @@
             <a:normAutofit/>
           </a:bodyPr>
           <a:p>
-            <a:pPr marL="216000" indent="-211320">
+            <a:pPr marL="216000" indent="-210960">
               <a:lnSpc>
                 <a:spcPct val="90000"/>
               </a:lnSpc>
@@ -10684,7 +10944,7 @@
             </a:endParaRPr>
           </a:p>
           <a:p>
-            <a:pPr lvl="1" marL="685800" indent="-223920">
+            <a:pPr lvl="1" marL="685800" indent="-223560">
               <a:lnSpc>
                 <a:spcPct val="100000"/>
               </a:lnSpc>
@@ -10713,7 +10973,7 @@
             </a:endParaRPr>
           </a:p>
           <a:p>
-            <a:pPr lvl="1" marL="685800" indent="-223920">
+            <a:pPr lvl="1" marL="685800" indent="-223560">
               <a:lnSpc>
                 <a:spcPct val="100000"/>
               </a:lnSpc>
@@ -10755,7 +11015,7 @@
             </a:endParaRPr>
           </a:p>
           <a:p>
-            <a:pPr marL="216000" indent="-211320">
+            <a:pPr marL="216000" indent="-210960">
               <a:lnSpc>
                 <a:spcPct val="90000"/>
               </a:lnSpc>
@@ -10787,7 +11047,7 @@
             </a:endParaRPr>
           </a:p>
           <a:p>
-            <a:pPr lvl="1" marL="685800" indent="-223920">
+            <a:pPr lvl="1" marL="685800" indent="-223560">
               <a:lnSpc>
                 <a:spcPct val="100000"/>
               </a:lnSpc>
@@ -10841,7 +11101,7 @@
             </a:endParaRPr>
           </a:p>
           <a:p>
-            <a:pPr lvl="1" marL="685800" indent="-223920">
+            <a:pPr lvl="1" marL="685800" indent="-223560">
               <a:lnSpc>
                 <a:spcPct val="100000"/>
               </a:lnSpc>
@@ -10895,7 +11155,7 @@
             </a:endParaRPr>
           </a:p>
           <a:p>
-            <a:pPr marL="228600" indent="-223920">
+            <a:pPr marL="228600" indent="-223560">
               <a:lnSpc>
                 <a:spcPct val="90000"/>
               </a:lnSpc>
@@ -10911,7 +11171,7 @@
             </a:endParaRPr>
           </a:p>
           <a:p>
-            <a:pPr marL="228600" indent="-223920" algn="ctr">
+            <a:pPr marL="228600" indent="-223560" algn="ctr">
               <a:lnSpc>
                 <a:spcPct val="90000"/>
               </a:lnSpc>
@@ -10937,7 +11197,7 @@
             </a:endParaRPr>
           </a:p>
           <a:p>
-            <a:pPr marL="457200" indent="-223920" algn="ctr">
+            <a:pPr marL="457200" indent="-223560" algn="ctr">
               <a:lnSpc>
                 <a:spcPct val="90000"/>
               </a:lnSpc>
@@ -11013,7 +11273,7 @@
         <p:spPr>
           <a:xfrm>
             <a:off x="542880" y="721800"/>
-            <a:ext cx="10352520" cy="493200"/>
+            <a:ext cx="10352160" cy="492840"/>
           </a:xfrm>
           <a:prstGeom prst="rect">
             <a:avLst/>
@@ -11064,7 +11324,7 @@
         <p:spPr>
           <a:xfrm>
             <a:off x="451800" y="1709280"/>
-            <a:ext cx="8219880" cy="4348080"/>
+            <a:ext cx="8219520" cy="4347720"/>
           </a:xfrm>
           <a:prstGeom prst="rect">
             <a:avLst/>
@@ -11090,7 +11350,7 @@
         <p:spPr>
           <a:xfrm>
             <a:off x="609480" y="1769400"/>
-            <a:ext cx="10582920" cy="4851000"/>
+            <a:ext cx="10582560" cy="4850640"/>
           </a:xfrm>
           <a:prstGeom prst="rect">
             <a:avLst/>
@@ -11111,7 +11371,7 @@
             <a:normAutofit/>
           </a:bodyPr>
           <a:p>
-            <a:pPr marL="216000" indent="-211320">
+            <a:pPr marL="216000" indent="-210960">
               <a:lnSpc>
                 <a:spcPct val="90000"/>
               </a:lnSpc>
@@ -11140,7 +11400,7 @@
             </a:endParaRPr>
           </a:p>
           <a:p>
-            <a:pPr marL="216000" indent="-211320">
+            <a:pPr marL="216000" indent="-210960">
               <a:lnSpc>
                 <a:spcPct val="90000"/>
               </a:lnSpc>
@@ -11169,7 +11429,7 @@
             </a:endParaRPr>
           </a:p>
           <a:p>
-            <a:pPr marL="216000" indent="-211320">
+            <a:pPr marL="216000" indent="-210960">
               <a:lnSpc>
                 <a:spcPct val="90000"/>
               </a:lnSpc>
@@ -11198,7 +11458,7 @@
             </a:endParaRPr>
           </a:p>
           <a:p>
-            <a:pPr marL="216000" indent="-211320">
+            <a:pPr marL="216000" indent="-210960">
               <a:lnSpc>
                 <a:spcPct val="90000"/>
               </a:lnSpc>
@@ -11227,7 +11487,7 @@
             </a:endParaRPr>
           </a:p>
           <a:p>
-            <a:pPr marL="216000" indent="-211320">
+            <a:pPr marL="216000" indent="-210960">
               <a:lnSpc>
                 <a:spcPct val="90000"/>
               </a:lnSpc>
@@ -11256,7 +11516,7 @@
             </a:endParaRPr>
           </a:p>
           <a:p>
-            <a:pPr marL="216000" indent="-211320">
+            <a:pPr marL="216000" indent="-210960">
               <a:lnSpc>
                 <a:spcPct val="90000"/>
               </a:lnSpc>
@@ -11285,7 +11545,7 @@
             </a:endParaRPr>
           </a:p>
           <a:p>
-            <a:pPr marL="216000" indent="-211320">
+            <a:pPr marL="216000" indent="-210960">
               <a:lnSpc>
                 <a:spcPct val="90000"/>
               </a:lnSpc>
@@ -11354,7 +11614,7 @@
         <p:spPr>
           <a:xfrm>
             <a:off x="542880" y="721800"/>
-            <a:ext cx="10352520" cy="493200"/>
+            <a:ext cx="10352160" cy="492840"/>
           </a:xfrm>
           <a:prstGeom prst="rect">
             <a:avLst/>
@@ -11405,7 +11665,7 @@
         <p:spPr>
           <a:xfrm>
             <a:off x="451800" y="1709280"/>
-            <a:ext cx="8219880" cy="4348080"/>
+            <a:ext cx="8219520" cy="4347720"/>
           </a:xfrm>
           <a:prstGeom prst="rect">
             <a:avLst/>
@@ -11431,7 +11691,7 @@
         <p:spPr>
           <a:xfrm>
             <a:off x="609480" y="1769400"/>
-            <a:ext cx="10582920" cy="4851000"/>
+            <a:ext cx="10582560" cy="4850640"/>
           </a:xfrm>
           <a:prstGeom prst="rect">
             <a:avLst/>
@@ -11452,7 +11712,7 @@
             <a:normAutofit/>
           </a:bodyPr>
           <a:p>
-            <a:pPr marL="216000" indent="-211320">
+            <a:pPr marL="216000" indent="-210960">
               <a:lnSpc>
                 <a:spcPct val="90000"/>
               </a:lnSpc>
@@ -11481,7 +11741,7 @@
             </a:endParaRPr>
           </a:p>
           <a:p>
-            <a:pPr marL="216000" indent="-211320">
+            <a:pPr marL="216000" indent="-210960">
               <a:lnSpc>
                 <a:spcPct val="90000"/>
               </a:lnSpc>
@@ -11510,7 +11770,7 @@
             </a:endParaRPr>
           </a:p>
           <a:p>
-            <a:pPr marL="216000" indent="-211320">
+            <a:pPr marL="216000" indent="-210960">
               <a:lnSpc>
                 <a:spcPct val="90000"/>
               </a:lnSpc>
@@ -11539,7 +11799,7 @@
             </a:endParaRPr>
           </a:p>
           <a:p>
-            <a:pPr marL="216000" indent="-211320">
+            <a:pPr marL="216000" indent="-210960">
               <a:lnSpc>
                 <a:spcPct val="90000"/>
               </a:lnSpc>
@@ -11568,7 +11828,7 @@
             </a:endParaRPr>
           </a:p>
           <a:p>
-            <a:pPr marL="216000" indent="-211320">
+            <a:pPr marL="216000" indent="-210960">
               <a:lnSpc>
                 <a:spcPct val="90000"/>
               </a:lnSpc>
@@ -11637,7 +11897,7 @@
         <p:spPr>
           <a:xfrm>
             <a:off x="335520" y="764640"/>
-            <a:ext cx="10746720" cy="497520"/>
+            <a:ext cx="10746360" cy="497160"/>
           </a:xfrm>
           <a:prstGeom prst="rect">
             <a:avLst/>
@@ -11688,7 +11948,7 @@
         <p:spPr>
           <a:xfrm>
             <a:off x="335520" y="1268640"/>
-            <a:ext cx="10746720" cy="5034240"/>
+            <a:ext cx="10746360" cy="5033880"/>
           </a:xfrm>
           <a:prstGeom prst="rect">
             <a:avLst/>
@@ -11709,7 +11969,7 @@
             <a:noAutofit/>
           </a:bodyPr>
           <a:p>
-            <a:pPr marL="195120" indent="-189360">
+            <a:pPr marL="195120" indent="-189000">
               <a:lnSpc>
                 <a:spcPct val="100000"/>
               </a:lnSpc>
@@ -11738,7 +11998,7 @@
             </a:endParaRPr>
           </a:p>
           <a:p>
-            <a:pPr marL="195120" indent="-189360">
+            <a:pPr marL="195120" indent="-189000">
               <a:lnSpc>
                 <a:spcPct val="100000"/>
               </a:lnSpc>
@@ -11767,7 +12027,7 @@
             </a:endParaRPr>
           </a:p>
           <a:p>
-            <a:pPr marL="195120" indent="-189360">
+            <a:pPr marL="195120" indent="-189000">
               <a:lnSpc>
                 <a:spcPct val="100000"/>
               </a:lnSpc>
@@ -11796,7 +12056,7 @@
             </a:endParaRPr>
           </a:p>
           <a:p>
-            <a:pPr marL="195120" indent="-189360">
+            <a:pPr marL="195120" indent="-189000">
               <a:lnSpc>
                 <a:spcPct val="100000"/>
               </a:lnSpc>
@@ -11825,7 +12085,7 @@
             </a:endParaRPr>
           </a:p>
           <a:p>
-            <a:pPr marL="195120" indent="-189360">
+            <a:pPr marL="195120" indent="-189000">
               <a:lnSpc>
                 <a:spcPct val="100000"/>
               </a:lnSpc>
@@ -11854,7 +12114,7 @@
             </a:endParaRPr>
           </a:p>
           <a:p>
-            <a:pPr marL="195120" indent="-189360">
+            <a:pPr marL="195120" indent="-189000">
               <a:lnSpc>
                 <a:spcPct val="100000"/>
               </a:lnSpc>
@@ -11883,7 +12143,7 @@
             </a:endParaRPr>
           </a:p>
           <a:p>
-            <a:pPr marL="195120" indent="-189360">
+            <a:pPr marL="195120" indent="-189000">
               <a:lnSpc>
                 <a:spcPct val="100000"/>
               </a:lnSpc>
@@ -11912,7 +12172,7 @@
             </a:endParaRPr>
           </a:p>
           <a:p>
-            <a:pPr marL="195120" indent="-189360">
+            <a:pPr marL="195120" indent="-189000">
               <a:lnSpc>
                 <a:spcPct val="100000"/>
               </a:lnSpc>
@@ -11941,7 +12201,7 @@
             </a:endParaRPr>
           </a:p>
           <a:p>
-            <a:pPr marL="195120" indent="-189360">
+            <a:pPr marL="195120" indent="-189000">
               <a:lnSpc>
                 <a:spcPct val="100000"/>
               </a:lnSpc>
@@ -11970,7 +12230,7 @@
             </a:endParaRPr>
           </a:p>
           <a:p>
-            <a:pPr marL="195120" indent="-189360">
+            <a:pPr marL="195120" indent="-189000">
               <a:lnSpc>
                 <a:spcPct val="100000"/>
               </a:lnSpc>
@@ -11999,7 +12259,7 @@
             </a:endParaRPr>
           </a:p>
           <a:p>
-            <a:pPr marL="195120" indent="-189360">
+            <a:pPr marL="195120" indent="-189000">
               <a:lnSpc>
                 <a:spcPct val="100000"/>
               </a:lnSpc>
@@ -12028,7 +12288,7 @@
             </a:endParaRPr>
           </a:p>
           <a:p>
-            <a:pPr marL="195120" indent="-189360">
+            <a:pPr marL="195120" indent="-189000">
               <a:lnSpc>
                 <a:spcPct val="100000"/>
               </a:lnSpc>
@@ -12057,7 +12317,7 @@
             </a:endParaRPr>
           </a:p>
           <a:p>
-            <a:pPr marL="195120" indent="-189360">
+            <a:pPr marL="195120" indent="-189000">
               <a:lnSpc>
                 <a:spcPct val="100000"/>
               </a:lnSpc>

</xml_diff>

<commit_message>
* fixed link to github repo in "license" slide in L00, L01, L02 and L03
</commit_message>
<xml_diff>
--- a/The-Limits-to-Growth/LTG-L00-Organization.pptx
+++ b/The-Limits-to-Growth/LTG-L00-Organization.pptx
@@ -258,7 +258,7 @@
           </a:bodyPr>
           <a:p>
             <a:pPr algn="r"/>
-            <a:fld id="{4B28F0B8-28E6-45A2-8A96-24CAA2002DDC}" type="slidenum">
+            <a:fld id="{9E7586F6-A329-408A-A205-2AA1C632E92F}" type="slidenum">
               <a:rPr b="0" lang="en-US" sz="1400" spc="-1" strike="noStrike">
                 <a:latin typeface="Times New Roman"/>
               </a:rPr>
@@ -306,7 +306,7 @@
         <p:spPr>
           <a:xfrm>
             <a:off x="533520" y="763560"/>
-            <a:ext cx="6695280" cy="3763440"/>
+            <a:ext cx="6694920" cy="3763080"/>
           </a:xfrm>
           <a:prstGeom prst="rect">
             <a:avLst/>
@@ -326,7 +326,7 @@
         <p:spPr>
           <a:xfrm>
             <a:off x="777240" y="4777560"/>
-            <a:ext cx="6208920" cy="4517280"/>
+            <a:ext cx="6208560" cy="4516920"/>
           </a:xfrm>
           <a:prstGeom prst="rect">
             <a:avLst/>
@@ -352,7 +352,7 @@
         <p:spPr>
           <a:xfrm>
             <a:off x="4399200" y="9555480"/>
-            <a:ext cx="3364200" cy="493920"/>
+            <a:ext cx="3363840" cy="493560"/>
           </a:xfrm>
           <a:prstGeom prst="rect">
             <a:avLst/>
@@ -378,7 +378,7 @@
                 <a:spcPct val="100000"/>
               </a:lnSpc>
             </a:pPr>
-            <a:fld id="{3A237621-4CE2-4EE1-BED8-F1EDB3538D63}" type="slidenum">
+            <a:fld id="{78E9DFEC-4C74-4938-A84D-A57DEF9179CE}" type="slidenum">
               <a:rPr b="0" lang="de-DE" sz="1800" spc="-1" strike="noStrike">
                 <a:solidFill>
                   <a:srgbClr val="000000"/>
@@ -429,7 +429,7 @@
         <p:spPr>
           <a:xfrm>
             <a:off x="533520" y="763560"/>
-            <a:ext cx="6695280" cy="3763440"/>
+            <a:ext cx="6694920" cy="3763080"/>
           </a:xfrm>
           <a:prstGeom prst="rect">
             <a:avLst/>
@@ -449,7 +449,7 @@
         <p:spPr>
           <a:xfrm>
             <a:off x="777240" y="4777560"/>
-            <a:ext cx="6208920" cy="4517280"/>
+            <a:ext cx="6208560" cy="4516920"/>
           </a:xfrm>
           <a:prstGeom prst="rect">
             <a:avLst/>
@@ -475,7 +475,7 @@
         <p:spPr>
           <a:xfrm>
             <a:off x="4399200" y="9555480"/>
-            <a:ext cx="3364200" cy="493920"/>
+            <a:ext cx="3363840" cy="493560"/>
           </a:xfrm>
           <a:prstGeom prst="rect">
             <a:avLst/>
@@ -501,7 +501,7 @@
                 <a:spcPct val="100000"/>
               </a:lnSpc>
             </a:pPr>
-            <a:fld id="{8B5A766D-C7DA-45FE-B083-0949704A4CF3}" type="slidenum">
+            <a:fld id="{0A9810D7-B921-490C-BCC8-B01B959AD50E}" type="slidenum">
               <a:rPr b="0" lang="de-DE" sz="1800" spc="-1" strike="noStrike">
                 <a:solidFill>
                   <a:srgbClr val="000000"/>
@@ -552,7 +552,7 @@
         <p:spPr>
           <a:xfrm>
             <a:off x="533520" y="763560"/>
-            <a:ext cx="6695280" cy="3763440"/>
+            <a:ext cx="6694920" cy="3763080"/>
           </a:xfrm>
           <a:prstGeom prst="rect">
             <a:avLst/>
@@ -572,7 +572,7 @@
         <p:spPr>
           <a:xfrm>
             <a:off x="777240" y="4777560"/>
-            <a:ext cx="6208920" cy="4517280"/>
+            <a:ext cx="6208560" cy="4516920"/>
           </a:xfrm>
           <a:prstGeom prst="rect">
             <a:avLst/>
@@ -598,7 +598,7 @@
         <p:spPr>
           <a:xfrm>
             <a:off x="4399200" y="9555480"/>
-            <a:ext cx="3364200" cy="493920"/>
+            <a:ext cx="3363840" cy="493560"/>
           </a:xfrm>
           <a:prstGeom prst="rect">
             <a:avLst/>
@@ -624,7 +624,7 @@
                 <a:spcPct val="100000"/>
               </a:lnSpc>
             </a:pPr>
-            <a:fld id="{842A4DC3-3F7D-44E9-A589-19BA5D743226}" type="slidenum">
+            <a:fld id="{88AF7CDE-FBD3-4312-9744-F624252D2CB0}" type="slidenum">
               <a:rPr b="0" lang="de-DE" sz="1800" spc="-1" strike="noStrike">
                 <a:solidFill>
                   <a:srgbClr val="000000"/>
@@ -675,7 +675,7 @@
         <p:spPr>
           <a:xfrm>
             <a:off x="533520" y="763560"/>
-            <a:ext cx="6695280" cy="3763440"/>
+            <a:ext cx="6694920" cy="3763080"/>
           </a:xfrm>
           <a:prstGeom prst="rect">
             <a:avLst/>
@@ -695,7 +695,7 @@
         <p:spPr>
           <a:xfrm>
             <a:off x="777240" y="4777560"/>
-            <a:ext cx="6208920" cy="4517280"/>
+            <a:ext cx="6208560" cy="4516920"/>
           </a:xfrm>
           <a:prstGeom prst="rect">
             <a:avLst/>
@@ -721,7 +721,7 @@
         <p:spPr>
           <a:xfrm>
             <a:off x="4399200" y="9555480"/>
-            <a:ext cx="3364200" cy="493920"/>
+            <a:ext cx="3363840" cy="493560"/>
           </a:xfrm>
           <a:prstGeom prst="rect">
             <a:avLst/>
@@ -747,7 +747,7 @@
                 <a:spcPct val="100000"/>
               </a:lnSpc>
             </a:pPr>
-            <a:fld id="{3749BCBD-4973-4906-A48D-F8626D8C0836}" type="slidenum">
+            <a:fld id="{CA902EAE-527D-43E1-8E60-941B080ED1C8}" type="slidenum">
               <a:rPr b="0" lang="de-DE" sz="1800" spc="-1" strike="noStrike">
                 <a:solidFill>
                   <a:srgbClr val="000000"/>
@@ -798,7 +798,7 @@
         <p:spPr>
           <a:xfrm>
             <a:off x="533520" y="763560"/>
-            <a:ext cx="6695280" cy="3763440"/>
+            <a:ext cx="6694920" cy="3763080"/>
           </a:xfrm>
           <a:prstGeom prst="rect">
             <a:avLst/>
@@ -818,7 +818,7 @@
         <p:spPr>
           <a:xfrm>
             <a:off x="777240" y="4777560"/>
-            <a:ext cx="6208920" cy="4517280"/>
+            <a:ext cx="6208560" cy="4516920"/>
           </a:xfrm>
           <a:prstGeom prst="rect">
             <a:avLst/>
@@ -844,7 +844,7 @@
         <p:spPr>
           <a:xfrm>
             <a:off x="4399200" y="9555480"/>
-            <a:ext cx="3364200" cy="493920"/>
+            <a:ext cx="3363840" cy="493560"/>
           </a:xfrm>
           <a:prstGeom prst="rect">
             <a:avLst/>
@@ -870,7 +870,7 @@
                 <a:spcPct val="100000"/>
               </a:lnSpc>
             </a:pPr>
-            <a:fld id="{74F3D403-F1E9-4453-A4F4-F470476A86C1}" type="slidenum">
+            <a:fld id="{78699F5E-6905-45A9-9F18-BB78920E5175}" type="slidenum">
               <a:rPr b="0" lang="de-DE" sz="1800" spc="-1" strike="noStrike">
                 <a:solidFill>
                   <a:srgbClr val="000000"/>
@@ -3636,7 +3636,7 @@
         <p:spPr>
           <a:xfrm>
             <a:off x="11444760" y="0"/>
-            <a:ext cx="742320" cy="6851160"/>
+            <a:ext cx="741960" cy="6850800"/>
           </a:xfrm>
           <a:prstGeom prst="rect">
             <a:avLst/>
@@ -3666,7 +3666,7 @@
         <p:spPr>
           <a:xfrm>
             <a:off x="11438640" y="6453360"/>
-            <a:ext cx="759240" cy="363960"/>
+            <a:ext cx="758880" cy="363960"/>
           </a:xfrm>
           <a:prstGeom prst="rect">
             <a:avLst/>
@@ -3692,7 +3692,7 @@
                 <a:spcPct val="100000"/>
               </a:lnSpc>
             </a:pPr>
-            <a:fld id="{45FAEB25-36C3-409F-8FA3-858EA52B074D}" type="slidenum">
+            <a:fld id="{8B487DCE-4476-4B05-9FDB-C80C2E89AA3E}" type="slidenum">
               <a:rPr b="0" lang="en-US" sz="1800" spc="-1" strike="noStrike">
                 <a:solidFill>
                   <a:srgbClr val="808080"/>
@@ -3717,7 +3717,7 @@
         <p:spPr>
           <a:xfrm>
             <a:off x="912240" y="1268280"/>
-            <a:ext cx="9209160" cy="362520"/>
+            <a:ext cx="9208800" cy="362160"/>
           </a:xfrm>
           <a:prstGeom prst="rect">
             <a:avLst/>
@@ -3747,7 +3747,7 @@
         <p:spPr>
           <a:xfrm>
             <a:off x="0" y="0"/>
-            <a:ext cx="3053160" cy="563040"/>
+            <a:ext cx="3052800" cy="562680"/>
           </a:xfrm>
           <a:prstGeom prst="rect">
             <a:avLst/>
@@ -3770,7 +3770,7 @@
         <p:spPr>
           <a:xfrm>
             <a:off x="7430400" y="134640"/>
-            <a:ext cx="3699000" cy="515160"/>
+            <a:ext cx="3698640" cy="514800"/>
           </a:xfrm>
           <a:prstGeom prst="rect">
             <a:avLst/>
@@ -3789,7 +3789,7 @@
         <p:spPr>
           <a:xfrm>
             <a:off x="912240" y="1268280"/>
-            <a:ext cx="9209160" cy="362520"/>
+            <a:ext cx="9208800" cy="362160"/>
           </a:xfrm>
           <a:prstGeom prst="rect">
             <a:avLst/>
@@ -3815,7 +3815,7 @@
         <p:spPr>
           <a:xfrm>
             <a:off x="11444760" y="0"/>
-            <a:ext cx="742320" cy="6851160"/>
+            <a:ext cx="741960" cy="6850800"/>
           </a:xfrm>
           <a:prstGeom prst="rect">
             <a:avLst/>
@@ -3845,7 +3845,7 @@
         <p:spPr>
           <a:xfrm>
             <a:off x="0" y="6642720"/>
-            <a:ext cx="12185280" cy="211320"/>
+            <a:ext cx="12184920" cy="211320"/>
           </a:xfrm>
           <a:prstGeom prst="rect">
             <a:avLst/>
@@ -4156,7 +4156,7 @@
         <p:spPr>
           <a:xfrm>
             <a:off x="11444760" y="0"/>
-            <a:ext cx="742320" cy="6851160"/>
+            <a:ext cx="741960" cy="6850800"/>
           </a:xfrm>
           <a:prstGeom prst="rect">
             <a:avLst/>
@@ -4186,7 +4186,7 @@
         <p:spPr>
           <a:xfrm>
             <a:off x="11438640" y="6453360"/>
-            <a:ext cx="759240" cy="363960"/>
+            <a:ext cx="758880" cy="363960"/>
           </a:xfrm>
           <a:prstGeom prst="rect">
             <a:avLst/>
@@ -4212,7 +4212,7 @@
                 <a:spcPct val="100000"/>
               </a:lnSpc>
             </a:pPr>
-            <a:fld id="{39C4D889-09C3-482F-AFC7-B479BA88DEF6}" type="slidenum">
+            <a:fld id="{E868A17C-70E1-4E76-88F7-E61BA3167273}" type="slidenum">
               <a:rPr b="0" lang="en-US" sz="1800" spc="-1" strike="noStrike">
                 <a:solidFill>
                   <a:srgbClr val="808080"/>
@@ -4237,7 +4237,7 @@
         <p:spPr>
           <a:xfrm>
             <a:off x="912240" y="1268280"/>
-            <a:ext cx="9209160" cy="362520"/>
+            <a:ext cx="9208800" cy="362160"/>
           </a:xfrm>
           <a:prstGeom prst="rect">
             <a:avLst/>
@@ -4267,7 +4267,7 @@
         <p:spPr>
           <a:xfrm>
             <a:off x="0" y="0"/>
-            <a:ext cx="3053160" cy="563040"/>
+            <a:ext cx="3052800" cy="562680"/>
           </a:xfrm>
           <a:prstGeom prst="rect">
             <a:avLst/>
@@ -4290,7 +4290,7 @@
         <p:spPr>
           <a:xfrm>
             <a:off x="7430400" y="134640"/>
-            <a:ext cx="3699000" cy="515160"/>
+            <a:ext cx="3698640" cy="514800"/>
           </a:xfrm>
           <a:prstGeom prst="rect">
             <a:avLst/>
@@ -4309,7 +4309,7 @@
         <p:spPr>
           <a:xfrm>
             <a:off x="11444760" y="0"/>
-            <a:ext cx="742320" cy="6851160"/>
+            <a:ext cx="741960" cy="6850800"/>
           </a:xfrm>
           <a:prstGeom prst="rect">
             <a:avLst/>
@@ -4339,7 +4339,7 @@
         <p:spPr>
           <a:xfrm>
             <a:off x="11438640" y="6453360"/>
-            <a:ext cx="759240" cy="363960"/>
+            <a:ext cx="758880" cy="363960"/>
           </a:xfrm>
           <a:prstGeom prst="rect">
             <a:avLst/>
@@ -4365,7 +4365,7 @@
                 <a:spcPct val="100000"/>
               </a:lnSpc>
             </a:pPr>
-            <a:fld id="{26633E3B-1C47-4214-B58F-DEE30A0E8F48}" type="slidenum">
+            <a:fld id="{6BB9EEAF-A27A-40F0-AAEE-E5DE892D9C16}" type="slidenum">
               <a:rPr b="0" lang="en-US" sz="1800" spc="-1" strike="noStrike">
                 <a:solidFill>
                   <a:srgbClr val="808080"/>
@@ -4390,7 +4390,7 @@
         <p:spPr>
           <a:xfrm>
             <a:off x="0" y="6642720"/>
-            <a:ext cx="12185280" cy="211320"/>
+            <a:ext cx="12184920" cy="211320"/>
           </a:xfrm>
           <a:prstGeom prst="rect">
             <a:avLst/>
@@ -4694,7 +4694,7 @@
         <p:spPr>
           <a:xfrm>
             <a:off x="527400" y="1412640"/>
-            <a:ext cx="10362240" cy="1148760"/>
+            <a:ext cx="10361880" cy="1148400"/>
           </a:xfrm>
           <a:prstGeom prst="rect">
             <a:avLst/>
@@ -4745,7 +4745,7 @@
         <p:spPr>
           <a:xfrm>
             <a:off x="527400" y="2852640"/>
-            <a:ext cx="10362240" cy="2369520"/>
+            <a:ext cx="10361880" cy="2369160"/>
           </a:xfrm>
           <a:prstGeom prst="rect">
             <a:avLst/>
@@ -4942,7 +4942,7 @@
         <p:spPr>
           <a:xfrm>
             <a:off x="335520" y="764640"/>
-            <a:ext cx="10746360" cy="497160"/>
+            <a:ext cx="10746000" cy="496800"/>
           </a:xfrm>
           <a:prstGeom prst="rect">
             <a:avLst/>
@@ -4993,7 +4993,7 @@
         <p:spPr>
           <a:xfrm>
             <a:off x="335520" y="1268280"/>
-            <a:ext cx="10746360" cy="5033880"/>
+            <a:ext cx="10746000" cy="5033520"/>
           </a:xfrm>
           <a:prstGeom prst="rect">
             <a:avLst/>
@@ -5014,7 +5014,7 @@
             <a:noAutofit/>
           </a:bodyPr>
           <a:p>
-            <a:pPr marL="195120" indent="-189000">
+            <a:pPr marL="195120" indent="-188640">
               <a:lnSpc>
                 <a:spcPct val="100000"/>
               </a:lnSpc>
@@ -5078,7 +5078,7 @@
             </a:endParaRPr>
           </a:p>
           <a:p>
-            <a:pPr marL="195120" indent="-189000">
+            <a:pPr marL="195120" indent="-188640">
               <a:lnSpc>
                 <a:spcPct val="100000"/>
               </a:lnSpc>
@@ -5107,7 +5107,7 @@
             </a:endParaRPr>
           </a:p>
           <a:p>
-            <a:pPr lvl="1" marL="432000" indent="-211680">
+            <a:pPr lvl="1" marL="432000" indent="-211320">
               <a:lnSpc>
                 <a:spcPct val="100000"/>
               </a:lnSpc>
@@ -5158,7 +5158,7 @@
             </a:endParaRPr>
           </a:p>
           <a:p>
-            <a:pPr lvl="1" marL="432000" indent="-211680">
+            <a:pPr lvl="1" marL="432000" indent="-211320">
               <a:lnSpc>
                 <a:spcPct val="100000"/>
               </a:lnSpc>
@@ -5222,7 +5222,7 @@
             </a:endParaRPr>
           </a:p>
           <a:p>
-            <a:pPr marL="195120" indent="-189000">
+            <a:pPr marL="195120" indent="-188640">
               <a:lnSpc>
                 <a:spcPct val="100000"/>
               </a:lnSpc>
@@ -5295,7 +5295,7 @@
             </a:endParaRPr>
           </a:p>
           <a:p>
-            <a:pPr lvl="1" marL="744120" indent="-280800">
+            <a:pPr lvl="1" marL="744120" indent="-280440">
               <a:lnSpc>
                 <a:spcPct val="100000"/>
               </a:lnSpc>
@@ -5337,7 +5337,7 @@
             </a:endParaRPr>
           </a:p>
           <a:p>
-            <a:pPr marL="195120" indent="-189000">
+            <a:pPr marL="195120" indent="-188640">
               <a:lnSpc>
                 <a:spcPct val="100000"/>
               </a:lnSpc>
@@ -5379,7 +5379,7 @@
             </a:endParaRPr>
           </a:p>
           <a:p>
-            <a:pPr marL="195120" indent="-189000" algn="ctr">
+            <a:pPr marL="195120" indent="-188640" algn="ctr">
               <a:lnSpc>
                 <a:spcPct val="100000"/>
               </a:lnSpc>
@@ -5501,7 +5501,7 @@
         <p:spPr>
           <a:xfrm>
             <a:off x="335520" y="764640"/>
-            <a:ext cx="10746360" cy="497160"/>
+            <a:ext cx="10746000" cy="496800"/>
           </a:xfrm>
           <a:prstGeom prst="rect">
             <a:avLst/>
@@ -5572,7 +5572,7 @@
         <p:spPr>
           <a:xfrm>
             <a:off x="335520" y="1268640"/>
-            <a:ext cx="10746360" cy="5033880"/>
+            <a:ext cx="10746000" cy="5033520"/>
           </a:xfrm>
           <a:prstGeom prst="rect">
             <a:avLst/>
@@ -5593,7 +5593,7 @@
             <a:noAutofit/>
           </a:bodyPr>
           <a:p>
-            <a:pPr marL="195120" indent="-189000">
+            <a:pPr marL="195120" indent="-188640">
               <a:lnSpc>
                 <a:spcPct val="100000"/>
               </a:lnSpc>
@@ -5633,7 +5633,7 @@
             </a:endParaRPr>
           </a:p>
           <a:p>
-            <a:pPr lvl="1" marL="432000" indent="-211680">
+            <a:pPr lvl="1" marL="432000" indent="-211320">
               <a:lnSpc>
                 <a:spcPct val="100000"/>
               </a:lnSpc>
@@ -5682,7 +5682,7 @@
             </a:endParaRPr>
           </a:p>
           <a:p>
-            <a:pPr lvl="1" marL="432000" indent="-211680">
+            <a:pPr lvl="1" marL="432000" indent="-211320">
               <a:lnSpc>
                 <a:spcPct val="100000"/>
               </a:lnSpc>
@@ -5724,7 +5724,7 @@
             </a:endParaRPr>
           </a:p>
           <a:p>
-            <a:pPr marL="195120" indent="-189000">
+            <a:pPr marL="195120" indent="-188640">
               <a:lnSpc>
                 <a:spcPct val="100000"/>
               </a:lnSpc>
@@ -5754,7 +5754,7 @@
             </a:endParaRPr>
           </a:p>
           <a:p>
-            <a:pPr lvl="1" marL="432000" indent="-211680">
+            <a:pPr lvl="1" marL="432000" indent="-211320">
               <a:lnSpc>
                 <a:spcPct val="100000"/>
               </a:lnSpc>
@@ -5843,7 +5843,7 @@
             </a:endParaRPr>
           </a:p>
           <a:p>
-            <a:pPr lvl="1" marL="432000" indent="-211680">
+            <a:pPr lvl="1" marL="432000" indent="-211320">
               <a:lnSpc>
                 <a:spcPct val="100000"/>
               </a:lnSpc>
@@ -5894,7 +5894,7 @@
             </a:endParaRPr>
           </a:p>
           <a:p>
-            <a:pPr marL="195120" indent="-189000">
+            <a:pPr marL="195120" indent="-188640">
               <a:lnSpc>
                 <a:spcPct val="100000"/>
               </a:lnSpc>
@@ -5924,7 +5924,7 @@
             </a:endParaRPr>
           </a:p>
           <a:p>
-            <a:pPr lvl="1" marL="432000" indent="-211680">
+            <a:pPr lvl="1" marL="432000" indent="-211320">
               <a:lnSpc>
                 <a:spcPct val="100000"/>
               </a:lnSpc>
@@ -6033,7 +6033,7 @@
             </a:endParaRPr>
           </a:p>
           <a:p>
-            <a:pPr lvl="1" marL="432000" indent="-211680">
+            <a:pPr lvl="1" marL="432000" indent="-211320">
               <a:lnSpc>
                 <a:spcPct val="100000"/>
               </a:lnSpc>
@@ -6124,7 +6124,7 @@
         <p:spPr>
           <a:xfrm>
             <a:off x="335520" y="764640"/>
-            <a:ext cx="10746360" cy="497160"/>
+            <a:ext cx="10746000" cy="496800"/>
           </a:xfrm>
           <a:prstGeom prst="rect">
             <a:avLst/>
@@ -6175,7 +6175,7 @@
         <p:spPr>
           <a:xfrm>
             <a:off x="335520" y="1268280"/>
-            <a:ext cx="10746360" cy="5033880"/>
+            <a:ext cx="10746000" cy="5033520"/>
           </a:xfrm>
           <a:prstGeom prst="rect">
             <a:avLst/>
@@ -6219,7 +6219,7 @@
             </a:endParaRPr>
           </a:p>
           <a:p>
-            <a:pPr marL="195120" indent="-189000">
+            <a:pPr marL="195120" indent="-188640">
               <a:lnSpc>
                 <a:spcPct val="100000"/>
               </a:lnSpc>
@@ -6288,7 +6288,7 @@
             </a:endParaRPr>
           </a:p>
           <a:p>
-            <a:pPr marL="195120" indent="-189000">
+            <a:pPr marL="195120" indent="-188640">
               <a:lnSpc>
                 <a:spcPct val="100000"/>
               </a:lnSpc>
@@ -6347,7 +6347,7 @@
             </a:endParaRPr>
           </a:p>
           <a:p>
-            <a:pPr marL="195120" indent="-189000">
+            <a:pPr marL="195120" indent="-188640">
               <a:lnSpc>
                 <a:spcPct val="100000"/>
               </a:lnSpc>
@@ -6376,7 +6376,7 @@
             </a:endParaRPr>
           </a:p>
           <a:p>
-            <a:pPr marL="195120" indent="-189000">
+            <a:pPr marL="195120" indent="-188640">
               <a:lnSpc>
                 <a:spcPct val="100000"/>
               </a:lnSpc>
@@ -6405,7 +6405,7 @@
             </a:endParaRPr>
           </a:p>
           <a:p>
-            <a:pPr marL="195120" indent="-189000">
+            <a:pPr marL="195120" indent="-188640">
               <a:lnSpc>
                 <a:spcPct val="100000"/>
               </a:lnSpc>
@@ -6674,7 +6674,7 @@
         <p:spPr>
           <a:xfrm>
             <a:off x="335520" y="764640"/>
-            <a:ext cx="10746360" cy="497160"/>
+            <a:ext cx="10746000" cy="496800"/>
           </a:xfrm>
           <a:prstGeom prst="rect">
             <a:avLst/>
@@ -6725,7 +6725,7 @@
         <p:spPr>
           <a:xfrm>
             <a:off x="335520" y="1268280"/>
-            <a:ext cx="10746360" cy="5033880"/>
+            <a:ext cx="10746000" cy="5033520"/>
           </a:xfrm>
           <a:prstGeom prst="rect">
             <a:avLst/>
@@ -6769,7 +6769,7 @@
             </a:endParaRPr>
           </a:p>
           <a:p>
-            <a:pPr marL="195120" indent="-189000">
+            <a:pPr marL="195120" indent="-188640">
               <a:lnSpc>
                 <a:spcPct val="100000"/>
               </a:lnSpc>
@@ -6838,7 +6838,7 @@
             </a:endParaRPr>
           </a:p>
           <a:p>
-            <a:pPr marL="195120" indent="-189000">
+            <a:pPr marL="195120" indent="-188640">
               <a:lnSpc>
                 <a:spcPct val="100000"/>
               </a:lnSpc>
@@ -6897,7 +6897,7 @@
             </a:endParaRPr>
           </a:p>
           <a:p>
-            <a:pPr marL="195120" indent="-189000">
+            <a:pPr marL="195120" indent="-188640">
               <a:lnSpc>
                 <a:spcPct val="100000"/>
               </a:lnSpc>
@@ -6926,7 +6926,7 @@
             </a:endParaRPr>
           </a:p>
           <a:p>
-            <a:pPr marL="195120" indent="-189000">
+            <a:pPr marL="195120" indent="-188640">
               <a:lnSpc>
                 <a:spcPct val="100000"/>
               </a:lnSpc>
@@ -6955,7 +6955,7 @@
             </a:endParaRPr>
           </a:p>
           <a:p>
-            <a:pPr marL="195120" indent="-189000">
+            <a:pPr marL="195120" indent="-188640">
               <a:lnSpc>
                 <a:spcPct val="100000"/>
               </a:lnSpc>
@@ -6997,7 +6997,7 @@
             </a:endParaRPr>
           </a:p>
           <a:p>
-            <a:pPr marL="195120" indent="-189000">
+            <a:pPr marL="195120" indent="-188640">
               <a:lnSpc>
                 <a:spcPct val="100000"/>
               </a:lnSpc>
@@ -7026,7 +7026,7 @@
             </a:endParaRPr>
           </a:p>
           <a:p>
-            <a:pPr lvl="1" marL="744120" indent="-280800">
+            <a:pPr lvl="1" marL="744120" indent="-280440">
               <a:lnSpc>
                 <a:spcPct val="100000"/>
               </a:lnSpc>
@@ -7055,7 +7055,7 @@
             </a:endParaRPr>
           </a:p>
           <a:p>
-            <a:pPr lvl="1" marL="744120" indent="-280800">
+            <a:pPr lvl="1" marL="744120" indent="-280440">
               <a:lnSpc>
                 <a:spcPct val="100000"/>
               </a:lnSpc>
@@ -7084,7 +7084,7 @@
             </a:endParaRPr>
           </a:p>
           <a:p>
-            <a:pPr lvl="1" marL="744120" indent="-280800">
+            <a:pPr lvl="1" marL="744120" indent="-280440">
               <a:lnSpc>
                 <a:spcPct val="100000"/>
               </a:lnSpc>
@@ -7113,7 +7113,7 @@
             </a:endParaRPr>
           </a:p>
           <a:p>
-            <a:pPr lvl="1" marL="744120" indent="-280800">
+            <a:pPr lvl="1" marL="744120" indent="-280440">
               <a:lnSpc>
                 <a:spcPct val="100000"/>
               </a:lnSpc>
@@ -7142,7 +7142,7 @@
             </a:endParaRPr>
           </a:p>
           <a:p>
-            <a:pPr lvl="1" marL="744120" indent="-280800">
+            <a:pPr lvl="1" marL="744120" indent="-280440">
               <a:lnSpc>
                 <a:spcPct val="100000"/>
               </a:lnSpc>
@@ -7260,7 +7260,7 @@
         <p:spPr>
           <a:xfrm>
             <a:off x="335520" y="764640"/>
-            <a:ext cx="10746360" cy="497160"/>
+            <a:ext cx="10746000" cy="496800"/>
           </a:xfrm>
           <a:prstGeom prst="rect">
             <a:avLst/>
@@ -7311,7 +7311,7 @@
         <p:spPr>
           <a:xfrm>
             <a:off x="335520" y="1268640"/>
-            <a:ext cx="10746360" cy="5033880"/>
+            <a:ext cx="10746000" cy="5033520"/>
           </a:xfrm>
           <a:prstGeom prst="rect">
             <a:avLst/>
@@ -7332,7 +7332,7 @@
             <a:noAutofit/>
           </a:bodyPr>
           <a:p>
-            <a:pPr marL="195120" indent="-189000">
+            <a:pPr marL="195120" indent="-188640">
               <a:lnSpc>
                 <a:spcPct val="100000"/>
               </a:lnSpc>
@@ -7361,7 +7361,7 @@
             </a:endParaRPr>
           </a:p>
           <a:p>
-            <a:pPr lvl="1" marL="744120" indent="-280800">
+            <a:pPr lvl="1" marL="744120" indent="-280440">
               <a:lnSpc>
                 <a:spcPct val="100000"/>
               </a:lnSpc>
@@ -7403,7 +7403,7 @@
             </a:endParaRPr>
           </a:p>
           <a:p>
-            <a:pPr marL="195120" indent="-189000">
+            <a:pPr marL="195120" indent="-188640">
               <a:lnSpc>
                 <a:spcPct val="100000"/>
               </a:lnSpc>
@@ -7432,7 +7432,7 @@
             </a:endParaRPr>
           </a:p>
           <a:p>
-            <a:pPr lvl="1" marL="744120" indent="-280800">
+            <a:pPr lvl="1" marL="744120" indent="-280440">
               <a:lnSpc>
                 <a:spcPct val="100000"/>
               </a:lnSpc>
@@ -7461,7 +7461,7 @@
             </a:endParaRPr>
           </a:p>
           <a:p>
-            <a:pPr lvl="1" marL="744120" indent="-280800">
+            <a:pPr lvl="1" marL="744120" indent="-280440">
               <a:lnSpc>
                 <a:spcPct val="100000"/>
               </a:lnSpc>
@@ -7510,7 +7510,7 @@
             </a:endParaRPr>
           </a:p>
           <a:p>
-            <a:pPr lvl="1" marL="744120" indent="-280800">
+            <a:pPr lvl="1" marL="744120" indent="-280440">
               <a:lnSpc>
                 <a:spcPct val="100000"/>
               </a:lnSpc>
@@ -7579,7 +7579,7 @@
         <p:spPr>
           <a:xfrm>
             <a:off x="335520" y="764640"/>
-            <a:ext cx="10746360" cy="497160"/>
+            <a:ext cx="10746000" cy="496800"/>
           </a:xfrm>
           <a:prstGeom prst="rect">
             <a:avLst/>
@@ -7630,7 +7630,7 @@
         <p:spPr>
           <a:xfrm>
             <a:off x="335520" y="1268280"/>
-            <a:ext cx="10746360" cy="5033880"/>
+            <a:ext cx="10746000" cy="5033520"/>
           </a:xfrm>
           <a:prstGeom prst="rect">
             <a:avLst/>
@@ -7664,7 +7664,7 @@
             </a:endParaRPr>
           </a:p>
           <a:p>
-            <a:pPr marL="195120" indent="-189000">
+            <a:pPr marL="195120" indent="-188640">
               <a:lnSpc>
                 <a:spcPct val="100000"/>
               </a:lnSpc>
@@ -7720,7 +7720,7 @@
         <p:spPr>
           <a:xfrm>
             <a:off x="6285600" y="2132640"/>
-            <a:ext cx="515880" cy="495720"/>
+            <a:ext cx="515520" cy="495360"/>
           </a:xfrm>
           <a:prstGeom prst="star5">
             <a:avLst>
@@ -7762,7 +7762,7 @@
         <p:spPr>
           <a:xfrm>
             <a:off x="4089960" y="2247480"/>
-            <a:ext cx="2284200" cy="363960"/>
+            <a:ext cx="2283840" cy="363960"/>
           </a:xfrm>
           <a:prstGeom prst="rect">
             <a:avLst/>
@@ -7863,7 +7863,7 @@
         <p:spPr>
           <a:xfrm>
             <a:off x="335520" y="764640"/>
-            <a:ext cx="10746360" cy="497160"/>
+            <a:ext cx="10746000" cy="496800"/>
           </a:xfrm>
           <a:prstGeom prst="rect">
             <a:avLst/>
@@ -7914,7 +7914,7 @@
         <p:spPr>
           <a:xfrm>
             <a:off x="335520" y="1268640"/>
-            <a:ext cx="10746360" cy="5033880"/>
+            <a:ext cx="10746000" cy="5033520"/>
           </a:xfrm>
           <a:prstGeom prst="rect">
             <a:avLst/>
@@ -7935,7 +7935,7 @@
             <a:noAutofit/>
           </a:bodyPr>
           <a:p>
-            <a:pPr marL="195120" indent="-189000">
+            <a:pPr marL="195120" indent="-188640">
               <a:lnSpc>
                 <a:spcPct val="100000"/>
               </a:lnSpc>
@@ -7997,7 +7997,7 @@
             </a:endParaRPr>
           </a:p>
           <a:p>
-            <a:pPr marL="195120" indent="-189000">
+            <a:pPr marL="195120" indent="-188640">
               <a:lnSpc>
                 <a:spcPct val="100000"/>
               </a:lnSpc>
@@ -8046,7 +8046,7 @@
             </a:endParaRPr>
           </a:p>
           <a:p>
-            <a:pPr marL="195120" indent="-189000">
+            <a:pPr marL="195120" indent="-188640">
               <a:lnSpc>
                 <a:spcPct val="100000"/>
               </a:lnSpc>
@@ -8095,7 +8095,7 @@
             </a:endParaRPr>
           </a:p>
           <a:p>
-            <a:pPr marL="195120" indent="-189000">
+            <a:pPr marL="195120" indent="-188640">
               <a:lnSpc>
                 <a:spcPct val="100000"/>
               </a:lnSpc>
@@ -8144,7 +8144,7 @@
             </a:endParaRPr>
           </a:p>
           <a:p>
-            <a:pPr marL="195120" indent="-189000">
+            <a:pPr marL="195120" indent="-188640">
               <a:lnSpc>
                 <a:spcPct val="100000"/>
               </a:lnSpc>
@@ -8193,7 +8193,7 @@
             </a:endParaRPr>
           </a:p>
           <a:p>
-            <a:pPr marL="195120" indent="-189000">
+            <a:pPr marL="195120" indent="-188640">
               <a:lnSpc>
                 <a:spcPct val="100000"/>
               </a:lnSpc>
@@ -8242,7 +8242,7 @@
             </a:endParaRPr>
           </a:p>
           <a:p>
-            <a:pPr marL="195120" indent="-189000">
+            <a:pPr marL="195120" indent="-188640">
               <a:lnSpc>
                 <a:spcPct val="100000"/>
               </a:lnSpc>
@@ -8291,7 +8291,7 @@
             </a:endParaRPr>
           </a:p>
           <a:p>
-            <a:pPr marL="195120" indent="-189000">
+            <a:pPr marL="195120" indent="-188640">
               <a:lnSpc>
                 <a:spcPct val="100000"/>
               </a:lnSpc>
@@ -8340,7 +8340,7 @@
             </a:endParaRPr>
           </a:p>
           <a:p>
-            <a:pPr marL="195120" indent="-189000">
+            <a:pPr marL="195120" indent="-188640">
               <a:lnSpc>
                 <a:spcPct val="100000"/>
               </a:lnSpc>
@@ -8389,7 +8389,7 @@
             </a:endParaRPr>
           </a:p>
           <a:p>
-            <a:pPr marL="195120" indent="-189000">
+            <a:pPr marL="195120" indent="-188640">
               <a:lnSpc>
                 <a:spcPct val="100000"/>
               </a:lnSpc>
@@ -8478,7 +8478,7 @@
         <p:spPr>
           <a:xfrm>
             <a:off x="335520" y="764640"/>
-            <a:ext cx="10746360" cy="497160"/>
+            <a:ext cx="10746000" cy="496800"/>
           </a:xfrm>
           <a:prstGeom prst="rect">
             <a:avLst/>
@@ -8529,7 +8529,7 @@
         <p:spPr>
           <a:xfrm>
             <a:off x="335520" y="1268640"/>
-            <a:ext cx="10746360" cy="5033880"/>
+            <a:ext cx="10746000" cy="5033520"/>
           </a:xfrm>
           <a:prstGeom prst="rect">
             <a:avLst/>
@@ -8550,7 +8550,7 @@
             <a:noAutofit/>
           </a:bodyPr>
           <a:p>
-            <a:pPr marL="195120" indent="-189000">
+            <a:pPr marL="195120" indent="-188640">
               <a:lnSpc>
                 <a:spcPct val="100000"/>
               </a:lnSpc>
@@ -8599,7 +8599,7 @@
             </a:endParaRPr>
           </a:p>
           <a:p>
-            <a:pPr marL="195120" indent="-189000">
+            <a:pPr marL="195120" indent="-188640">
               <a:lnSpc>
                 <a:spcPct val="100000"/>
               </a:lnSpc>
@@ -8648,7 +8648,7 @@
             </a:endParaRPr>
           </a:p>
           <a:p>
-            <a:pPr marL="195120" indent="-189000">
+            <a:pPr marL="195120" indent="-188640">
               <a:lnSpc>
                 <a:spcPct val="100000"/>
               </a:lnSpc>
@@ -8737,7 +8737,7 @@
         <p:spPr>
           <a:xfrm>
             <a:off x="335520" y="764640"/>
-            <a:ext cx="10746360" cy="497160"/>
+            <a:ext cx="10746000" cy="496800"/>
           </a:xfrm>
           <a:prstGeom prst="rect">
             <a:avLst/>
@@ -8788,7 +8788,7 @@
         <p:spPr>
           <a:xfrm>
             <a:off x="335520" y="1268640"/>
-            <a:ext cx="10743120" cy="5030640"/>
+            <a:ext cx="10742760" cy="5030280"/>
           </a:xfrm>
           <a:prstGeom prst="rect">
             <a:avLst/>
@@ -8809,7 +8809,7 @@
             <a:noAutofit/>
           </a:bodyPr>
           <a:p>
-            <a:pPr marL="195120" indent="-189000">
+            <a:pPr marL="195120" indent="-188640">
               <a:lnSpc>
                 <a:spcPct val="100000"/>
               </a:lnSpc>
@@ -8850,7 +8850,7 @@
             </a:endParaRPr>
           </a:p>
           <a:p>
-            <a:pPr marL="195120" indent="-189000">
+            <a:pPr marL="195120" indent="-188640">
               <a:lnSpc>
                 <a:spcPct val="100000"/>
               </a:lnSpc>
@@ -8901,7 +8901,7 @@
             </a:endParaRPr>
           </a:p>
           <a:p>
-            <a:pPr marL="195120" indent="-189000">
+            <a:pPr marL="195120" indent="-188640">
               <a:lnSpc>
                 <a:spcPct val="100000"/>
               </a:lnSpc>
@@ -8955,7 +8955,7 @@
             </a:endParaRPr>
           </a:p>
           <a:p>
-            <a:pPr marL="195120" indent="-189000">
+            <a:pPr marL="195120" indent="-188640">
               <a:lnSpc>
                 <a:spcPct val="100000"/>
               </a:lnSpc>
@@ -8984,7 +8984,7 @@
             </a:endParaRPr>
           </a:p>
           <a:p>
-            <a:pPr lvl="1" marL="432000" indent="-215280">
+            <a:pPr lvl="1" marL="432000" indent="-214920">
               <a:lnSpc>
                 <a:spcPct val="100000"/>
               </a:lnSpc>
@@ -9032,7 +9032,7 @@
             </a:endParaRPr>
           </a:p>
           <a:p>
-            <a:pPr lvl="1" marL="432000" indent="-215280">
+            <a:pPr lvl="1" marL="432000" indent="-214920">
               <a:lnSpc>
                 <a:spcPct val="100000"/>
               </a:lnSpc>
@@ -9083,7 +9083,7 @@
             </a:endParaRPr>
           </a:p>
           <a:p>
-            <a:pPr lvl="1" marL="432000" indent="-215280">
+            <a:pPr lvl="1" marL="432000" indent="-214920">
               <a:lnSpc>
                 <a:spcPct val="100000"/>
               </a:lnSpc>
@@ -9174,7 +9174,7 @@
         <p:spPr>
           <a:xfrm>
             <a:off x="335520" y="1268640"/>
-            <a:ext cx="10746360" cy="5033880"/>
+            <a:ext cx="10746000" cy="5033520"/>
           </a:xfrm>
           <a:prstGeom prst="rect">
             <a:avLst/>
@@ -9231,7 +9231,7 @@
         <p:spPr>
           <a:xfrm>
             <a:off x="335520" y="764640"/>
-            <a:ext cx="10746360" cy="497160"/>
+            <a:ext cx="10746000" cy="496800"/>
           </a:xfrm>
           <a:prstGeom prst="rect">
             <a:avLst/>
@@ -9287,7 +9287,7 @@
         <p:spPr>
           <a:xfrm>
             <a:off x="335520" y="764640"/>
-            <a:ext cx="10744200" cy="495000"/>
+            <a:ext cx="10740240" cy="491040"/>
           </a:xfrm>
           <a:prstGeom prst="rect">
             <a:avLst/>
@@ -9338,7 +9338,7 @@
         <p:spPr>
           <a:xfrm>
             <a:off x="335520" y="1268280"/>
-            <a:ext cx="10744200" cy="5031720"/>
+            <a:ext cx="10740240" cy="5027760"/>
           </a:xfrm>
           <a:prstGeom prst="rect">
             <a:avLst/>
@@ -9369,7 +9369,7 @@
             </a:endParaRPr>
           </a:p>
           <a:p>
-            <a:pPr marL="195120" indent="-186840">
+            <a:pPr marL="195120" indent="-182880">
               <a:lnSpc>
                 <a:spcPct val="100000"/>
               </a:lnSpc>
@@ -9453,7 +9453,7 @@
             </a:endParaRPr>
           </a:p>
           <a:p>
-            <a:pPr marL="195120" indent="-186840">
+            <a:pPr marL="195120" indent="-182880">
               <a:lnSpc>
                 <a:spcPct val="100000"/>
               </a:lnSpc>
@@ -9557,7 +9557,7 @@
         <p:spPr>
           <a:xfrm>
             <a:off x="335520" y="764640"/>
-            <a:ext cx="10746360" cy="497160"/>
+            <a:ext cx="10746000" cy="496800"/>
           </a:xfrm>
           <a:prstGeom prst="rect">
             <a:avLst/>
@@ -9612,7 +9612,7 @@
         <p:spPr>
           <a:xfrm>
             <a:off x="2374920" y="2133000"/>
-            <a:ext cx="1469160" cy="2170440"/>
+            <a:ext cx="1468800" cy="2170080"/>
           </a:xfrm>
           <a:prstGeom prst="rect">
             <a:avLst/>
@@ -9635,7 +9635,7 @@
         <p:spPr>
           <a:xfrm>
             <a:off x="6960240" y="2525760"/>
-            <a:ext cx="1783080" cy="1775160"/>
+            <a:ext cx="1782720" cy="1774800"/>
           </a:xfrm>
           <a:prstGeom prst="rect">
             <a:avLst/>
@@ -9654,7 +9654,7 @@
         <p:spPr>
           <a:xfrm>
             <a:off x="1310400" y="4249080"/>
-            <a:ext cx="3633840" cy="675360"/>
+            <a:ext cx="3633480" cy="675000"/>
           </a:xfrm>
           <a:prstGeom prst="rect">
             <a:avLst/>
@@ -9731,7 +9731,7 @@
         <p:spPr>
           <a:xfrm>
             <a:off x="6013080" y="4269960"/>
-            <a:ext cx="3633840" cy="675360"/>
+            <a:ext cx="3633480" cy="675000"/>
           </a:xfrm>
           <a:prstGeom prst="rect">
             <a:avLst/>
@@ -9838,7 +9838,7 @@
         <p:spPr>
           <a:xfrm>
             <a:off x="542880" y="721800"/>
-            <a:ext cx="10352160" cy="492840"/>
+            <a:ext cx="10351800" cy="492480"/>
           </a:xfrm>
           <a:prstGeom prst="rect">
             <a:avLst/>
@@ -9889,7 +9889,7 @@
         <p:spPr>
           <a:xfrm>
             <a:off x="451800" y="1709280"/>
-            <a:ext cx="8219520" cy="4347720"/>
+            <a:ext cx="8219160" cy="4347360"/>
           </a:xfrm>
           <a:prstGeom prst="rect">
             <a:avLst/>
@@ -9915,7 +9915,7 @@
         <p:spPr>
           <a:xfrm>
             <a:off x="609480" y="1769400"/>
-            <a:ext cx="10582560" cy="4850640"/>
+            <a:ext cx="10582200" cy="4850280"/>
           </a:xfrm>
           <a:prstGeom prst="rect">
             <a:avLst/>
@@ -9936,7 +9936,7 @@
             <a:normAutofit/>
           </a:bodyPr>
           <a:p>
-            <a:pPr marL="216000" indent="-210960">
+            <a:pPr marL="216000" indent="-210600">
               <a:lnSpc>
                 <a:spcPct val="90000"/>
               </a:lnSpc>
@@ -10045,7 +10045,7 @@
             </a:endParaRPr>
           </a:p>
           <a:p>
-            <a:pPr marL="216000" indent="-210960">
+            <a:pPr marL="216000" indent="-210600">
               <a:lnSpc>
                 <a:spcPct val="100000"/>
               </a:lnSpc>
@@ -10074,7 +10074,7 @@
             </a:endParaRPr>
           </a:p>
           <a:p>
-            <a:pPr lvl="1" marL="685800" indent="-223560">
+            <a:pPr lvl="1" marL="685800" indent="-223200">
               <a:lnSpc>
                 <a:spcPct val="100000"/>
               </a:lnSpc>
@@ -10103,7 +10103,7 @@
             </a:endParaRPr>
           </a:p>
           <a:p>
-            <a:pPr lvl="1" marL="685800" indent="-223560">
+            <a:pPr lvl="1" marL="685800" indent="-223200">
               <a:lnSpc>
                 <a:spcPct val="100000"/>
               </a:lnSpc>
@@ -10132,7 +10132,7 @@
             </a:endParaRPr>
           </a:p>
           <a:p>
-            <a:pPr lvl="1" marL="685800" indent="-223560">
+            <a:pPr lvl="1" marL="685800" indent="-223200">
               <a:lnSpc>
                 <a:spcPct val="100000"/>
               </a:lnSpc>
@@ -10161,7 +10161,7 @@
             </a:endParaRPr>
           </a:p>
           <a:p>
-            <a:pPr lvl="1" marL="685800" indent="-223560">
+            <a:pPr lvl="1" marL="685800" indent="-223200">
               <a:lnSpc>
                 <a:spcPct val="100000"/>
               </a:lnSpc>
@@ -10190,7 +10190,7 @@
             </a:endParaRPr>
           </a:p>
           <a:p>
-            <a:pPr marL="216000" indent="-210960">
+            <a:pPr marL="216000" indent="-210600">
               <a:lnSpc>
                 <a:spcPct val="100000"/>
               </a:lnSpc>
@@ -10219,7 +10219,7 @@
             </a:endParaRPr>
           </a:p>
           <a:p>
-            <a:pPr lvl="1" marL="685800" indent="-223560">
+            <a:pPr lvl="1" marL="685800" indent="-223200">
               <a:lnSpc>
                 <a:spcPct val="100000"/>
               </a:lnSpc>
@@ -10248,7 +10248,7 @@
             </a:endParaRPr>
           </a:p>
           <a:p>
-            <a:pPr lvl="1" marL="685800" indent="-223560">
+            <a:pPr lvl="1" marL="685800" indent="-223200">
               <a:lnSpc>
                 <a:spcPct val="100000"/>
               </a:lnSpc>
@@ -10317,7 +10317,7 @@
         <p:spPr>
           <a:xfrm>
             <a:off x="542880" y="721800"/>
-            <a:ext cx="10352160" cy="492840"/>
+            <a:ext cx="10351800" cy="492480"/>
           </a:xfrm>
           <a:prstGeom prst="rect">
             <a:avLst/>
@@ -10368,7 +10368,7 @@
         <p:spPr>
           <a:xfrm>
             <a:off x="451800" y="1709280"/>
-            <a:ext cx="8219520" cy="4347720"/>
+            <a:ext cx="8219160" cy="4347360"/>
           </a:xfrm>
           <a:prstGeom prst="rect">
             <a:avLst/>
@@ -10394,7 +10394,7 @@
         <p:spPr>
           <a:xfrm>
             <a:off x="609480" y="1769400"/>
-            <a:ext cx="10582560" cy="4850640"/>
+            <a:ext cx="10582200" cy="4850280"/>
           </a:xfrm>
           <a:prstGeom prst="rect">
             <a:avLst/>
@@ -10415,7 +10415,7 @@
             <a:normAutofit/>
           </a:bodyPr>
           <a:p>
-            <a:pPr marL="216000" indent="-210960">
+            <a:pPr marL="216000" indent="-210600">
               <a:lnSpc>
                 <a:spcPct val="90000"/>
               </a:lnSpc>
@@ -10466,7 +10466,7 @@
             </a:endParaRPr>
           </a:p>
           <a:p>
-            <a:pPr lvl="1" marL="685800" indent="-223560">
+            <a:pPr lvl="1" marL="685800" indent="-223200">
               <a:lnSpc>
                 <a:spcPct val="100000"/>
               </a:lnSpc>
@@ -10495,7 +10495,7 @@
             </a:endParaRPr>
           </a:p>
           <a:p>
-            <a:pPr lvl="1" marL="685800" indent="-223560">
+            <a:pPr lvl="1" marL="685800" indent="-223200">
               <a:lnSpc>
                 <a:spcPct val="100000"/>
               </a:lnSpc>
@@ -10537,7 +10537,7 @@
             </a:endParaRPr>
           </a:p>
           <a:p>
-            <a:pPr marL="216000" indent="-210960">
+            <a:pPr marL="216000" indent="-210600">
               <a:lnSpc>
                 <a:spcPct val="90000"/>
               </a:lnSpc>
@@ -10569,7 +10569,7 @@
             </a:endParaRPr>
           </a:p>
           <a:p>
-            <a:pPr lvl="1" marL="685800" indent="-223560">
+            <a:pPr lvl="1" marL="685800" indent="-223200">
               <a:lnSpc>
                 <a:spcPct val="100000"/>
               </a:lnSpc>
@@ -10623,7 +10623,7 @@
             </a:endParaRPr>
           </a:p>
           <a:p>
-            <a:pPr lvl="1" marL="685800" indent="-223560">
+            <a:pPr lvl="1" marL="685800" indent="-223200">
               <a:lnSpc>
                 <a:spcPct val="100000"/>
               </a:lnSpc>
@@ -10677,7 +10677,7 @@
             </a:endParaRPr>
           </a:p>
           <a:p>
-            <a:pPr marL="228600" indent="-223560">
+            <a:pPr marL="228600" indent="-223200">
               <a:lnSpc>
                 <a:spcPct val="90000"/>
               </a:lnSpc>
@@ -10693,7 +10693,7 @@
             </a:endParaRPr>
           </a:p>
           <a:p>
-            <a:pPr marL="228600" indent="-223560" algn="ctr">
+            <a:pPr marL="228600" indent="-223200" algn="ctr">
               <a:lnSpc>
                 <a:spcPct val="90000"/>
               </a:lnSpc>
@@ -10719,7 +10719,7 @@
             </a:endParaRPr>
           </a:p>
           <a:p>
-            <a:pPr marL="457200" indent="-223560" algn="ctr">
+            <a:pPr marL="457200" indent="-223200" algn="ctr">
               <a:lnSpc>
                 <a:spcPct val="90000"/>
               </a:lnSpc>
@@ -10795,7 +10795,7 @@
         <p:spPr>
           <a:xfrm>
             <a:off x="542880" y="721800"/>
-            <a:ext cx="10352160" cy="492840"/>
+            <a:ext cx="10351800" cy="492480"/>
           </a:xfrm>
           <a:prstGeom prst="rect">
             <a:avLst/>
@@ -10846,7 +10846,7 @@
         <p:spPr>
           <a:xfrm>
             <a:off x="451800" y="1709280"/>
-            <a:ext cx="8219520" cy="4347720"/>
+            <a:ext cx="8219160" cy="4347360"/>
           </a:xfrm>
           <a:prstGeom prst="rect">
             <a:avLst/>
@@ -10872,7 +10872,7 @@
         <p:spPr>
           <a:xfrm>
             <a:off x="609480" y="1769400"/>
-            <a:ext cx="10582560" cy="4850640"/>
+            <a:ext cx="10582200" cy="4850280"/>
           </a:xfrm>
           <a:prstGeom prst="rect">
             <a:avLst/>
@@ -10893,7 +10893,7 @@
             <a:normAutofit/>
           </a:bodyPr>
           <a:p>
-            <a:pPr marL="216000" indent="-210960">
+            <a:pPr marL="216000" indent="-210600">
               <a:lnSpc>
                 <a:spcPct val="90000"/>
               </a:lnSpc>
@@ -10944,7 +10944,7 @@
             </a:endParaRPr>
           </a:p>
           <a:p>
-            <a:pPr lvl="1" marL="685800" indent="-223560">
+            <a:pPr lvl="1" marL="685800" indent="-223200">
               <a:lnSpc>
                 <a:spcPct val="100000"/>
               </a:lnSpc>
@@ -10973,7 +10973,7 @@
             </a:endParaRPr>
           </a:p>
           <a:p>
-            <a:pPr lvl="1" marL="685800" indent="-223560">
+            <a:pPr lvl="1" marL="685800" indent="-223200">
               <a:lnSpc>
                 <a:spcPct val="100000"/>
               </a:lnSpc>
@@ -11015,7 +11015,7 @@
             </a:endParaRPr>
           </a:p>
           <a:p>
-            <a:pPr marL="216000" indent="-210960">
+            <a:pPr marL="216000" indent="-210600">
               <a:lnSpc>
                 <a:spcPct val="90000"/>
               </a:lnSpc>
@@ -11047,7 +11047,7 @@
             </a:endParaRPr>
           </a:p>
           <a:p>
-            <a:pPr lvl="1" marL="685800" indent="-223560">
+            <a:pPr lvl="1" marL="685800" indent="-223200">
               <a:lnSpc>
                 <a:spcPct val="100000"/>
               </a:lnSpc>
@@ -11101,7 +11101,7 @@
             </a:endParaRPr>
           </a:p>
           <a:p>
-            <a:pPr lvl="1" marL="685800" indent="-223560">
+            <a:pPr lvl="1" marL="685800" indent="-223200">
               <a:lnSpc>
                 <a:spcPct val="100000"/>
               </a:lnSpc>
@@ -11155,7 +11155,7 @@
             </a:endParaRPr>
           </a:p>
           <a:p>
-            <a:pPr marL="228600" indent="-223560">
+            <a:pPr marL="228600" indent="-223200">
               <a:lnSpc>
                 <a:spcPct val="90000"/>
               </a:lnSpc>
@@ -11171,7 +11171,7 @@
             </a:endParaRPr>
           </a:p>
           <a:p>
-            <a:pPr marL="228600" indent="-223560" algn="ctr">
+            <a:pPr marL="228600" indent="-223200" algn="ctr">
               <a:lnSpc>
                 <a:spcPct val="90000"/>
               </a:lnSpc>
@@ -11197,7 +11197,7 @@
             </a:endParaRPr>
           </a:p>
           <a:p>
-            <a:pPr marL="457200" indent="-223560" algn="ctr">
+            <a:pPr marL="457200" indent="-223200" algn="ctr">
               <a:lnSpc>
                 <a:spcPct val="90000"/>
               </a:lnSpc>
@@ -11273,7 +11273,7 @@
         <p:spPr>
           <a:xfrm>
             <a:off x="542880" y="721800"/>
-            <a:ext cx="10352160" cy="492840"/>
+            <a:ext cx="10351800" cy="492480"/>
           </a:xfrm>
           <a:prstGeom prst="rect">
             <a:avLst/>
@@ -11324,7 +11324,7 @@
         <p:spPr>
           <a:xfrm>
             <a:off x="451800" y="1709280"/>
-            <a:ext cx="8219520" cy="4347720"/>
+            <a:ext cx="8219160" cy="4347360"/>
           </a:xfrm>
           <a:prstGeom prst="rect">
             <a:avLst/>
@@ -11350,7 +11350,7 @@
         <p:spPr>
           <a:xfrm>
             <a:off x="609480" y="1769400"/>
-            <a:ext cx="10582560" cy="4850640"/>
+            <a:ext cx="10582200" cy="4850280"/>
           </a:xfrm>
           <a:prstGeom prst="rect">
             <a:avLst/>
@@ -11371,7 +11371,7 @@
             <a:normAutofit/>
           </a:bodyPr>
           <a:p>
-            <a:pPr marL="216000" indent="-210960">
+            <a:pPr marL="216000" indent="-210600">
               <a:lnSpc>
                 <a:spcPct val="90000"/>
               </a:lnSpc>
@@ -11400,7 +11400,7 @@
             </a:endParaRPr>
           </a:p>
           <a:p>
-            <a:pPr marL="216000" indent="-210960">
+            <a:pPr marL="216000" indent="-210600">
               <a:lnSpc>
                 <a:spcPct val="90000"/>
               </a:lnSpc>
@@ -11429,7 +11429,7 @@
             </a:endParaRPr>
           </a:p>
           <a:p>
-            <a:pPr marL="216000" indent="-210960">
+            <a:pPr marL="216000" indent="-210600">
               <a:lnSpc>
                 <a:spcPct val="90000"/>
               </a:lnSpc>
@@ -11458,7 +11458,7 @@
             </a:endParaRPr>
           </a:p>
           <a:p>
-            <a:pPr marL="216000" indent="-210960">
+            <a:pPr marL="216000" indent="-210600">
               <a:lnSpc>
                 <a:spcPct val="90000"/>
               </a:lnSpc>
@@ -11487,7 +11487,7 @@
             </a:endParaRPr>
           </a:p>
           <a:p>
-            <a:pPr marL="216000" indent="-210960">
+            <a:pPr marL="216000" indent="-210600">
               <a:lnSpc>
                 <a:spcPct val="90000"/>
               </a:lnSpc>
@@ -11516,7 +11516,7 @@
             </a:endParaRPr>
           </a:p>
           <a:p>
-            <a:pPr marL="216000" indent="-210960">
+            <a:pPr marL="216000" indent="-210600">
               <a:lnSpc>
                 <a:spcPct val="90000"/>
               </a:lnSpc>
@@ -11545,7 +11545,7 @@
             </a:endParaRPr>
           </a:p>
           <a:p>
-            <a:pPr marL="216000" indent="-210960">
+            <a:pPr marL="216000" indent="-210600">
               <a:lnSpc>
                 <a:spcPct val="90000"/>
               </a:lnSpc>
@@ -11614,7 +11614,7 @@
         <p:spPr>
           <a:xfrm>
             <a:off x="542880" y="721800"/>
-            <a:ext cx="10352160" cy="492840"/>
+            <a:ext cx="10351800" cy="492480"/>
           </a:xfrm>
           <a:prstGeom prst="rect">
             <a:avLst/>
@@ -11665,7 +11665,7 @@
         <p:spPr>
           <a:xfrm>
             <a:off x="451800" y="1709280"/>
-            <a:ext cx="8219520" cy="4347720"/>
+            <a:ext cx="8219160" cy="4347360"/>
           </a:xfrm>
           <a:prstGeom prst="rect">
             <a:avLst/>
@@ -11691,7 +11691,7 @@
         <p:spPr>
           <a:xfrm>
             <a:off x="609480" y="1769400"/>
-            <a:ext cx="10582560" cy="4850640"/>
+            <a:ext cx="10582200" cy="4850280"/>
           </a:xfrm>
           <a:prstGeom prst="rect">
             <a:avLst/>
@@ -11712,7 +11712,7 @@
             <a:normAutofit/>
           </a:bodyPr>
           <a:p>
-            <a:pPr marL="216000" indent="-210960">
+            <a:pPr marL="216000" indent="-210600">
               <a:lnSpc>
                 <a:spcPct val="90000"/>
               </a:lnSpc>
@@ -11741,7 +11741,7 @@
             </a:endParaRPr>
           </a:p>
           <a:p>
-            <a:pPr marL="216000" indent="-210960">
+            <a:pPr marL="216000" indent="-210600">
               <a:lnSpc>
                 <a:spcPct val="90000"/>
               </a:lnSpc>
@@ -11770,7 +11770,7 @@
             </a:endParaRPr>
           </a:p>
           <a:p>
-            <a:pPr marL="216000" indent="-210960">
+            <a:pPr marL="216000" indent="-210600">
               <a:lnSpc>
                 <a:spcPct val="90000"/>
               </a:lnSpc>
@@ -11799,7 +11799,7 @@
             </a:endParaRPr>
           </a:p>
           <a:p>
-            <a:pPr marL="216000" indent="-210960">
+            <a:pPr marL="216000" indent="-210600">
               <a:lnSpc>
                 <a:spcPct val="90000"/>
               </a:lnSpc>
@@ -11828,7 +11828,7 @@
             </a:endParaRPr>
           </a:p>
           <a:p>
-            <a:pPr marL="216000" indent="-210960">
+            <a:pPr marL="216000" indent="-210600">
               <a:lnSpc>
                 <a:spcPct val="90000"/>
               </a:lnSpc>
@@ -11897,7 +11897,7 @@
         <p:spPr>
           <a:xfrm>
             <a:off x="335520" y="764640"/>
-            <a:ext cx="10746360" cy="497160"/>
+            <a:ext cx="10746000" cy="496800"/>
           </a:xfrm>
           <a:prstGeom prst="rect">
             <a:avLst/>
@@ -11948,7 +11948,7 @@
         <p:spPr>
           <a:xfrm>
             <a:off x="335520" y="1268640"/>
-            <a:ext cx="10746360" cy="5033880"/>
+            <a:ext cx="10746000" cy="5033520"/>
           </a:xfrm>
           <a:prstGeom prst="rect">
             <a:avLst/>
@@ -11969,7 +11969,7 @@
             <a:noAutofit/>
           </a:bodyPr>
           <a:p>
-            <a:pPr marL="195120" indent="-189000">
+            <a:pPr marL="195120" indent="-188640">
               <a:lnSpc>
                 <a:spcPct val="100000"/>
               </a:lnSpc>
@@ -11998,7 +11998,7 @@
             </a:endParaRPr>
           </a:p>
           <a:p>
-            <a:pPr marL="195120" indent="-189000">
+            <a:pPr marL="195120" indent="-188640">
               <a:lnSpc>
                 <a:spcPct val="100000"/>
               </a:lnSpc>
@@ -12027,7 +12027,7 @@
             </a:endParaRPr>
           </a:p>
           <a:p>
-            <a:pPr marL="195120" indent="-189000">
+            <a:pPr marL="195120" indent="-188640">
               <a:lnSpc>
                 <a:spcPct val="100000"/>
               </a:lnSpc>
@@ -12056,7 +12056,7 @@
             </a:endParaRPr>
           </a:p>
           <a:p>
-            <a:pPr marL="195120" indent="-189000">
+            <a:pPr marL="195120" indent="-188640">
               <a:lnSpc>
                 <a:spcPct val="100000"/>
               </a:lnSpc>
@@ -12085,7 +12085,7 @@
             </a:endParaRPr>
           </a:p>
           <a:p>
-            <a:pPr marL="195120" indent="-189000">
+            <a:pPr marL="195120" indent="-188640">
               <a:lnSpc>
                 <a:spcPct val="100000"/>
               </a:lnSpc>
@@ -12114,7 +12114,7 @@
             </a:endParaRPr>
           </a:p>
           <a:p>
-            <a:pPr marL="195120" indent="-189000">
+            <a:pPr marL="195120" indent="-188640">
               <a:lnSpc>
                 <a:spcPct val="100000"/>
               </a:lnSpc>
@@ -12143,7 +12143,7 @@
             </a:endParaRPr>
           </a:p>
           <a:p>
-            <a:pPr marL="195120" indent="-189000">
+            <a:pPr marL="195120" indent="-188640">
               <a:lnSpc>
                 <a:spcPct val="100000"/>
               </a:lnSpc>
@@ -12172,7 +12172,7 @@
             </a:endParaRPr>
           </a:p>
           <a:p>
-            <a:pPr marL="195120" indent="-189000">
+            <a:pPr marL="195120" indent="-188640">
               <a:lnSpc>
                 <a:spcPct val="100000"/>
               </a:lnSpc>
@@ -12201,7 +12201,7 @@
             </a:endParaRPr>
           </a:p>
           <a:p>
-            <a:pPr marL="195120" indent="-189000">
+            <a:pPr marL="195120" indent="-188640">
               <a:lnSpc>
                 <a:spcPct val="100000"/>
               </a:lnSpc>
@@ -12230,7 +12230,7 @@
             </a:endParaRPr>
           </a:p>
           <a:p>
-            <a:pPr marL="195120" indent="-189000">
+            <a:pPr marL="195120" indent="-188640">
               <a:lnSpc>
                 <a:spcPct val="100000"/>
               </a:lnSpc>
@@ -12259,7 +12259,7 @@
             </a:endParaRPr>
           </a:p>
           <a:p>
-            <a:pPr marL="195120" indent="-189000">
+            <a:pPr marL="195120" indent="-188640">
               <a:lnSpc>
                 <a:spcPct val="100000"/>
               </a:lnSpc>
@@ -12288,7 +12288,7 @@
             </a:endParaRPr>
           </a:p>
           <a:p>
-            <a:pPr marL="195120" indent="-189000">
+            <a:pPr marL="195120" indent="-188640">
               <a:lnSpc>
                 <a:spcPct val="100000"/>
               </a:lnSpc>
@@ -12317,7 +12317,7 @@
             </a:endParaRPr>
           </a:p>
           <a:p>
-            <a:pPr marL="195120" indent="-189000">
+            <a:pPr marL="195120" indent="-188640">
               <a:lnSpc>
                 <a:spcPct val="100000"/>
               </a:lnSpc>

</xml_diff>

<commit_message>
updated L00 (SoSe 23)
</commit_message>
<xml_diff>
--- a/The-Limits-to-Growth/LTG-L00-Organization.pptx
+++ b/The-Limits-to-Growth/LTG-L00-Organization.pptx
@@ -17,8 +17,8 @@
     <p:sldId id="261" r:id="rId8"/>
     <p:sldId id="262" r:id="rId9"/>
     <p:sldId id="263" r:id="rId10"/>
-    <p:sldId id="264" r:id="rId11"/>
-    <p:sldId id="265" r:id="rId12"/>
+    <p:sldId id="265" r:id="rId11"/>
+    <p:sldId id="275" r:id="rId12"/>
     <p:sldId id="266" r:id="rId13"/>
     <p:sldId id="267" r:id="rId14"/>
     <p:sldId id="268" r:id="rId15"/>
@@ -1181,8 +1181,8 @@
         </p:nvSpPr>
         <p:spPr>
           <a:xfrm>
-            <a:off x="533520" y="763560"/>
-            <a:ext cx="6694560" cy="3762720"/>
+            <a:off x="536575" y="763588"/>
+            <a:ext cx="6688138" cy="3762375"/>
           </a:xfrm>
           <a:prstGeom prst="rect">
             <a:avLst/>
@@ -7170,20 +7170,7 @@
                 <a:latin typeface="DejaVu Sans"/>
                 <a:ea typeface="DejaVu Sans"/>
               </a:rPr>
-              <a:t>Course Organization – </a:t>
-            </a:r>
-            <a:r>
-              <a:rPr lang="en-US" sz="2400" b="1" strike="noStrike" spc="-1" dirty="0">
-                <a:solidFill>
-                  <a:srgbClr val="000000"/>
-                </a:solidFill>
-                <a:highlight>
-                  <a:srgbClr val="FF0000"/>
-                </a:highlight>
-                <a:latin typeface="DejaVu Sans"/>
-                <a:ea typeface="DejaVu Sans"/>
-              </a:rPr>
-              <a:t>UPDATE NECESSARY – MOODLE + MOOC  </a:t>
+              <a:t>Course Organization – Asynchronous Learning</a:t>
             </a:r>
             <a:endParaRPr lang="en-GB" sz="2400" b="0" strike="noStrike" spc="-1" dirty="0">
               <a:solidFill>
@@ -7206,7 +7193,7 @@
         <p:spPr>
           <a:xfrm>
             <a:off x="335520" y="1268280"/>
-            <a:ext cx="10745640" cy="5033160"/>
+            <a:ext cx="10745640" cy="1887875"/>
           </a:xfrm>
           <a:prstGeom prst="rect">
             <a:avLst/>
@@ -7249,65 +7236,17 @@
               <a:buChar char=""/>
             </a:pPr>
             <a:r>
-              <a:rPr lang="en-US" sz="1800" b="0" strike="noStrike" spc="-1">
-                <a:solidFill>
-                  <a:srgbClr val="000000"/>
-                </a:solidFill>
-                <a:latin typeface="DejaVu Sans"/>
-                <a:ea typeface="DejaVu Sans"/>
-              </a:rPr>
-              <a:t>Course website – </a:t>
-            </a:r>
-            <a:r>
-              <a:rPr lang="en-US" sz="1800" b="0" u="sng" strike="noStrike" spc="-1">
-                <a:solidFill>
-                  <a:srgbClr val="0000FF"/>
-                </a:solidFill>
-                <a:uFillTx/>
-                <a:latin typeface="DejaVu Sans"/>
-                <a:ea typeface="DejaVu Sans"/>
-                <a:hlinkClick r:id="rId2"/>
-              </a:rPr>
-              <a:t>Link</a:t>
-            </a:r>
-            <a:r>
-              <a:rPr lang="en-US" sz="1800" b="0" strike="noStrike" spc="-1">
-                <a:solidFill>
-                  <a:srgbClr val="000000"/>
-                </a:solidFill>
-                <a:latin typeface="DejaVu Sans"/>
-                <a:ea typeface="DejaVu Sans"/>
-              </a:rPr>
-              <a:t> </a:t>
-            </a:r>
-            <a:endParaRPr lang="en-GB" sz="1800" b="0" strike="noStrike" spc="-1">
-              <a:solidFill>
-                <a:srgbClr val="000000"/>
-              </a:solidFill>
-              <a:latin typeface="Arial"/>
-            </a:endParaRPr>
-          </a:p>
-          <a:p>
-            <a:pPr>
-              <a:lnSpc>
-                <a:spcPct val="100000"/>
-              </a:lnSpc>
-              <a:spcBef>
-                <a:spcPts val="360"/>
-              </a:spcBef>
-            </a:pPr>
-            <a:endParaRPr lang="en-GB" sz="1800" b="0" strike="noStrike" spc="-1">
-              <a:solidFill>
-                <a:srgbClr val="000000"/>
-              </a:solidFill>
-              <a:latin typeface="Arial"/>
-            </a:endParaRPr>
-          </a:p>
-          <a:p>
-            <a:pPr marL="195120" indent="-188640">
-              <a:lnSpc>
-                <a:spcPct val="100000"/>
-              </a:lnSpc>
+              <a:rPr lang="en-US" spc="-1" dirty="0">
+                <a:solidFill>
+                  <a:srgbClr val="000000"/>
+                </a:solidFill>
+                <a:latin typeface="DejaVu Sans"/>
+              </a:rPr>
+              <a:t>This semester we will include asynchronous learning for two of the lectures (L10 and L11)</a:t>
+            </a:r>
+          </a:p>
+          <a:p>
+            <a:pPr marL="652320" lvl="1" indent="-188640">
               <a:spcBef>
                 <a:spcPts val="360"/>
               </a:spcBef>
@@ -7319,151 +7258,17 @@
               <a:buChar char=""/>
             </a:pPr>
             <a:r>
-              <a:rPr lang="en-GB" sz="1800" b="0" strike="noStrike" spc="-1">
-                <a:solidFill>
-                  <a:srgbClr val="000000"/>
-                </a:solidFill>
-                <a:latin typeface="DejaVu Sans"/>
-                <a:ea typeface="DejaVu Sans"/>
-              </a:rPr>
-              <a:t>News and updates:</a:t>
-            </a:r>
-            <a:endParaRPr lang="en-GB" sz="1800" b="0" strike="noStrike" spc="-1">
-              <a:solidFill>
-                <a:srgbClr val="000000"/>
-              </a:solidFill>
-              <a:latin typeface="Arial"/>
-            </a:endParaRPr>
-          </a:p>
-          <a:p>
-            <a:pPr marL="432000" lvl="1" indent="-211320">
-              <a:lnSpc>
-                <a:spcPct val="100000"/>
-              </a:lnSpc>
-              <a:spcBef>
-                <a:spcPts val="360"/>
-              </a:spcBef>
-              <a:buClr>
-                <a:srgbClr val="008C4F"/>
-              </a:buClr>
-              <a:buSzPct val="45000"/>
-              <a:buFont typeface="OpenSymbol"/>
-              <a:buChar char="—"/>
-            </a:pPr>
-            <a:r>
-              <a:rPr lang="en-GB" sz="1800" b="0" strike="noStrike" spc="-1">
-                <a:solidFill>
-                  <a:srgbClr val="000000"/>
-                </a:solidFill>
-                <a:latin typeface="DejaVu Sans"/>
-                <a:ea typeface="DejaVu Sans"/>
-              </a:rPr>
-              <a:t>CLZ students + DigiTec: StudIP (</a:t>
-            </a:r>
-            <a:r>
-              <a:rPr lang="en-GB" sz="1800" b="0" u="sng" strike="noStrike" spc="-1">
-                <a:solidFill>
-                  <a:srgbClr val="0000FF"/>
-                </a:solidFill>
-                <a:uFillTx/>
-                <a:latin typeface="DejaVu Sans"/>
-                <a:ea typeface="DejaVu Sans"/>
-                <a:hlinkClick r:id="rId3"/>
-              </a:rPr>
-              <a:t>Link</a:t>
-            </a:r>
-            <a:r>
-              <a:rPr lang="en-GB" sz="1800" b="0" strike="noStrike" spc="-1">
-                <a:solidFill>
-                  <a:srgbClr val="000000"/>
-                </a:solidFill>
-                <a:latin typeface="DejaVu Sans"/>
-                <a:ea typeface="DejaVu Sans"/>
-              </a:rPr>
-              <a:t>)</a:t>
-            </a:r>
-            <a:endParaRPr lang="en-GB" sz="1800" b="0" strike="noStrike" spc="-1">
-              <a:solidFill>
-                <a:srgbClr val="000000"/>
-              </a:solidFill>
-              <a:latin typeface="Arial"/>
-            </a:endParaRPr>
-          </a:p>
-          <a:p>
-            <a:pPr marL="432000" lvl="1" indent="-211320">
-              <a:lnSpc>
-                <a:spcPct val="100000"/>
-              </a:lnSpc>
-              <a:spcBef>
-                <a:spcPts val="360"/>
-              </a:spcBef>
-              <a:buClr>
-                <a:srgbClr val="008C4F"/>
-              </a:buClr>
-              <a:buSzPct val="45000"/>
-              <a:buFont typeface="OpenSymbol"/>
-              <a:buChar char="—"/>
-            </a:pPr>
-            <a:r>
-              <a:rPr lang="en-GB" sz="1800" b="0" strike="noStrike" spc="-1">
-                <a:solidFill>
-                  <a:srgbClr val="000000"/>
-                </a:solidFill>
-                <a:latin typeface="DejaVu Sans"/>
-                <a:ea typeface="DejaVu Sans"/>
-              </a:rPr>
-              <a:t>Everyone else: Mailing list (</a:t>
-            </a:r>
-            <a:r>
-              <a:rPr lang="en-GB" sz="1800" b="0" u="sng" strike="noStrike" spc="-1">
-                <a:solidFill>
-                  <a:srgbClr val="0000FF"/>
-                </a:solidFill>
-                <a:uFillTx/>
-                <a:latin typeface="DejaVu Sans"/>
-                <a:ea typeface="DejaVu Sans"/>
-                <a:hlinkClick r:id="rId4"/>
-              </a:rPr>
-              <a:t>Link</a:t>
-            </a:r>
-            <a:r>
-              <a:rPr lang="en-GB" sz="1800" b="0" strike="noStrike" spc="-1">
-                <a:solidFill>
-                  <a:srgbClr val="000000"/>
-                </a:solidFill>
-                <a:latin typeface="DejaVu Sans"/>
-                <a:ea typeface="DejaVu Sans"/>
-              </a:rPr>
-              <a:t>)</a:t>
-            </a:r>
-            <a:endParaRPr lang="en-GB" sz="1800" b="0" strike="noStrike" spc="-1">
-              <a:solidFill>
-                <a:srgbClr val="000000"/>
-              </a:solidFill>
-              <a:latin typeface="Arial"/>
-            </a:endParaRPr>
-          </a:p>
-          <a:p>
-            <a:pPr>
-              <a:lnSpc>
-                <a:spcPct val="100000"/>
-              </a:lnSpc>
-              <a:spcBef>
-                <a:spcPts val="360"/>
-              </a:spcBef>
-            </a:pPr>
-            <a:endParaRPr lang="en-GB" sz="1800" b="0" strike="noStrike" spc="-1">
-              <a:solidFill>
-                <a:srgbClr val="000000"/>
-              </a:solidFill>
-              <a:latin typeface="Arial"/>
-            </a:endParaRPr>
+              <a:rPr lang="en-US" spc="-1" dirty="0">
+                <a:solidFill>
+                  <a:srgbClr val="000000"/>
+                </a:solidFill>
+                <a:latin typeface="DejaVu Sans"/>
+              </a:rPr>
+              <a:t>Consisting of short pre-recorded videos and interactive content</a:t>
+            </a:r>
           </a:p>
           <a:p>
             <a:pPr marL="195120" indent="-188640">
-              <a:lnSpc>
-                <a:spcPct val="100000"/>
-              </a:lnSpc>
               <a:spcBef>
                 <a:spcPts val="360"/>
               </a:spcBef>
@@ -7475,119 +7280,17 @@
               <a:buChar char=""/>
             </a:pPr>
             <a:r>
-              <a:rPr lang="en-US" sz="1800" b="0" strike="noStrike" spc="-1">
-                <a:solidFill>
-                  <a:srgbClr val="000000"/>
-                </a:solidFill>
-                <a:latin typeface="DejaVu Sans"/>
-                <a:ea typeface="DejaVu Sans"/>
-              </a:rPr>
-              <a:t>Slides will be uploaded to StudIP (</a:t>
-            </a:r>
-            <a:r>
-              <a:rPr lang="en-US" sz="1800" b="0" u="sng" strike="noStrike" spc="-1">
-                <a:solidFill>
-                  <a:srgbClr val="0000FF"/>
-                </a:solidFill>
-                <a:uFillTx/>
-                <a:latin typeface="DejaVu Sans"/>
-                <a:ea typeface="DejaVu Sans"/>
-                <a:hlinkClick r:id="rId3"/>
-              </a:rPr>
-              <a:t>Link</a:t>
-            </a:r>
-            <a:r>
-              <a:rPr lang="en-US" sz="1800" b="0" strike="noStrike" spc="-1">
-                <a:solidFill>
-                  <a:srgbClr val="000000"/>
-                </a:solidFill>
-                <a:latin typeface="DejaVu Sans"/>
-                <a:ea typeface="DejaVu Sans"/>
-              </a:rPr>
-              <a:t>) and to Github (</a:t>
-            </a:r>
-            <a:r>
-              <a:rPr lang="en-US" sz="1800" b="0" u="sng" strike="noStrike" spc="-1">
-                <a:solidFill>
-                  <a:srgbClr val="0000FF"/>
-                </a:solidFill>
-                <a:uFillTx/>
-                <a:latin typeface="DejaVu Sans"/>
-                <a:ea typeface="DejaVu Sans"/>
-                <a:hlinkClick r:id="rId5"/>
-              </a:rPr>
-              <a:t>Link</a:t>
-            </a:r>
-            <a:r>
-              <a:rPr lang="en-US" sz="1800" b="0" strike="noStrike" spc="-1">
-                <a:solidFill>
-                  <a:srgbClr val="000000"/>
-                </a:solidFill>
-                <a:latin typeface="DejaVu Sans"/>
-                <a:ea typeface="DejaVu Sans"/>
-              </a:rPr>
-              <a:t>)</a:t>
-            </a:r>
-            <a:endParaRPr lang="en-GB" sz="1800" b="0" strike="noStrike" spc="-1">
-              <a:solidFill>
-                <a:srgbClr val="000000"/>
-              </a:solidFill>
-              <a:latin typeface="Arial"/>
-            </a:endParaRPr>
-          </a:p>
-          <a:p>
-            <a:pPr marL="744120" lvl="1" indent="-280440">
-              <a:lnSpc>
-                <a:spcPct val="100000"/>
-              </a:lnSpc>
-              <a:spcBef>
-                <a:spcPts val="360"/>
-              </a:spcBef>
-              <a:buClr>
-                <a:srgbClr val="008C4F"/>
-              </a:buClr>
-              <a:buSzPct val="80000"/>
-              <a:buFont typeface="StarSymbol"/>
-              <a:buChar char="—"/>
-            </a:pPr>
-            <a:r>
-              <a:rPr lang="en-US" sz="1800" b="0" strike="noStrike" spc="-1">
-                <a:solidFill>
-                  <a:srgbClr val="000000"/>
-                </a:solidFill>
-                <a:latin typeface="DejaVu Sans"/>
-                <a:ea typeface="DejaVu Sans"/>
-              </a:rPr>
-              <a:t>Please report bugs ;)</a:t>
-            </a:r>
-            <a:endParaRPr lang="en-GB" sz="1800" b="0" strike="noStrike" spc="-1">
-              <a:solidFill>
-                <a:srgbClr val="000000"/>
-              </a:solidFill>
-              <a:latin typeface="Arial"/>
-            </a:endParaRPr>
-          </a:p>
-          <a:p>
-            <a:pPr>
-              <a:lnSpc>
-                <a:spcPct val="100000"/>
-              </a:lnSpc>
-              <a:spcBef>
-                <a:spcPts val="360"/>
-              </a:spcBef>
-            </a:pPr>
-            <a:endParaRPr lang="en-GB" sz="1800" b="0" strike="noStrike" spc="-1">
-              <a:solidFill>
-                <a:srgbClr val="000000"/>
-              </a:solidFill>
-              <a:latin typeface="Arial"/>
-            </a:endParaRPr>
-          </a:p>
-          <a:p>
-            <a:pPr marL="195120" indent="-188640">
-              <a:lnSpc>
-                <a:spcPct val="100000"/>
-              </a:lnSpc>
+              <a:rPr lang="en-US" spc="-1" dirty="0">
+                <a:solidFill>
+                  <a:srgbClr val="000000"/>
+                </a:solidFill>
+                <a:latin typeface="DejaVu Sans"/>
+              </a:rPr>
+              <a:t>You will get further information about these two sessions during the semester</a:t>
+            </a:r>
+          </a:p>
+          <a:p>
+            <a:pPr marL="652320" lvl="1" indent="-188640">
               <a:spcBef>
                 <a:spcPts val="360"/>
               </a:spcBef>
@@ -7599,40 +7302,17 @@
               <a:buChar char=""/>
             </a:pPr>
             <a:r>
-              <a:rPr lang="en-US" sz="1800" b="0" strike="noStrike" spc="-1">
-                <a:solidFill>
-                  <a:srgbClr val="000000"/>
-                </a:solidFill>
-                <a:latin typeface="DejaVu Sans"/>
-                <a:ea typeface="DejaVu Sans"/>
-              </a:rPr>
-              <a:t>Lecture recordings will be available on StudIP and on Github</a:t>
-            </a:r>
-            <a:endParaRPr lang="en-GB" sz="1800" b="0" strike="noStrike" spc="-1">
-              <a:solidFill>
-                <a:srgbClr val="000000"/>
-              </a:solidFill>
-              <a:latin typeface="Arial"/>
-            </a:endParaRPr>
-          </a:p>
-          <a:p>
-            <a:pPr>
-              <a:lnSpc>
-                <a:spcPct val="100000"/>
-              </a:lnSpc>
-              <a:spcBef>
-                <a:spcPts val="360"/>
-              </a:spcBef>
-            </a:pPr>
-            <a:endParaRPr lang="en-GB" sz="1800" b="0" strike="noStrike" spc="-1">
-              <a:solidFill>
-                <a:srgbClr val="000000"/>
-              </a:solidFill>
-              <a:latin typeface="Arial"/>
-            </a:endParaRPr>
-          </a:p>
-          <a:p>
-            <a:pPr marL="195120" indent="-188640" algn="ctr">
+              <a:rPr lang="en-US" spc="-1" dirty="0">
+                <a:solidFill>
+                  <a:srgbClr val="000000"/>
+                </a:solidFill>
+                <a:latin typeface="DejaVu Sans"/>
+              </a:rPr>
+              <a:t>You will find the lecture videos on the course website </a:t>
+            </a:r>
+          </a:p>
+          <a:p>
+            <a:pPr marL="195120" indent="-188640">
               <a:lnSpc>
                 <a:spcPct val="100000"/>
               </a:lnSpc>
@@ -7646,79 +7326,355 @@
               <a:buFont typeface="Wingdings" charset="2"/>
               <a:buChar char=""/>
             </a:pPr>
-            <a:r>
-              <a:rPr lang="en-US" sz="1800" b="0" strike="noStrike" spc="-1">
-                <a:solidFill>
-                  <a:srgbClr val="000000"/>
-                </a:solidFill>
-                <a:latin typeface="DejaVu Sans"/>
-                <a:ea typeface="DejaVu Sans"/>
-              </a:rPr>
-              <a:t>Questions? Write us an email: </a:t>
-            </a:r>
-            <a:r>
-              <a:rPr lang="en-US" sz="1800" b="0" u="sng" strike="noStrike" spc="-1">
-                <a:solidFill>
-                  <a:srgbClr val="0000FF"/>
-                </a:solidFill>
-                <a:uFillTx/>
-                <a:latin typeface="DejaVu Sans"/>
-                <a:ea typeface="DejaVu Sans"/>
-                <a:hlinkClick r:id="rId6"/>
-              </a:rPr>
-              <a:t>etce-ltg@tu-clausthal.de</a:t>
-            </a:r>
-            <a:r>
-              <a:rPr lang="en-US" sz="1800" b="0" strike="noStrike" spc="-1">
-                <a:solidFill>
-                  <a:srgbClr val="000000"/>
-                </a:solidFill>
-                <a:latin typeface="DejaVu Sans"/>
-                <a:ea typeface="DejaVu Sans"/>
-              </a:rPr>
-              <a:t> ← </a:t>
-            </a:r>
-            <a:r>
-              <a:rPr lang="en-US" sz="1800" b="1" strike="noStrike" spc="-1">
-                <a:solidFill>
-                  <a:srgbClr val="000000"/>
-                </a:solidFill>
-                <a:latin typeface="DejaVu Sans"/>
-                <a:ea typeface="DejaVu Sans"/>
-              </a:rPr>
-              <a:t>We will </a:t>
-            </a:r>
-            <a:r>
-              <a:rPr lang="en-US" sz="1800" b="1" u="sng" strike="noStrike" spc="-1">
-                <a:solidFill>
-                  <a:srgbClr val="C9211E"/>
-                </a:solidFill>
-                <a:uFillTx/>
-                <a:latin typeface="DejaVu Sans"/>
-                <a:ea typeface="DejaVu Sans"/>
-              </a:rPr>
-              <a:t>only</a:t>
-            </a:r>
-            <a:r>
-              <a:rPr lang="en-US" sz="1800" b="1" strike="noStrike" spc="-1">
-                <a:solidFill>
-                  <a:srgbClr val="000000"/>
-                </a:solidFill>
-                <a:latin typeface="DejaVu Sans"/>
-                <a:ea typeface="DejaVu Sans"/>
-              </a:rPr>
-              <a:t> respond to emails written to this specific email address!</a:t>
-            </a:r>
-            <a:endParaRPr lang="en-GB" sz="1800" b="0" strike="noStrike" spc="-1">
-              <a:solidFill>
-                <a:srgbClr val="000000"/>
-              </a:solidFill>
-              <a:latin typeface="Arial"/>
-            </a:endParaRPr>
+            <a:endParaRPr lang="en-GB" sz="1800" b="0" strike="noStrike" spc="-1" dirty="0">
+              <a:solidFill>
+                <a:srgbClr val="000000"/>
+              </a:solidFill>
+              <a:latin typeface="Arial"/>
+            </a:endParaRPr>
+          </a:p>
+        </p:txBody>
+      </p:sp>
+      <p:sp>
+        <p:nvSpPr>
+          <p:cNvPr id="2" name="Rechteck 1">
+            <a:extLst>
+              <a:ext uri="{FF2B5EF4-FFF2-40B4-BE49-F238E27FC236}">
+                <a16:creationId xmlns:a16="http://schemas.microsoft.com/office/drawing/2014/main" id="{D52378F1-C1B3-407A-8427-ACCFD98889B3}"/>
+              </a:ext>
+            </a:extLst>
+          </p:cNvPr>
+          <p:cNvSpPr/>
+          <p:nvPr/>
+        </p:nvSpPr>
+        <p:spPr>
+          <a:xfrm>
+            <a:off x="335520" y="3078268"/>
+            <a:ext cx="8711381" cy="3272691"/>
+          </a:xfrm>
+          <a:prstGeom prst="rect">
+            <a:avLst/>
+          </a:prstGeom>
+        </p:spPr>
+        <p:txBody>
+          <a:bodyPr wrap="square">
+            <a:spAutoFit/>
+          </a:bodyPr>
+          <a:lstStyle/>
+          <a:p>
+            <a:pPr marL="6480">
+              <a:lnSpc>
+                <a:spcPct val="100000"/>
+              </a:lnSpc>
+              <a:spcBef>
+                <a:spcPts val="360"/>
+              </a:spcBef>
+              <a:buClr>
+                <a:srgbClr val="008C4F"/>
+              </a:buClr>
+              <a:buSzPct val="80000"/>
+            </a:pPr>
+            <a:r>
+              <a:rPr lang="de-DE" spc="-1" dirty="0">
+                <a:solidFill>
+                  <a:srgbClr val="000000"/>
+                </a:solidFill>
+                <a:latin typeface="DejaVu Sans"/>
+              </a:rPr>
+              <a:t>…</a:t>
+            </a:r>
+            <a:endParaRPr lang="en-GB" spc="-1" dirty="0">
+              <a:solidFill>
+                <a:srgbClr val="000000"/>
+              </a:solidFill>
+            </a:endParaRPr>
+          </a:p>
+          <a:p>
+            <a:pPr marL="6480">
+              <a:lnSpc>
+                <a:spcPct val="100000"/>
+              </a:lnSpc>
+              <a:spcBef>
+                <a:spcPts val="360"/>
+              </a:spcBef>
+              <a:buClr>
+                <a:srgbClr val="008C4F"/>
+              </a:buClr>
+              <a:buSzPct val="80000"/>
+            </a:pPr>
+            <a:r>
+              <a:rPr lang="en-US" spc="-1" dirty="0">
+                <a:solidFill>
+                  <a:srgbClr val="000000"/>
+                </a:solidFill>
+                <a:latin typeface="DejaVu Sans"/>
+              </a:rPr>
+              <a:t>31.05.2023 → Circular Economy (L07)</a:t>
+            </a:r>
+            <a:endParaRPr lang="en-GB" spc="-1" dirty="0">
+              <a:solidFill>
+                <a:srgbClr val="000000"/>
+              </a:solidFill>
+            </a:endParaRPr>
+          </a:p>
+          <a:p>
+            <a:pPr marL="6480">
+              <a:lnSpc>
+                <a:spcPct val="100000"/>
+              </a:lnSpc>
+              <a:spcBef>
+                <a:spcPts val="360"/>
+              </a:spcBef>
+              <a:buClr>
+                <a:srgbClr val="008C4F"/>
+              </a:buClr>
+              <a:buSzPct val="80000"/>
+            </a:pPr>
+            <a:r>
+              <a:rPr lang="en-US" spc="-1" dirty="0">
+                <a:solidFill>
+                  <a:srgbClr val="000000"/>
+                </a:solidFill>
+                <a:latin typeface="DejaVu Sans"/>
+              </a:rPr>
+              <a:t>07.06.2023 → Beyond the Circular Economy (L08)</a:t>
+            </a:r>
+            <a:endParaRPr lang="en-GB" spc="-1" dirty="0">
+              <a:solidFill>
+                <a:srgbClr val="000000"/>
+              </a:solidFill>
+            </a:endParaRPr>
+          </a:p>
+          <a:p>
+            <a:pPr marL="6480">
+              <a:lnSpc>
+                <a:spcPct val="100000"/>
+              </a:lnSpc>
+              <a:spcBef>
+                <a:spcPts val="360"/>
+              </a:spcBef>
+              <a:buClr>
+                <a:srgbClr val="008C4F"/>
+              </a:buClr>
+              <a:buSzPct val="80000"/>
+            </a:pPr>
+            <a:r>
+              <a:rPr lang="en-US" spc="-1" dirty="0">
+                <a:solidFill>
+                  <a:srgbClr val="000000"/>
+                </a:solidFill>
+                <a:latin typeface="DejaVu Sans"/>
+              </a:rPr>
+              <a:t>14.06.2023 → Towards a Circular Society (L09)</a:t>
+            </a:r>
+            <a:endParaRPr lang="en-GB" spc="-1" dirty="0">
+              <a:solidFill>
+                <a:srgbClr val="000000"/>
+              </a:solidFill>
+            </a:endParaRPr>
+          </a:p>
+          <a:p>
+            <a:pPr marL="6480">
+              <a:lnSpc>
+                <a:spcPct val="100000"/>
+              </a:lnSpc>
+              <a:spcBef>
+                <a:spcPts val="360"/>
+              </a:spcBef>
+              <a:buClr>
+                <a:srgbClr val="008C4F"/>
+              </a:buClr>
+              <a:buSzPct val="80000"/>
+            </a:pPr>
+            <a:r>
+              <a:rPr lang="en-US" b="1" spc="-1" dirty="0">
+                <a:solidFill>
+                  <a:schemeClr val="accent3">
+                    <a:lumMod val="50000"/>
+                  </a:schemeClr>
+                </a:solidFill>
+                <a:latin typeface="DejaVu Sans"/>
+              </a:rPr>
+              <a:t>21.06.2023 → Technologies And What They Can (Not) Do (L10)</a:t>
+            </a:r>
+            <a:endParaRPr lang="en-GB" b="1" spc="-1" dirty="0">
+              <a:solidFill>
+                <a:schemeClr val="accent3">
+                  <a:lumMod val="50000"/>
+                </a:schemeClr>
+              </a:solidFill>
+            </a:endParaRPr>
+          </a:p>
+          <a:p>
+            <a:pPr marL="6480">
+              <a:spcBef>
+                <a:spcPts val="360"/>
+              </a:spcBef>
+              <a:buClr>
+                <a:srgbClr val="008C4F"/>
+              </a:buClr>
+              <a:buSzPct val="80000"/>
+            </a:pPr>
+            <a:r>
+              <a:rPr lang="en-US" b="1" spc="-1" dirty="0">
+                <a:solidFill>
+                  <a:schemeClr val="accent3">
+                    <a:lumMod val="50000"/>
+                  </a:schemeClr>
+                </a:solidFill>
+                <a:latin typeface="DejaVu Sans"/>
+              </a:rPr>
+              <a:t>28.06.2023 → Critical Thinking and Sustainable Everyday Practices (L11) </a:t>
+            </a:r>
+            <a:endParaRPr lang="en-GB" b="1" spc="-1" dirty="0">
+              <a:solidFill>
+                <a:schemeClr val="accent3">
+                  <a:lumMod val="50000"/>
+                </a:schemeClr>
+              </a:solidFill>
+            </a:endParaRPr>
+          </a:p>
+          <a:p>
+            <a:pPr marL="6480">
+              <a:lnSpc>
+                <a:spcPct val="100000"/>
+              </a:lnSpc>
+              <a:spcBef>
+                <a:spcPts val="360"/>
+              </a:spcBef>
+              <a:buClr>
+                <a:srgbClr val="008C4F"/>
+              </a:buClr>
+              <a:buSzPct val="80000"/>
+            </a:pPr>
+            <a:r>
+              <a:rPr lang="en-US" spc="-1" dirty="0">
+                <a:solidFill>
+                  <a:srgbClr val="000000"/>
+                </a:solidFill>
+                <a:latin typeface="DejaVu Sans"/>
+              </a:rPr>
+              <a:t>05.07.2023 → Invited Lecture (L12)</a:t>
+            </a:r>
+            <a:endParaRPr lang="en-GB" spc="-1" dirty="0">
+              <a:solidFill>
+                <a:srgbClr val="000000"/>
+              </a:solidFill>
+            </a:endParaRPr>
+          </a:p>
+          <a:p>
+            <a:pPr marL="6480">
+              <a:lnSpc>
+                <a:spcPct val="100000"/>
+              </a:lnSpc>
+              <a:spcBef>
+                <a:spcPts val="360"/>
+              </a:spcBef>
+              <a:buClr>
+                <a:srgbClr val="008C4F"/>
+              </a:buClr>
+              <a:buSzPct val="80000"/>
+            </a:pPr>
+            <a:r>
+              <a:rPr lang="en-US" spc="-1" dirty="0">
+                <a:solidFill>
+                  <a:srgbClr val="000000"/>
+                </a:solidFill>
+                <a:latin typeface="DejaVu Sans"/>
+              </a:rPr>
+              <a:t>12.07.2023 → Invited Lecture (L13)</a:t>
+            </a:r>
+          </a:p>
+          <a:p>
+            <a:pPr marL="6480">
+              <a:spcBef>
+                <a:spcPts val="360"/>
+              </a:spcBef>
+              <a:buClr>
+                <a:srgbClr val="008C4F"/>
+              </a:buClr>
+              <a:buSzPct val="80000"/>
+            </a:pPr>
+            <a:r>
+              <a:rPr lang="en-US" spc="-1" dirty="0">
+                <a:solidFill>
+                  <a:srgbClr val="000000"/>
+                </a:solidFill>
+                <a:latin typeface="DejaVu Sans"/>
+              </a:rPr>
+              <a:t>19.07.2023 → Now What? (L14)</a:t>
+            </a:r>
+          </a:p>
+        </p:txBody>
+      </p:sp>
+      <p:sp>
+        <p:nvSpPr>
+          <p:cNvPr id="5" name="Rechteck: abgerundete Ecken 4">
+            <a:extLst>
+              <a:ext uri="{FF2B5EF4-FFF2-40B4-BE49-F238E27FC236}">
+                <a16:creationId xmlns:a16="http://schemas.microsoft.com/office/drawing/2014/main" id="{BDF6080A-94D8-4F55-BAC2-39B1C19ED81B}"/>
+              </a:ext>
+            </a:extLst>
+          </p:cNvPr>
+          <p:cNvSpPr/>
+          <p:nvPr/>
+        </p:nvSpPr>
+        <p:spPr>
+          <a:xfrm>
+            <a:off x="8790752" y="3429000"/>
+            <a:ext cx="2290408" cy="2921959"/>
+          </a:xfrm>
+          <a:prstGeom prst="roundRect">
+            <a:avLst/>
+          </a:prstGeom>
+          <a:ln>
+            <a:solidFill>
+              <a:schemeClr val="accent3">
+                <a:lumMod val="75000"/>
+              </a:schemeClr>
+            </a:solidFill>
+          </a:ln>
+        </p:spPr>
+        <p:style>
+          <a:lnRef idx="2">
+            <a:schemeClr val="accent3"/>
+          </a:lnRef>
+          <a:fillRef idx="1">
+            <a:schemeClr val="lt1"/>
+          </a:fillRef>
+          <a:effectRef idx="0">
+            <a:schemeClr val="accent3"/>
+          </a:effectRef>
+          <a:fontRef idx="minor">
+            <a:schemeClr val="dk1"/>
+          </a:fontRef>
+        </p:style>
+        <p:txBody>
+          <a:bodyPr rtlCol="0" anchor="ctr"/>
+          <a:lstStyle/>
+          <a:p>
+            <a:pPr algn="ctr"/>
+            <a:r>
+              <a:rPr lang="en-US" dirty="0"/>
+              <a:t>L10 and L11 will </a:t>
+            </a:r>
+            <a:r>
+              <a:rPr lang="en-US" b="1" dirty="0"/>
+              <a:t>not</a:t>
+            </a:r>
+            <a:r>
+              <a:rPr lang="en-US" dirty="0"/>
+              <a:t> be live lectures. Instead, you will find pre-recorded videos and other content on our website. </a:t>
+            </a:r>
           </a:p>
         </p:txBody>
       </p:sp>
     </p:spTree>
+    <p:extLst>
+      <p:ext uri="{BB962C8B-B14F-4D97-AF65-F5344CB8AC3E}">
+        <p14:creationId xmlns:p14="http://schemas.microsoft.com/office/powerpoint/2010/main" val="3743541919"/>
+      </p:ext>
+    </p:extLst>
   </p:cSld>
   <p:clrMapOvr>
     <a:masterClrMapping/>
@@ -7793,19 +7749,7 @@
                 <a:latin typeface="DejaVu Sans"/>
                 <a:ea typeface="DejaVu Sans"/>
               </a:rPr>
-              <a:t>Dates/Times/Locations </a:t>
-            </a:r>
-            <a:r>
-              <a:rPr lang="en-US" sz="2400" b="1" spc="-1" dirty="0">
-                <a:solidFill>
-                  <a:srgbClr val="000000"/>
-                </a:solidFill>
-                <a:highlight>
-                  <a:srgbClr val="FF0000"/>
-                </a:highlight>
-                <a:latin typeface="DejaVu Sans"/>
-              </a:rPr>
-              <a:t>UPDATE NECESSARY </a:t>
+              <a:t>Dates/Times/Locations</a:t>
             </a:r>
             <a:endParaRPr lang="en-GB" sz="2400" b="0" strike="noStrike" spc="-1" dirty="0">
               <a:solidFill>
@@ -7964,7 +7908,30 @@
                 <a:latin typeface="DejaVu Sans"/>
                 <a:ea typeface="DejaVu Sans"/>
               </a:rPr>
-              <a:t> in Goslar is limited to ca. 15-20 seats due to the current COVID restrictions. Thus, </a:t>
+              <a:t> in Goslar is limited to ca</a:t>
+            </a:r>
+            <a:r>
+              <a:rPr lang="en-GB" sz="1800" b="0" strike="noStrike" spc="-1" dirty="0">
+                <a:solidFill>
+                  <a:srgbClr val="000000"/>
+                </a:solidFill>
+                <a:highlight>
+                  <a:srgbClr val="FFFF00"/>
+                </a:highlight>
+                <a:latin typeface="DejaVu Sans"/>
+                <a:ea typeface="DejaVu Sans"/>
+              </a:rPr>
+              <a:t>. 15-20 seats due to the current COVID restrictions</a:t>
+            </a:r>
+            <a:r>
+              <a:rPr lang="en-GB" sz="1800" b="0" strike="noStrike" spc="-1" dirty="0">
+                <a:solidFill>
+                  <a:srgbClr val="000000"/>
+                </a:solidFill>
+                <a:latin typeface="DejaVu Sans"/>
+                <a:ea typeface="DejaVu Sans"/>
+              </a:rPr>
+              <a:t>. Thus, </a:t>
             </a:r>
             <a:r>
               <a:rPr lang="en-GB" sz="1800" b="1" strike="noStrike" spc="-1" dirty="0">
@@ -8355,7 +8322,7 @@
                 <a:latin typeface="DejaVu Sans"/>
                 <a:ea typeface="DejaVu Sans"/>
               </a:rPr>
-              <a:t>Monday </a:t>
+              <a:t>Wednesday </a:t>
             </a:r>
             <a:r>
               <a:rPr lang="en-GB" b="1" spc="-1" dirty="0">
@@ -10021,7 +9988,7 @@
               <a:buChar char=""/>
             </a:pPr>
             <a:r>
-              <a:rPr lang="en-US" sz="1800" b="0" strike="noStrike" spc="-1">
+              <a:rPr lang="en-US" sz="1800" b="0" strike="noStrike" spc="-1" dirty="0">
                 <a:solidFill>
                   <a:srgbClr val="000000"/>
                 </a:solidFill>
@@ -10030,7 +9997,7 @@
               </a:rPr>
               <a:t>Prerequisite for admission to the final exam (all criteria have to be fulfilled):</a:t>
             </a:r>
-            <a:endParaRPr lang="en-GB" sz="1800" b="0" strike="noStrike" spc="-1">
+            <a:endParaRPr lang="en-GB" sz="1800" b="0" strike="noStrike" spc="-1" dirty="0">
               <a:solidFill>
                 <a:srgbClr val="000000"/>
               </a:solidFill>
@@ -10053,7 +10020,7 @@
               <a:buChar char="—"/>
             </a:pPr>
             <a:r>
-              <a:rPr lang="en-US" sz="1800" b="0" strike="noStrike" spc="-1">
+              <a:rPr lang="en-US" sz="1800" b="0" strike="noStrike" spc="-1" dirty="0">
                 <a:solidFill>
                   <a:srgbClr val="000000"/>
                 </a:solidFill>
@@ -10062,7 +10029,7 @@
               </a:rPr>
               <a:t>Submit all exercises</a:t>
             </a:r>
-            <a:endParaRPr lang="en-GB" sz="1800" b="0" strike="noStrike" spc="-1">
+            <a:endParaRPr lang="en-GB" sz="1800" b="0" strike="noStrike" spc="-1" dirty="0">
               <a:solidFill>
                 <a:srgbClr val="000000"/>
               </a:solidFill>
@@ -10078,7 +10045,7 @@
                 <a:spcPts val="360"/>
               </a:spcBef>
             </a:pPr>
-            <a:endParaRPr lang="en-GB" sz="1800" b="0" strike="noStrike" spc="-1">
+            <a:endParaRPr lang="en-GB" sz="1800" b="0" strike="noStrike" spc="-1" dirty="0">
               <a:solidFill>
                 <a:srgbClr val="000000"/>
               </a:solidFill>
@@ -10101,7 +10068,7 @@
               <a:buChar char=""/>
             </a:pPr>
             <a:r>
-              <a:rPr lang="en-US" sz="1800" b="0" strike="noStrike" spc="-1">
+              <a:rPr lang="en-US" sz="1800" b="0" strike="noStrike" spc="-1" dirty="0">
                 <a:solidFill>
                   <a:srgbClr val="000000"/>
                 </a:solidFill>
@@ -10110,7 +10077,7 @@
               </a:rPr>
               <a:t>Final exam:</a:t>
             </a:r>
-            <a:endParaRPr lang="en-GB" sz="1800" b="0" strike="noStrike" spc="-1">
+            <a:endParaRPr lang="en-GB" sz="1800" b="0" strike="noStrike" spc="-1" dirty="0">
               <a:solidFill>
                 <a:srgbClr val="000000"/>
               </a:solidFill>
@@ -10133,7 +10100,7 @@
               <a:buChar char="—"/>
             </a:pPr>
             <a:r>
-              <a:rPr lang="en-GB" sz="1800" b="0" strike="noStrike" spc="-1">
+              <a:rPr lang="en-GB" sz="1800" b="0" strike="noStrike" spc="-1" dirty="0">
                 <a:solidFill>
                   <a:srgbClr val="000000"/>
                 </a:solidFill>
@@ -10142,7 +10109,7 @@
               </a:rPr>
               <a:t>No Specific date yet</a:t>
             </a:r>
-            <a:endParaRPr lang="en-GB" sz="1800" b="0" strike="noStrike" spc="-1">
+            <a:endParaRPr lang="en-GB" sz="1800" b="0" strike="noStrike" spc="-1" dirty="0">
               <a:solidFill>
                 <a:srgbClr val="000000"/>
               </a:solidFill>
@@ -10165,7 +10132,7 @@
               <a:buChar char="—"/>
             </a:pPr>
             <a:r>
-              <a:rPr lang="en-US" sz="1800" b="0" strike="noStrike" spc="-1">
+              <a:rPr lang="en-US" sz="1800" b="0" strike="noStrike" spc="-1" dirty="0">
                 <a:solidFill>
                   <a:srgbClr val="000000"/>
                 </a:solidFill>
@@ -10175,7 +10142,7 @@
               <a:t>Either written exam (120min) </a:t>
             </a:r>
             <a:r>
-              <a:rPr lang="en-US" sz="1800" b="1" strike="noStrike" spc="-1">
+              <a:rPr lang="en-US" sz="1800" b="1" strike="noStrike" spc="-1" dirty="0">
                 <a:solidFill>
                   <a:srgbClr val="000000"/>
                 </a:solidFill>
@@ -10185,7 +10152,7 @@
               <a:t>or</a:t>
             </a:r>
             <a:r>
-              <a:rPr lang="en-US" sz="1800" b="0" strike="noStrike" spc="-1">
+              <a:rPr lang="en-US" sz="1800" b="0" strike="noStrike" spc="-1" dirty="0">
                 <a:solidFill>
                   <a:srgbClr val="000000"/>
                 </a:solidFill>
@@ -10194,7 +10161,7 @@
               </a:rPr>
               <a:t> oral examination (20-25min)</a:t>
             </a:r>
-            <a:endParaRPr lang="en-GB" sz="1800" b="0" strike="noStrike" spc="-1">
+            <a:endParaRPr lang="en-GB" sz="1800" b="0" strike="noStrike" spc="-1" dirty="0">
               <a:solidFill>
                 <a:srgbClr val="000000"/>
               </a:solidFill>
@@ -10217,19 +10184,25 @@
               <a:buChar char="—"/>
             </a:pPr>
             <a:r>
-              <a:rPr lang="en-US" sz="1800" b="0" strike="noStrike" spc="-1">
-                <a:solidFill>
-                  <a:srgbClr val="000000"/>
-                </a:solidFill>
+              <a:rPr lang="en-US" sz="1800" b="0" strike="noStrike" spc="-1" dirty="0">
+                <a:solidFill>
+                  <a:srgbClr val="000000"/>
+                </a:solidFill>
+                <a:highlight>
+                  <a:srgbClr val="FFFF00"/>
+                </a:highlight>
                 <a:latin typeface="DejaVu Sans"/>
                 <a:ea typeface="DejaVu Sans"/>
               </a:rPr>
               <a:t>Online vs. lecture room examination → depends on the pandemic and the number of students </a:t>
             </a:r>
-            <a:endParaRPr lang="en-GB" sz="1800" b="0" strike="noStrike" spc="-1">
-              <a:solidFill>
-                <a:srgbClr val="000000"/>
-              </a:solidFill>
+            <a:endParaRPr lang="en-GB" sz="1800" b="0" strike="noStrike" spc="-1" dirty="0">
+              <a:solidFill>
+                <a:srgbClr val="000000"/>
+              </a:solidFill>
+              <a:highlight>
+                <a:srgbClr val="FFFF00"/>
+              </a:highlight>
               <a:latin typeface="Arial"/>
             </a:endParaRPr>
           </a:p>
@@ -12547,7 +12520,7 @@
         </p:blipFill>
         <p:spPr>
           <a:xfrm>
-            <a:off x="4972109" y="2160529"/>
+            <a:off x="2957566" y="2417704"/>
             <a:ext cx="1468440" cy="2169720"/>
           </a:xfrm>
           <a:prstGeom prst="rect">
@@ -12566,7 +12539,7 @@
         </p:nvSpPr>
         <p:spPr>
           <a:xfrm>
-            <a:off x="3907589" y="4276609"/>
+            <a:off x="1893046" y="4659747"/>
             <a:ext cx="3633120" cy="674640"/>
           </a:xfrm>
           <a:prstGeom prst="rect">
@@ -12604,7 +12577,7 @@
               </a:spcBef>
             </a:pPr>
             <a:r>
-              <a:rPr lang="de-DE" sz="1600" b="0" strike="noStrike" spc="-1">
+              <a:rPr lang="de-DE" sz="1600" b="0" strike="noStrike" spc="-1" dirty="0">
                 <a:solidFill>
                   <a:srgbClr val="595959"/>
                 </a:solidFill>
@@ -12613,7 +12586,7 @@
               </a:rPr>
               <a:t>Prof. Dr. Benjamin Leiding</a:t>
             </a:r>
-            <a:endParaRPr lang="en-GB" sz="1600" b="0" strike="noStrike" spc="-1">
+            <a:endParaRPr lang="en-GB" sz="1600" b="0" strike="noStrike" spc="-1" dirty="0">
               <a:solidFill>
                 <a:srgbClr val="000000"/>
               </a:solidFill>
@@ -12630,7 +12603,7 @@
               </a:spcBef>
             </a:pPr>
             <a:r>
-              <a:rPr lang="de-DE" sz="1200" b="0" strike="noStrike" spc="-1">
+              <a:rPr lang="de-DE" sz="1200" b="0" strike="noStrike" spc="-1" dirty="0">
                 <a:solidFill>
                   <a:srgbClr val="595959"/>
                 </a:solidFill>
@@ -12639,7 +12612,7 @@
               </a:rPr>
               <a:t>benjamin.leiding@tu-clausthal.de</a:t>
             </a:r>
-            <a:endParaRPr lang="en-GB" sz="1200" b="0" strike="noStrike" spc="-1">
+            <a:endParaRPr lang="en-GB" sz="1200" b="0" strike="noStrike" spc="-1" dirty="0">
               <a:solidFill>
                 <a:srgbClr val="000000"/>
               </a:solidFill>
@@ -12656,7 +12629,7 @@
         </p:nvSpPr>
         <p:spPr>
           <a:xfrm>
-            <a:off x="7175236" y="4244481"/>
+            <a:off x="5160693" y="4659747"/>
             <a:ext cx="3633120" cy="674640"/>
           </a:xfrm>
           <a:prstGeom prst="rect">
@@ -12764,7 +12737,7 @@
         </p:blipFill>
         <p:spPr>
           <a:xfrm>
-            <a:off x="8284412" y="2053880"/>
+            <a:off x="6269869" y="2417704"/>
             <a:ext cx="1414767" cy="2169721"/>
           </a:xfrm>
           <a:prstGeom prst="rect">
@@ -12772,162 +12745,6 @@
           </a:prstGeom>
         </p:spPr>
       </p:pic>
-      <p:pic>
-        <p:nvPicPr>
-          <p:cNvPr id="7" name="Grafik 11">
-            <a:extLst>
-              <a:ext uri="{FF2B5EF4-FFF2-40B4-BE49-F238E27FC236}">
-                <a16:creationId xmlns:a16="http://schemas.microsoft.com/office/drawing/2014/main" id="{8BFC4F77-2B19-4945-927F-BC3E614109CC}"/>
-              </a:ext>
-            </a:extLst>
-          </p:cNvPr>
-          <p:cNvPicPr/>
-          <p:nvPr/>
-        </p:nvPicPr>
-        <p:blipFill rotWithShape="1">
-          <a:blip r:embed="rId4"/>
-          <a:srcRect l="8585" r="11276"/>
-          <a:stretch/>
-        </p:blipFill>
-        <p:spPr>
-          <a:xfrm>
-            <a:off x="1457243" y="2160529"/>
-            <a:ext cx="1591602" cy="2125411"/>
-          </a:xfrm>
-          <a:prstGeom prst="rect">
-            <a:avLst/>
-          </a:prstGeom>
-          <a:ln w="0">
-            <a:noFill/>
-          </a:ln>
-        </p:spPr>
-      </p:pic>
-      <p:sp>
-        <p:nvSpPr>
-          <p:cNvPr id="8" name="CustomShape 3">
-            <a:extLst>
-              <a:ext uri="{FF2B5EF4-FFF2-40B4-BE49-F238E27FC236}">
-                <a16:creationId xmlns:a16="http://schemas.microsoft.com/office/drawing/2014/main" id="{BCF25316-AD76-4F34-AE98-9E8893C8BB5C}"/>
-              </a:ext>
-            </a:extLst>
-          </p:cNvPr>
-          <p:cNvSpPr/>
-          <p:nvPr/>
-        </p:nvSpPr>
-        <p:spPr>
-          <a:xfrm>
-            <a:off x="436484" y="4255700"/>
-            <a:ext cx="3633120" cy="674640"/>
-          </a:xfrm>
-          <a:prstGeom prst="rect">
-            <a:avLst/>
-          </a:prstGeom>
-          <a:noFill/>
-          <a:ln w="0">
-            <a:noFill/>
-          </a:ln>
-        </p:spPr>
-        <p:style>
-          <a:lnRef idx="0">
-            <a:scrgbClr r="0" g="0" b="0"/>
-          </a:lnRef>
-          <a:fillRef idx="0">
-            <a:scrgbClr r="0" g="0" b="0"/>
-          </a:fillRef>
-          <a:effectRef idx="0">
-            <a:scrgbClr r="0" g="0" b="0"/>
-          </a:effectRef>
-          <a:fontRef idx="minor"/>
-        </p:style>
-        <p:txBody>
-          <a:bodyPr lIns="90000" tIns="45000" rIns="90000" bIns="45000" anchor="ctr">
-            <a:noAutofit/>
-          </a:bodyPr>
-          <a:lstStyle/>
-          <a:p>
-            <a:pPr marL="360" algn="ctr">
-              <a:lnSpc>
-                <a:spcPct val="100000"/>
-              </a:lnSpc>
-              <a:spcBef>
-                <a:spcPts val="360"/>
-              </a:spcBef>
-            </a:pPr>
-            <a:r>
-              <a:rPr lang="de-DE" sz="1600" b="0" strike="noStrike" spc="-1" dirty="0">
-                <a:solidFill>
-                  <a:srgbClr val="595959"/>
-                </a:solidFill>
-                <a:latin typeface="DejaVu Sans"/>
-                <a:ea typeface="DejaVu Sans"/>
-              </a:rPr>
-              <a:t>M.Sc. </a:t>
-            </a:r>
-            <a:r>
-              <a:rPr lang="de-DE" sz="1600" b="0" strike="noStrike" spc="-1" dirty="0" err="1">
-                <a:solidFill>
-                  <a:srgbClr val="595959"/>
-                </a:solidFill>
-                <a:latin typeface="DejaVu Sans"/>
-                <a:ea typeface="DejaVu Sans"/>
-              </a:rPr>
-              <a:t>Anant</a:t>
-            </a:r>
-            <a:r>
-              <a:rPr lang="de-DE" sz="1600" b="0" strike="noStrike" spc="-1" dirty="0">
-                <a:solidFill>
-                  <a:srgbClr val="595959"/>
-                </a:solidFill>
-                <a:latin typeface="DejaVu Sans"/>
-                <a:ea typeface="DejaVu Sans"/>
-              </a:rPr>
-              <a:t> </a:t>
-            </a:r>
-            <a:r>
-              <a:rPr lang="de-DE" sz="1600" b="0" strike="noStrike" spc="-1" dirty="0" err="1">
-                <a:solidFill>
-                  <a:srgbClr val="595959"/>
-                </a:solidFill>
-                <a:latin typeface="DejaVu Sans"/>
-                <a:ea typeface="DejaVu Sans"/>
-              </a:rPr>
-              <a:t>Sujatanagarjuna</a:t>
-            </a:r>
-            <a:endParaRPr lang="en-GB" sz="1600" b="0" strike="noStrike" spc="-1" dirty="0">
-              <a:solidFill>
-                <a:srgbClr val="000000"/>
-              </a:solidFill>
-              <a:latin typeface="Arial"/>
-            </a:endParaRPr>
-          </a:p>
-          <a:p>
-            <a:pPr marL="360" algn="ctr">
-              <a:lnSpc>
-                <a:spcPct val="100000"/>
-              </a:lnSpc>
-              <a:spcBef>
-                <a:spcPts val="360"/>
-              </a:spcBef>
-            </a:pPr>
-            <a:r>
-              <a:rPr lang="de-DE" sz="1200" b="0" strike="noStrike" spc="-1" dirty="0">
-                <a:solidFill>
-                  <a:srgbClr val="595959"/>
-                </a:solidFill>
-                <a:latin typeface="DejaVu Sans"/>
-                <a:ea typeface="DejaVu Sans"/>
-              </a:rPr>
-              <a:t>anant.sujatanagarjuna@tu-clausthal.de</a:t>
-            </a:r>
-            <a:endParaRPr lang="en-GB" sz="1200" b="0" strike="noStrike" spc="-1" dirty="0">
-              <a:solidFill>
-                <a:srgbClr val="000000"/>
-              </a:solidFill>
-              <a:latin typeface="Arial"/>
-            </a:endParaRPr>
-          </a:p>
-        </p:txBody>
-      </p:sp>
     </p:spTree>
   </p:cSld>
   <p:clrMapOvr>
@@ -13016,59 +12833,13 @@
       </p:sp>
       <p:sp>
         <p:nvSpPr>
-          <p:cNvPr id="108" name="CustomShape 2"/>
-          <p:cNvSpPr/>
-          <p:nvPr/>
-        </p:nvSpPr>
-        <p:spPr>
-          <a:xfrm>
-            <a:off x="451800" y="1709280"/>
-            <a:ext cx="8218800" cy="4347000"/>
-          </a:xfrm>
-          <a:prstGeom prst="rect">
-            <a:avLst/>
-          </a:prstGeom>
-          <a:noFill/>
-          <a:ln w="9360">
-            <a:noFill/>
-          </a:ln>
-        </p:spPr>
-        <p:style>
-          <a:lnRef idx="0">
-            <a:scrgbClr r="0" g="0" b="0"/>
-          </a:lnRef>
-          <a:fillRef idx="0">
-            <a:scrgbClr r="0" g="0" b="0"/>
-          </a:fillRef>
-          <a:effectRef idx="0">
-            <a:scrgbClr r="0" g="0" b="0"/>
-          </a:effectRef>
-          <a:fontRef idx="minor"/>
-        </p:style>
-        <p:txBody>
-          <a:bodyPr lIns="90000" tIns="45000" rIns="90000" bIns="45000" anchor="t">
-            <a:noAutofit/>
-          </a:bodyPr>
-          <a:lstStyle/>
-          <a:p>
-            <a:endParaRPr lang="en-GB" sz="1800" b="0" strike="noStrike" spc="-1">
-              <a:solidFill>
-                <a:srgbClr val="000000"/>
-              </a:solidFill>
-              <a:latin typeface="Arial"/>
-            </a:endParaRPr>
-          </a:p>
-        </p:txBody>
-      </p:sp>
-      <p:sp>
-        <p:nvSpPr>
           <p:cNvPr id="109" name="CustomShape 3"/>
           <p:cNvSpPr/>
           <p:nvPr/>
         </p:nvSpPr>
         <p:spPr>
           <a:xfrm>
-            <a:off x="609480" y="1769400"/>
+            <a:off x="619313" y="1213920"/>
             <a:ext cx="10581840" cy="4849920"/>
           </a:xfrm>
           <a:prstGeom prst="rect">
@@ -13498,6 +13269,15 @@
               <a:buChar char="—"/>
             </a:pPr>
             <a:r>
+              <a:rPr lang="en-US" spc="-1" dirty="0">
+                <a:solidFill>
+                  <a:srgbClr val="000000"/>
+                </a:solidFill>
+                <a:latin typeface="DejaVu Sans"/>
+              </a:rPr>
+              <a:t>IoT and Digitalization for Circular Economy (</a:t>
+            </a:r>
+            <a:r>
               <a:rPr lang="en-US" sz="1800" b="0" strike="noStrike" spc="-1" dirty="0">
                 <a:solidFill>
                   <a:srgbClr val="000000"/>
@@ -13505,7 +13285,20 @@
                 <a:latin typeface="DejaVu Sans"/>
                 <a:ea typeface="DejaVu Sans"/>
               </a:rPr>
-              <a:t>Requirements Engineering (WS – M.Sc.)</a:t>
+              <a:t>SS – </a:t>
+            </a:r>
+            <a:r>
+              <a:rPr lang="en-US" sz="1800" b="0" strike="noStrike" spc="-1" dirty="0">
+                <a:solidFill>
+                  <a:srgbClr val="000000"/>
+                </a:solidFill>
+                <a:highlight>
+                  <a:srgbClr val="FFFF00"/>
+                </a:highlight>
+                <a:latin typeface="DejaVu Sans"/>
+                <a:ea typeface="DejaVu Sans"/>
+              </a:rPr>
+              <a:t>M.Sc.)</a:t>
             </a:r>
           </a:p>
         </p:txBody>
@@ -15032,21 +14825,15 @@
               </a:lnSpc>
             </a:pPr>
             <a:r>
-              <a:rPr lang="en-US" sz="2200" b="1" strike="noStrike" spc="-1">
-                <a:solidFill>
-                  <a:srgbClr val="000000"/>
-                </a:solidFill>
-                <a:latin typeface="DejaVu Sans"/>
-                <a:ea typeface="DejaVu Sans"/>
-              </a:rPr>
-              <a:t>Learning Outcome</a:t>
-            </a:r>
-            <a:endParaRPr lang="en-GB" sz="2200" b="0" strike="noStrike" spc="-1">
-              <a:solidFill>
-                <a:srgbClr val="000000"/>
-              </a:solidFill>
-              <a:latin typeface="Arial"/>
-            </a:endParaRPr>
+              <a:rPr lang="en-US" sz="2200" b="1" strike="noStrike" spc="-1" dirty="0">
+                <a:solidFill>
+                  <a:srgbClr val="000000"/>
+                </a:solidFill>
+                <a:latin typeface="DejaVu Sans"/>
+                <a:ea typeface="DejaVu Sans"/>
+              </a:rPr>
+              <a:t>Learning Outcome </a:t>
+            </a:r>
           </a:p>
         </p:txBody>
       </p:sp>
@@ -15289,13 +15076,13 @@
       </p:grpSpPr>
       <p:sp>
         <p:nvSpPr>
-          <p:cNvPr id="122" name="CustomShape 1"/>
+          <p:cNvPr id="124" name="CustomShape 1"/>
           <p:cNvSpPr/>
           <p:nvPr/>
         </p:nvSpPr>
         <p:spPr>
           <a:xfrm>
-            <a:off x="335520" y="764640"/>
+            <a:off x="335520" y="771840"/>
             <a:ext cx="10745640" cy="496440"/>
           </a:xfrm>
           <a:prstGeom prst="rect">
@@ -15330,19 +15117,22 @@
               </a:lnSpc>
             </a:pPr>
             <a:r>
-              <a:rPr lang="de-DE" sz="2400" b="1" strike="noStrike" spc="-1">
-                <a:solidFill>
-                  <a:srgbClr val="000000"/>
-                </a:solidFill>
-                <a:latin typeface="DejaVu Sans"/>
-                <a:ea typeface="DejaVu Sans"/>
-              </a:rPr>
-              <a:t>Lecture Plan</a:t>
-            </a:r>
-            <a:endParaRPr lang="en-GB" sz="2400" b="0" strike="noStrike" spc="-1">
-              <a:solidFill>
-                <a:srgbClr val="000000"/>
-              </a:solidFill>
+              <a:rPr lang="en-US" sz="2400" b="1" strike="noStrike" spc="-1" dirty="0">
+                <a:solidFill>
+                  <a:srgbClr val="000000"/>
+                </a:solidFill>
+                <a:latin typeface="DejaVu Sans"/>
+                <a:ea typeface="DejaVu Sans"/>
+              </a:rPr>
+              <a:t>Course Organization</a:t>
+            </a:r>
+            <a:endParaRPr lang="en-GB" sz="2400" b="0" strike="noStrike" spc="-1" dirty="0">
+              <a:solidFill>
+                <a:srgbClr val="000000"/>
+              </a:solidFill>
+              <a:highlight>
+                <a:srgbClr val="FF0000"/>
+              </a:highlight>
               <a:latin typeface="Arial"/>
             </a:endParaRPr>
           </a:p>
@@ -15350,14 +15140,14 @@
       </p:sp>
       <p:sp>
         <p:nvSpPr>
-          <p:cNvPr id="123" name="CustomShape 2"/>
+          <p:cNvPr id="125" name="CustomShape 2"/>
           <p:cNvSpPr/>
           <p:nvPr/>
         </p:nvSpPr>
         <p:spPr>
           <a:xfrm>
-            <a:off x="335520" y="1380744"/>
-            <a:ext cx="10745640" cy="5093208"/>
+            <a:off x="335520" y="1268280"/>
+            <a:ext cx="10745640" cy="5033160"/>
           </a:xfrm>
           <a:prstGeom prst="rect">
             <a:avLst/>
@@ -15400,16 +15190,6 @@
               <a:buChar char=""/>
             </a:pPr>
             <a:r>
-              <a:rPr lang="en-US" spc="-1" dirty="0">
-                <a:solidFill>
-                  <a:srgbClr val="000000"/>
-                </a:solidFill>
-                <a:latin typeface="DejaVu Sans"/>
-                <a:ea typeface="DejaVu Sans"/>
-              </a:rPr>
-              <a:t>19</a:t>
-            </a:r>
-            <a:r>
               <a:rPr lang="en-US" sz="1800" b="0" strike="noStrike" spc="-1" dirty="0">
                 <a:solidFill>
                   <a:srgbClr val="000000"/>
@@ -15417,8 +15197,46 @@
                 <a:latin typeface="DejaVu Sans"/>
                 <a:ea typeface="DejaVu Sans"/>
               </a:rPr>
-              <a:t>.04.2023 → Organization (L00) + Introduction (L01)</a:t>
-            </a:r>
+              <a:t>Course website – </a:t>
+            </a:r>
+            <a:r>
+              <a:rPr lang="en-US" sz="1800" b="0" u="sng" strike="noStrike" spc="-1" dirty="0">
+                <a:solidFill>
+                  <a:srgbClr val="0000FF"/>
+                </a:solidFill>
+                <a:uFillTx/>
+                <a:latin typeface="DejaVu Sans"/>
+                <a:ea typeface="DejaVu Sans"/>
+                <a:hlinkClick r:id="rId2"/>
+              </a:rPr>
+              <a:t>Link</a:t>
+            </a:r>
+            <a:r>
+              <a:rPr lang="en-US" sz="1800" b="0" strike="noStrike" spc="-1" dirty="0">
+                <a:solidFill>
+                  <a:srgbClr val="000000"/>
+                </a:solidFill>
+                <a:latin typeface="DejaVu Sans"/>
+                <a:ea typeface="DejaVu Sans"/>
+              </a:rPr>
+              <a:t> </a:t>
+            </a:r>
+            <a:endParaRPr lang="en-GB" sz="1800" b="0" strike="noStrike" spc="-1" dirty="0">
+              <a:solidFill>
+                <a:srgbClr val="000000"/>
+              </a:solidFill>
+              <a:latin typeface="Arial"/>
+            </a:endParaRPr>
+          </a:p>
+          <a:p>
+            <a:pPr>
+              <a:lnSpc>
+                <a:spcPct val="100000"/>
+              </a:lnSpc>
+              <a:spcBef>
+                <a:spcPts val="360"/>
+              </a:spcBef>
+            </a:pPr>
             <a:endParaRPr lang="en-GB" sz="1800" b="0" strike="noStrike" spc="-1" dirty="0">
               <a:solidFill>
                 <a:srgbClr val="000000"/>
@@ -15442,43 +15260,173 @@
               <a:buChar char=""/>
             </a:pPr>
             <a:r>
-              <a:rPr lang="en-US" spc="-1" dirty="0">
-                <a:solidFill>
-                  <a:srgbClr val="000000"/>
-                </a:solidFill>
-                <a:latin typeface="DejaVu Sans"/>
-              </a:rPr>
-              <a:t>26.04.2023 </a:t>
-            </a:r>
-            <a:r>
-              <a:rPr lang="en-US" sz="1800" b="0" strike="noStrike" spc="-1" dirty="0">
-                <a:solidFill>
-                  <a:srgbClr val="000000"/>
-                </a:solidFill>
-                <a:latin typeface="DejaVu Sans"/>
-                <a:ea typeface="DejaVu Sans"/>
-              </a:rPr>
-              <a:t>→ </a:t>
-            </a:r>
-            <a:r>
-              <a:rPr lang="en-US" spc="-1" dirty="0">
-                <a:solidFill>
-                  <a:srgbClr val="000000"/>
-                </a:solidFill>
-                <a:latin typeface="DejaVu Sans"/>
-              </a:rPr>
-              <a:t>Challenges I: Climate Change (</a:t>
-            </a:r>
-            <a:r>
-              <a:rPr lang="en-US" sz="1800" b="0" strike="noStrike" spc="-1" dirty="0">
-                <a:solidFill>
-                  <a:srgbClr val="000000"/>
-                </a:solidFill>
-                <a:latin typeface="DejaVu Sans"/>
-                <a:ea typeface="DejaVu Sans"/>
-              </a:rPr>
-              <a:t>L02)</a:t>
-            </a:r>
+              <a:rPr lang="en-GB" sz="1800" b="0" strike="noStrike" spc="-1" dirty="0">
+                <a:solidFill>
+                  <a:srgbClr val="000000"/>
+                </a:solidFill>
+                <a:latin typeface="DejaVu Sans"/>
+                <a:ea typeface="DejaVu Sans"/>
+              </a:rPr>
+              <a:t>News and updates:</a:t>
+            </a:r>
+            <a:endParaRPr lang="en-GB" sz="1800" b="0" strike="noStrike" spc="-1" dirty="0">
+              <a:solidFill>
+                <a:srgbClr val="000000"/>
+              </a:solidFill>
+              <a:latin typeface="Arial"/>
+            </a:endParaRPr>
+          </a:p>
+          <a:p>
+            <a:pPr marL="432000" lvl="1" indent="-211320">
+              <a:lnSpc>
+                <a:spcPct val="100000"/>
+              </a:lnSpc>
+              <a:spcBef>
+                <a:spcPts val="360"/>
+              </a:spcBef>
+              <a:buClr>
+                <a:srgbClr val="008C4F"/>
+              </a:buClr>
+              <a:buSzPct val="45000"/>
+              <a:buFont typeface="OpenSymbol"/>
+              <a:buChar char="—"/>
+            </a:pPr>
+            <a:r>
+              <a:rPr lang="en-GB" sz="1800" b="0" strike="noStrike" spc="-1" dirty="0">
+                <a:solidFill>
+                  <a:srgbClr val="000000"/>
+                </a:solidFill>
+                <a:latin typeface="DejaVu Sans"/>
+                <a:ea typeface="DejaVu Sans"/>
+              </a:rPr>
+              <a:t>CLZ students + </a:t>
+            </a:r>
+            <a:r>
+              <a:rPr lang="en-GB" sz="1800" b="0" strike="noStrike" spc="-1" dirty="0" err="1">
+                <a:solidFill>
+                  <a:srgbClr val="000000"/>
+                </a:solidFill>
+                <a:latin typeface="DejaVu Sans"/>
+                <a:ea typeface="DejaVu Sans"/>
+              </a:rPr>
+              <a:t>DigiTec</a:t>
+            </a:r>
+            <a:r>
+              <a:rPr lang="en-GB" sz="1800" b="0" strike="noStrike" spc="-1" dirty="0">
+                <a:solidFill>
+                  <a:srgbClr val="000000"/>
+                </a:solidFill>
+                <a:latin typeface="DejaVu Sans"/>
+                <a:ea typeface="DejaVu Sans"/>
+              </a:rPr>
+              <a:t>: </a:t>
+            </a:r>
+            <a:r>
+              <a:rPr lang="en-GB" sz="1800" b="0" strike="noStrike" spc="-1" dirty="0" err="1">
+                <a:solidFill>
+                  <a:srgbClr val="000000"/>
+                </a:solidFill>
+                <a:latin typeface="DejaVu Sans"/>
+                <a:ea typeface="DejaVu Sans"/>
+              </a:rPr>
+              <a:t>StudIP</a:t>
+            </a:r>
+            <a:r>
+              <a:rPr lang="en-GB" sz="1800" b="0" strike="noStrike" spc="-1" dirty="0">
+                <a:solidFill>
+                  <a:srgbClr val="000000"/>
+                </a:solidFill>
+                <a:latin typeface="DejaVu Sans"/>
+                <a:ea typeface="DejaVu Sans"/>
+              </a:rPr>
+              <a:t> (</a:t>
+            </a:r>
+            <a:r>
+              <a:rPr lang="en-GB" sz="1800" b="0" u="sng" strike="noStrike" spc="-1" dirty="0">
+                <a:solidFill>
+                  <a:srgbClr val="0000FF"/>
+                </a:solidFill>
+                <a:uFillTx/>
+                <a:latin typeface="DejaVu Sans"/>
+                <a:ea typeface="DejaVu Sans"/>
+                <a:hlinkClick r:id="rId3"/>
+              </a:rPr>
+              <a:t>Link</a:t>
+            </a:r>
+            <a:r>
+              <a:rPr lang="en-GB" sz="1800" b="0" strike="noStrike" spc="-1" dirty="0">
+                <a:solidFill>
+                  <a:srgbClr val="000000"/>
+                </a:solidFill>
+                <a:latin typeface="DejaVu Sans"/>
+                <a:ea typeface="DejaVu Sans"/>
+              </a:rPr>
+              <a:t>)</a:t>
+            </a:r>
+            <a:endParaRPr lang="en-GB" sz="1800" b="0" strike="noStrike" spc="-1" dirty="0">
+              <a:solidFill>
+                <a:srgbClr val="000000"/>
+              </a:solidFill>
+              <a:latin typeface="Arial"/>
+            </a:endParaRPr>
+          </a:p>
+          <a:p>
+            <a:pPr marL="432000" lvl="1" indent="-211320">
+              <a:lnSpc>
+                <a:spcPct val="100000"/>
+              </a:lnSpc>
+              <a:spcBef>
+                <a:spcPts val="360"/>
+              </a:spcBef>
+              <a:buClr>
+                <a:srgbClr val="008C4F"/>
+              </a:buClr>
+              <a:buSzPct val="45000"/>
+              <a:buFont typeface="OpenSymbol"/>
+              <a:buChar char="—"/>
+            </a:pPr>
+            <a:r>
+              <a:rPr lang="en-GB" sz="1800" b="0" strike="noStrike" spc="-1" dirty="0">
+                <a:solidFill>
+                  <a:srgbClr val="000000"/>
+                </a:solidFill>
+                <a:latin typeface="DejaVu Sans"/>
+                <a:ea typeface="DejaVu Sans"/>
+              </a:rPr>
+              <a:t>Everyone else: </a:t>
+            </a:r>
+            <a:r>
+              <a:rPr lang="en-GB" sz="1800" b="0" strike="noStrike" spc="-1" dirty="0">
+                <a:solidFill>
+                  <a:srgbClr val="000000"/>
+                </a:solidFill>
+                <a:highlight>
+                  <a:srgbClr val="FFFF00"/>
+                </a:highlight>
+                <a:latin typeface="DejaVu Sans"/>
+                <a:ea typeface="DejaVu Sans"/>
+              </a:rPr>
+              <a:t>MATRIX</a:t>
+            </a:r>
+            <a:endParaRPr lang="en-GB" sz="1800" b="0" strike="noStrike" spc="-1" dirty="0">
+              <a:solidFill>
+                <a:srgbClr val="000000"/>
+              </a:solidFill>
+              <a:highlight>
+                <a:srgbClr val="FFFF00"/>
+              </a:highlight>
+              <a:latin typeface="Arial"/>
+            </a:endParaRPr>
+          </a:p>
+          <a:p>
+            <a:pPr>
+              <a:lnSpc>
+                <a:spcPct val="100000"/>
+              </a:lnSpc>
+              <a:spcBef>
+                <a:spcPts val="360"/>
+              </a:spcBef>
+            </a:pPr>
             <a:endParaRPr lang="en-GB" sz="1800" b="0" strike="noStrike" spc="-1" dirty="0">
               <a:solidFill>
                 <a:srgbClr val="000000"/>
@@ -15502,15 +15450,6 @@
               <a:buChar char=""/>
             </a:pPr>
             <a:r>
-              <a:rPr lang="en-US" spc="-1" dirty="0">
-                <a:solidFill>
-                  <a:srgbClr val="000000"/>
-                </a:solidFill>
-                <a:latin typeface="DejaVu Sans"/>
-              </a:rPr>
-              <a:t>03.05.2023 </a:t>
-            </a:r>
-            <a:r>
               <a:rPr lang="en-US" sz="1800" b="0" strike="noStrike" spc="-1" dirty="0">
                 <a:solidFill>
                   <a:srgbClr val="000000"/>
@@ -15518,16 +15457,17 @@
                 <a:latin typeface="DejaVu Sans"/>
                 <a:ea typeface="DejaVu Sans"/>
               </a:rPr>
-              <a:t>→ </a:t>
-            </a:r>
-            <a:r>
-              <a:rPr lang="en-US" spc="-1" dirty="0">
-                <a:solidFill>
-                  <a:srgbClr val="000000"/>
-                </a:solidFill>
-                <a:latin typeface="DejaVu Sans"/>
-              </a:rPr>
-              <a:t>Challenges II: Pollution and Natural Resources (</a:t>
+              <a:t>Slides will be uploaded to </a:t>
+            </a:r>
+            <a:r>
+              <a:rPr lang="en-US" sz="1800" b="0" strike="noStrike" spc="-1" dirty="0" err="1">
+                <a:solidFill>
+                  <a:srgbClr val="000000"/>
+                </a:solidFill>
+                <a:latin typeface="DejaVu Sans"/>
+                <a:ea typeface="DejaVu Sans"/>
+              </a:rPr>
+              <a:t>StudIP</a:t>
             </a:r>
             <a:r>
               <a:rPr lang="en-US" sz="1800" b="0" strike="noStrike" spc="-1" dirty="0">
@@ -15537,8 +15477,120 @@
                 <a:latin typeface="DejaVu Sans"/>
                 <a:ea typeface="DejaVu Sans"/>
               </a:rPr>
-              <a:t>L03)</a:t>
-            </a:r>
+              <a:t> (</a:t>
+            </a:r>
+            <a:r>
+              <a:rPr lang="en-US" sz="1800" b="0" u="sng" strike="noStrike" spc="-1" dirty="0">
+                <a:solidFill>
+                  <a:srgbClr val="0000FF"/>
+                </a:solidFill>
+                <a:uFillTx/>
+                <a:latin typeface="DejaVu Sans"/>
+                <a:ea typeface="DejaVu Sans"/>
+                <a:hlinkClick r:id="rId4"/>
+              </a:rPr>
+              <a:t>Link</a:t>
+            </a:r>
+            <a:r>
+              <a:rPr lang="en-US" sz="1800" b="0" strike="noStrike" spc="-1" dirty="0">
+                <a:solidFill>
+                  <a:srgbClr val="000000"/>
+                </a:solidFill>
+                <a:latin typeface="DejaVu Sans"/>
+                <a:ea typeface="DejaVu Sans"/>
+              </a:rPr>
+              <a:t>) and to </a:t>
+            </a:r>
+            <a:r>
+              <a:rPr lang="en-US" sz="1800" b="0" strike="noStrike" spc="-1" dirty="0" err="1">
+                <a:solidFill>
+                  <a:srgbClr val="000000"/>
+                </a:solidFill>
+                <a:latin typeface="DejaVu Sans"/>
+                <a:ea typeface="DejaVu Sans"/>
+              </a:rPr>
+              <a:t>Github</a:t>
+            </a:r>
+            <a:r>
+              <a:rPr lang="en-US" sz="1800" b="0" strike="noStrike" spc="-1" dirty="0">
+                <a:solidFill>
+                  <a:srgbClr val="000000"/>
+                </a:solidFill>
+                <a:latin typeface="DejaVu Sans"/>
+                <a:ea typeface="DejaVu Sans"/>
+              </a:rPr>
+              <a:t> (</a:t>
+            </a:r>
+            <a:r>
+              <a:rPr lang="en-US" sz="1800" b="0" u="sng" strike="noStrike" spc="-1" dirty="0">
+                <a:solidFill>
+                  <a:srgbClr val="0000FF"/>
+                </a:solidFill>
+                <a:uFillTx/>
+                <a:latin typeface="DejaVu Sans"/>
+                <a:ea typeface="DejaVu Sans"/>
+                <a:hlinkClick r:id="rId5"/>
+              </a:rPr>
+              <a:t>Link</a:t>
+            </a:r>
+            <a:r>
+              <a:rPr lang="en-US" sz="1800" b="0" strike="noStrike" spc="-1" dirty="0">
+                <a:solidFill>
+                  <a:srgbClr val="000000"/>
+                </a:solidFill>
+                <a:latin typeface="DejaVu Sans"/>
+                <a:ea typeface="DejaVu Sans"/>
+              </a:rPr>
+              <a:t>)</a:t>
+            </a:r>
+            <a:endParaRPr lang="en-GB" sz="1800" b="0" strike="noStrike" spc="-1" dirty="0">
+              <a:solidFill>
+                <a:srgbClr val="000000"/>
+              </a:solidFill>
+              <a:latin typeface="Arial"/>
+            </a:endParaRPr>
+          </a:p>
+          <a:p>
+            <a:pPr marL="744120" lvl="1" indent="-280440">
+              <a:lnSpc>
+                <a:spcPct val="100000"/>
+              </a:lnSpc>
+              <a:spcBef>
+                <a:spcPts val="360"/>
+              </a:spcBef>
+              <a:buClr>
+                <a:srgbClr val="008C4F"/>
+              </a:buClr>
+              <a:buSzPct val="80000"/>
+              <a:buFont typeface="StarSymbol"/>
+              <a:buChar char="—"/>
+            </a:pPr>
+            <a:r>
+              <a:rPr lang="en-US" sz="1800" b="0" strike="noStrike" spc="-1" dirty="0">
+                <a:solidFill>
+                  <a:srgbClr val="000000"/>
+                </a:solidFill>
+                <a:latin typeface="DejaVu Sans"/>
+                <a:ea typeface="DejaVu Sans"/>
+              </a:rPr>
+              <a:t>Please report bugs ;)</a:t>
+            </a:r>
+            <a:endParaRPr lang="en-GB" sz="1800" b="0" strike="noStrike" spc="-1" dirty="0">
+              <a:solidFill>
+                <a:srgbClr val="000000"/>
+              </a:solidFill>
+              <a:latin typeface="Arial"/>
+            </a:endParaRPr>
+          </a:p>
+          <a:p>
+            <a:pPr>
+              <a:lnSpc>
+                <a:spcPct val="100000"/>
+              </a:lnSpc>
+              <a:spcBef>
+                <a:spcPts val="360"/>
+              </a:spcBef>
+            </a:pPr>
             <a:endParaRPr lang="en-GB" sz="1800" b="0" strike="noStrike" spc="-1" dirty="0">
               <a:solidFill>
                 <a:srgbClr val="000000"/>
@@ -15562,15 +15614,6 @@
               <a:buChar char=""/>
             </a:pPr>
             <a:r>
-              <a:rPr lang="en-US" spc="-1" dirty="0">
-                <a:solidFill>
-                  <a:srgbClr val="000000"/>
-                </a:solidFill>
-                <a:latin typeface="DejaVu Sans"/>
-              </a:rPr>
-              <a:t>10.05.2023 </a:t>
-            </a:r>
-            <a:r>
               <a:rPr lang="en-US" sz="1800" b="0" strike="noStrike" spc="-1" dirty="0">
                 <a:solidFill>
                   <a:srgbClr val="000000"/>
@@ -15578,7 +15621,37 @@
                 <a:latin typeface="DejaVu Sans"/>
                 <a:ea typeface="DejaVu Sans"/>
               </a:rPr>
-              <a:t>→ Sustainability and Political (In-)Action (L04)</a:t>
+              <a:t>Lecture recordings will be available on </a:t>
+            </a:r>
+            <a:r>
+              <a:rPr lang="en-US" sz="1800" b="0" strike="noStrike" spc="-1" dirty="0" err="1">
+                <a:solidFill>
+                  <a:srgbClr val="000000"/>
+                </a:solidFill>
+                <a:latin typeface="DejaVu Sans"/>
+                <a:ea typeface="DejaVu Sans"/>
+              </a:rPr>
+              <a:t>StudIP</a:t>
+            </a:r>
+            <a:r>
+              <a:rPr lang="en-US" sz="1800" b="0" strike="noStrike" spc="-1" dirty="0">
+                <a:solidFill>
+                  <a:srgbClr val="000000"/>
+                </a:solidFill>
+                <a:latin typeface="DejaVu Sans"/>
+                <a:ea typeface="DejaVu Sans"/>
+              </a:rPr>
+              <a:t> and on </a:t>
+            </a:r>
+            <a:r>
+              <a:rPr lang="en-US" sz="1800" b="0" strike="noStrike" spc="-1" dirty="0" err="1">
+                <a:solidFill>
+                  <a:srgbClr val="000000"/>
+                </a:solidFill>
+                <a:latin typeface="DejaVu Sans"/>
+                <a:ea typeface="DejaVu Sans"/>
+              </a:rPr>
+              <a:t>Github</a:t>
             </a:r>
             <a:endParaRPr lang="en-GB" sz="1800" b="0" strike="noStrike" spc="-1" dirty="0">
               <a:solidFill>
@@ -15588,7 +15661,23 @@
             </a:endParaRPr>
           </a:p>
           <a:p>
-            <a:pPr marL="195120" indent="-188640">
+            <a:pPr>
+              <a:lnSpc>
+                <a:spcPct val="100000"/>
+              </a:lnSpc>
+              <a:spcBef>
+                <a:spcPts val="360"/>
+              </a:spcBef>
+            </a:pPr>
+            <a:endParaRPr lang="en-GB" sz="1800" b="0" strike="noStrike" spc="-1" dirty="0">
+              <a:solidFill>
+                <a:srgbClr val="000000"/>
+              </a:solidFill>
+              <a:latin typeface="Arial"/>
+            </a:endParaRPr>
+          </a:p>
+          <a:p>
+            <a:pPr marL="195120" indent="-188640" algn="ctr">
               <a:lnSpc>
                 <a:spcPct val="100000"/>
               </a:lnSpc>
@@ -15603,15 +15692,6 @@
               <a:buChar char=""/>
             </a:pPr>
             <a:r>
-              <a:rPr lang="en-US" spc="-1" dirty="0">
-                <a:solidFill>
-                  <a:srgbClr val="000000"/>
-                </a:solidFill>
-                <a:latin typeface="DejaVu Sans"/>
-              </a:rPr>
-              <a:t>17.05.2023 </a:t>
-            </a:r>
-            <a:r>
               <a:rPr lang="en-US" sz="1800" b="0" strike="noStrike" spc="-1" dirty="0">
                 <a:solidFill>
                   <a:srgbClr val="000000"/>
@@ -15619,16 +15699,19 @@
                 <a:latin typeface="DejaVu Sans"/>
                 <a:ea typeface="DejaVu Sans"/>
               </a:rPr>
-              <a:t>→ </a:t>
-            </a:r>
-            <a:r>
-              <a:rPr lang="en-US" spc="-1" dirty="0">
-                <a:solidFill>
-                  <a:srgbClr val="000000"/>
-                </a:solidFill>
-                <a:latin typeface="DejaVu Sans"/>
-              </a:rPr>
-              <a:t>Limits to Growth and Planetary Boundaries (</a:t>
+              <a:t>Questions? Write us an email: </a:t>
+            </a:r>
+            <a:r>
+              <a:rPr lang="en-US" sz="1800" b="0" u="sng" strike="noStrike" spc="-1" dirty="0">
+                <a:solidFill>
+                  <a:srgbClr val="0000FF"/>
+                </a:solidFill>
+                <a:uFillTx/>
+                <a:latin typeface="DejaVu Sans"/>
+                <a:ea typeface="DejaVu Sans"/>
+                <a:hlinkClick r:id="rId6"/>
+              </a:rPr>
+              <a:t>etce-ltg@tu-clausthal.de</a:t>
             </a:r>
             <a:r>
               <a:rPr lang="en-US" sz="1800" b="0" strike="noStrike" spc="-1" dirty="0">
@@ -15638,475 +15721,44 @@
                 <a:latin typeface="DejaVu Sans"/>
                 <a:ea typeface="DejaVu Sans"/>
               </a:rPr>
-              <a:t>L05)</a:t>
+              <a:t> ← </a:t>
+            </a:r>
+            <a:r>
+              <a:rPr lang="en-US" sz="1800" b="1" strike="noStrike" spc="-1" dirty="0">
+                <a:solidFill>
+                  <a:srgbClr val="000000"/>
+                </a:solidFill>
+                <a:latin typeface="DejaVu Sans"/>
+                <a:ea typeface="DejaVu Sans"/>
+              </a:rPr>
+              <a:t>We will </a:t>
+            </a:r>
+            <a:r>
+              <a:rPr lang="en-US" sz="1800" b="1" u="sng" strike="noStrike" spc="-1" dirty="0">
+                <a:solidFill>
+                  <a:srgbClr val="C9211E"/>
+                </a:solidFill>
+                <a:uFillTx/>
+                <a:latin typeface="DejaVu Sans"/>
+                <a:ea typeface="DejaVu Sans"/>
+              </a:rPr>
+              <a:t>only</a:t>
+            </a:r>
+            <a:r>
+              <a:rPr lang="en-US" sz="1800" b="1" strike="noStrike" spc="-1" dirty="0">
+                <a:solidFill>
+                  <a:srgbClr val="000000"/>
+                </a:solidFill>
+                <a:latin typeface="DejaVu Sans"/>
+                <a:ea typeface="DejaVu Sans"/>
+              </a:rPr>
+              <a:t> respond to emails written to this specific email address!</a:t>
             </a:r>
             <a:endParaRPr lang="en-GB" sz="1800" b="0" strike="noStrike" spc="-1" dirty="0">
               <a:solidFill>
                 <a:srgbClr val="000000"/>
               </a:solidFill>
               <a:latin typeface="Arial"/>
-            </a:endParaRPr>
-          </a:p>
-          <a:p>
-            <a:pPr marL="195120" indent="-188640">
-              <a:lnSpc>
-                <a:spcPct val="100000"/>
-              </a:lnSpc>
-              <a:spcBef>
-                <a:spcPts val="360"/>
-              </a:spcBef>
-              <a:buClr>
-                <a:srgbClr val="008C4F"/>
-              </a:buClr>
-              <a:buSzPct val="80000"/>
-              <a:buFont typeface="Wingdings" charset="2"/>
-              <a:buChar char=""/>
-            </a:pPr>
-            <a:r>
-              <a:rPr lang="en-US" spc="-1" dirty="0">
-                <a:solidFill>
-                  <a:srgbClr val="000000"/>
-                </a:solidFill>
-                <a:latin typeface="DejaVu Sans"/>
-              </a:rPr>
-              <a:t>24.05.2023 </a:t>
-            </a:r>
-            <a:r>
-              <a:rPr lang="en-US" sz="1800" b="0" strike="noStrike" spc="-1" dirty="0">
-                <a:solidFill>
-                  <a:srgbClr val="000000"/>
-                </a:solidFill>
-                <a:latin typeface="DejaVu Sans"/>
-                <a:ea typeface="DejaVu Sans"/>
-              </a:rPr>
-              <a:t>→ </a:t>
-            </a:r>
-            <a:r>
-              <a:rPr lang="en-US" spc="-1" dirty="0">
-                <a:solidFill>
-                  <a:srgbClr val="000000"/>
-                </a:solidFill>
-                <a:latin typeface="DejaVu Sans"/>
-              </a:rPr>
-              <a:t>From Cradle to the Grave: (Over-) Consumption, Environmental Impacts 		 and the Life Cycle of Products </a:t>
-            </a:r>
-            <a:r>
-              <a:rPr lang="en-US" sz="1800" b="0" strike="noStrike" spc="-1" dirty="0">
-                <a:solidFill>
-                  <a:srgbClr val="000000"/>
-                </a:solidFill>
-                <a:latin typeface="DejaVu Sans"/>
-                <a:ea typeface="DejaVu Sans"/>
-              </a:rPr>
-              <a:t>(L06)</a:t>
-            </a:r>
-            <a:endParaRPr lang="en-GB" sz="1800" b="0" strike="noStrike" spc="-1" dirty="0">
-              <a:solidFill>
-                <a:srgbClr val="000000"/>
-              </a:solidFill>
-              <a:latin typeface="Arial"/>
-            </a:endParaRPr>
-          </a:p>
-          <a:p>
-            <a:pPr marL="195120" indent="-188640">
-              <a:lnSpc>
-                <a:spcPct val="100000"/>
-              </a:lnSpc>
-              <a:spcBef>
-                <a:spcPts val="360"/>
-              </a:spcBef>
-              <a:buClr>
-                <a:srgbClr val="008C4F"/>
-              </a:buClr>
-              <a:buSzPct val="80000"/>
-              <a:buFont typeface="Wingdings" charset="2"/>
-              <a:buChar char=""/>
-            </a:pPr>
-            <a:r>
-              <a:rPr lang="en-US" spc="-1" dirty="0">
-                <a:solidFill>
-                  <a:srgbClr val="000000"/>
-                </a:solidFill>
-                <a:latin typeface="DejaVu Sans"/>
-              </a:rPr>
-              <a:t>31.05.2023 </a:t>
-            </a:r>
-            <a:r>
-              <a:rPr lang="en-US" sz="1800" b="0" strike="noStrike" spc="-1" dirty="0">
-                <a:solidFill>
-                  <a:srgbClr val="000000"/>
-                </a:solidFill>
-                <a:latin typeface="DejaVu Sans"/>
-                <a:ea typeface="DejaVu Sans"/>
-              </a:rPr>
-              <a:t>→ Circular Economy (L07)</a:t>
-            </a:r>
-            <a:endParaRPr lang="en-GB" sz="1800" b="0" strike="noStrike" spc="-1" dirty="0">
-              <a:solidFill>
-                <a:srgbClr val="000000"/>
-              </a:solidFill>
-              <a:latin typeface="Arial"/>
-            </a:endParaRPr>
-          </a:p>
-          <a:p>
-            <a:pPr marL="195120" indent="-188640">
-              <a:lnSpc>
-                <a:spcPct val="100000"/>
-              </a:lnSpc>
-              <a:spcBef>
-                <a:spcPts val="360"/>
-              </a:spcBef>
-              <a:buClr>
-                <a:srgbClr val="008C4F"/>
-              </a:buClr>
-              <a:buSzPct val="80000"/>
-              <a:buFont typeface="Wingdings" charset="2"/>
-              <a:buChar char=""/>
-            </a:pPr>
-            <a:r>
-              <a:rPr lang="en-US" spc="-1" dirty="0">
-                <a:solidFill>
-                  <a:srgbClr val="000000"/>
-                </a:solidFill>
-                <a:latin typeface="DejaVu Sans"/>
-              </a:rPr>
-              <a:t>07.06.2023 </a:t>
-            </a:r>
-            <a:r>
-              <a:rPr lang="en-US" sz="1800" b="0" strike="noStrike" spc="-1" dirty="0">
-                <a:solidFill>
-                  <a:srgbClr val="000000"/>
-                </a:solidFill>
-                <a:latin typeface="DejaVu Sans"/>
-                <a:ea typeface="DejaVu Sans"/>
-              </a:rPr>
-              <a:t>→ </a:t>
-            </a:r>
-            <a:r>
-              <a:rPr lang="en-US" spc="-1" dirty="0">
-                <a:solidFill>
-                  <a:srgbClr val="000000"/>
-                </a:solidFill>
-                <a:latin typeface="DejaVu Sans"/>
-              </a:rPr>
-              <a:t>Beyond the Circular Economy (</a:t>
-            </a:r>
-            <a:r>
-              <a:rPr lang="en-US" sz="1800" b="0" strike="noStrike" spc="-1" dirty="0">
-                <a:solidFill>
-                  <a:srgbClr val="000000"/>
-                </a:solidFill>
-                <a:latin typeface="DejaVu Sans"/>
-                <a:ea typeface="DejaVu Sans"/>
-              </a:rPr>
-              <a:t>L08)</a:t>
-            </a:r>
-            <a:endParaRPr lang="en-GB" sz="1800" b="0" strike="noStrike" spc="-1" dirty="0">
-              <a:solidFill>
-                <a:srgbClr val="000000"/>
-              </a:solidFill>
-              <a:latin typeface="Arial"/>
-            </a:endParaRPr>
-          </a:p>
-          <a:p>
-            <a:pPr marL="195120" indent="-188640">
-              <a:lnSpc>
-                <a:spcPct val="100000"/>
-              </a:lnSpc>
-              <a:spcBef>
-                <a:spcPts val="360"/>
-              </a:spcBef>
-              <a:buClr>
-                <a:srgbClr val="008C4F"/>
-              </a:buClr>
-              <a:buSzPct val="80000"/>
-              <a:buFont typeface="Wingdings" charset="2"/>
-              <a:buChar char=""/>
-            </a:pPr>
-            <a:r>
-              <a:rPr lang="en-US" spc="-1" dirty="0">
-                <a:solidFill>
-                  <a:srgbClr val="000000"/>
-                </a:solidFill>
-                <a:latin typeface="DejaVu Sans"/>
-              </a:rPr>
-              <a:t>14.06.2023 </a:t>
-            </a:r>
-            <a:r>
-              <a:rPr lang="en-US" sz="1800" b="0" strike="noStrike" spc="-1" dirty="0">
-                <a:solidFill>
-                  <a:srgbClr val="000000"/>
-                </a:solidFill>
-                <a:latin typeface="DejaVu Sans"/>
-                <a:ea typeface="DejaVu Sans"/>
-              </a:rPr>
-              <a:t>→ Towards a Circular Society (L09)</a:t>
-            </a:r>
-            <a:endParaRPr lang="en-GB" sz="1800" b="0" strike="noStrike" spc="-1" dirty="0">
-              <a:solidFill>
-                <a:srgbClr val="000000"/>
-              </a:solidFill>
-              <a:latin typeface="Arial"/>
-            </a:endParaRPr>
-          </a:p>
-          <a:p>
-            <a:pPr marL="195120" indent="-188640">
-              <a:lnSpc>
-                <a:spcPct val="100000"/>
-              </a:lnSpc>
-              <a:spcBef>
-                <a:spcPts val="360"/>
-              </a:spcBef>
-              <a:buClr>
-                <a:srgbClr val="008C4F"/>
-              </a:buClr>
-              <a:buSzPct val="80000"/>
-              <a:buFont typeface="Wingdings" charset="2"/>
-              <a:buChar char=""/>
-            </a:pPr>
-            <a:r>
-              <a:rPr lang="en-US" spc="-1" dirty="0">
-                <a:solidFill>
-                  <a:srgbClr val="000000"/>
-                </a:solidFill>
-                <a:latin typeface="DejaVu Sans"/>
-              </a:rPr>
-              <a:t>21.06.2023 </a:t>
-            </a:r>
-            <a:r>
-              <a:rPr lang="en-US" sz="1800" b="0" strike="noStrike" spc="-1" dirty="0">
-                <a:solidFill>
-                  <a:srgbClr val="000000"/>
-                </a:solidFill>
-                <a:latin typeface="DejaVu Sans"/>
-                <a:ea typeface="DejaVu Sans"/>
-              </a:rPr>
-              <a:t>→ </a:t>
-            </a:r>
-            <a:r>
-              <a:rPr lang="en-US" spc="-1" dirty="0">
-                <a:solidFill>
-                  <a:srgbClr val="000000"/>
-                </a:solidFill>
-                <a:latin typeface="DejaVu Sans"/>
-              </a:rPr>
-              <a:t>Technologies And What They Can (Not) Do (</a:t>
-            </a:r>
-            <a:r>
-              <a:rPr lang="en-US" sz="1800" b="0" strike="noStrike" spc="-1" dirty="0">
-                <a:solidFill>
-                  <a:srgbClr val="000000"/>
-                </a:solidFill>
-                <a:latin typeface="DejaVu Sans"/>
-                <a:ea typeface="DejaVu Sans"/>
-              </a:rPr>
-              <a:t>L10)</a:t>
-            </a:r>
-            <a:endParaRPr lang="en-GB" sz="1800" b="0" strike="noStrike" spc="-1" dirty="0">
-              <a:solidFill>
-                <a:srgbClr val="000000"/>
-              </a:solidFill>
-              <a:latin typeface="Arial"/>
-            </a:endParaRPr>
-          </a:p>
-          <a:p>
-            <a:pPr marL="195120" indent="-188640">
-              <a:lnSpc>
-                <a:spcPct val="100000"/>
-              </a:lnSpc>
-              <a:spcBef>
-                <a:spcPts val="360"/>
-              </a:spcBef>
-              <a:buClr>
-                <a:srgbClr val="008C4F"/>
-              </a:buClr>
-              <a:buSzPct val="80000"/>
-              <a:buFont typeface="Wingdings" charset="2"/>
-              <a:buChar char=""/>
-            </a:pPr>
-            <a:r>
-              <a:rPr lang="en-US" spc="-1" dirty="0">
-                <a:solidFill>
-                  <a:srgbClr val="000000"/>
-                </a:solidFill>
-                <a:latin typeface="DejaVu Sans"/>
-              </a:rPr>
-              <a:t>28.06.2023 </a:t>
-            </a:r>
-            <a:r>
-              <a:rPr lang="en-US" sz="1800" b="0" strike="noStrike" spc="-1" dirty="0">
-                <a:solidFill>
-                  <a:srgbClr val="000000"/>
-                </a:solidFill>
-                <a:latin typeface="DejaVu Sans"/>
-                <a:ea typeface="DejaVu Sans"/>
-              </a:rPr>
-              <a:t>→ </a:t>
-            </a:r>
-            <a:r>
-              <a:rPr lang="en-US" spc="-1" dirty="0">
-                <a:solidFill>
-                  <a:srgbClr val="000000"/>
-                </a:solidFill>
-                <a:latin typeface="DejaVu Sans"/>
-              </a:rPr>
-              <a:t>Critical Thinking and Sustainable Everyday Practices (</a:t>
-            </a:r>
-            <a:r>
-              <a:rPr lang="en-US" sz="1800" b="0" strike="noStrike" spc="-1" dirty="0">
-                <a:solidFill>
-                  <a:srgbClr val="000000"/>
-                </a:solidFill>
-                <a:latin typeface="DejaVu Sans"/>
-                <a:ea typeface="DejaVu Sans"/>
-              </a:rPr>
-              <a:t>L11)</a:t>
-            </a:r>
-            <a:endParaRPr lang="en-GB" sz="1800" b="0" strike="noStrike" spc="-1" dirty="0">
-              <a:solidFill>
-                <a:srgbClr val="000000"/>
-              </a:solidFill>
-              <a:latin typeface="Arial"/>
-            </a:endParaRPr>
-          </a:p>
-          <a:p>
-            <a:pPr marL="195120" indent="-188640">
-              <a:lnSpc>
-                <a:spcPct val="100000"/>
-              </a:lnSpc>
-              <a:spcBef>
-                <a:spcPts val="360"/>
-              </a:spcBef>
-              <a:buClr>
-                <a:srgbClr val="008C4F"/>
-              </a:buClr>
-              <a:buSzPct val="80000"/>
-              <a:buFont typeface="Wingdings" charset="2"/>
-              <a:buChar char=""/>
-            </a:pPr>
-            <a:r>
-              <a:rPr lang="en-US" spc="-1" dirty="0">
-                <a:solidFill>
-                  <a:srgbClr val="000000"/>
-                </a:solidFill>
-                <a:latin typeface="DejaVu Sans"/>
-              </a:rPr>
-              <a:t>05.07.2023 </a:t>
-            </a:r>
-            <a:r>
-              <a:rPr lang="en-US" sz="1800" b="0" strike="noStrike" spc="-1" dirty="0">
-                <a:solidFill>
-                  <a:srgbClr val="000000"/>
-                </a:solidFill>
-                <a:latin typeface="DejaVu Sans"/>
-                <a:ea typeface="DejaVu Sans"/>
-              </a:rPr>
-              <a:t>→ </a:t>
-            </a:r>
-            <a:r>
-              <a:rPr lang="en-US" spc="-1" dirty="0">
-                <a:solidFill>
-                  <a:srgbClr val="000000"/>
-                </a:solidFill>
-                <a:latin typeface="DejaVu Sans"/>
-              </a:rPr>
-              <a:t>Invited Lecture (</a:t>
-            </a:r>
-            <a:r>
-              <a:rPr lang="en-US" sz="1800" b="0" strike="noStrike" spc="-1" dirty="0">
-                <a:solidFill>
-                  <a:srgbClr val="000000"/>
-                </a:solidFill>
-                <a:latin typeface="DejaVu Sans"/>
-                <a:ea typeface="DejaVu Sans"/>
-              </a:rPr>
-              <a:t>L11)</a:t>
-            </a:r>
-            <a:endParaRPr lang="en-GB" sz="1800" b="0" strike="noStrike" spc="-1" dirty="0">
-              <a:solidFill>
-                <a:srgbClr val="000000"/>
-              </a:solidFill>
-              <a:latin typeface="Arial"/>
-            </a:endParaRPr>
-          </a:p>
-          <a:p>
-            <a:pPr marL="195120" indent="-188640">
-              <a:lnSpc>
-                <a:spcPct val="100000"/>
-              </a:lnSpc>
-              <a:spcBef>
-                <a:spcPts val="360"/>
-              </a:spcBef>
-              <a:buClr>
-                <a:srgbClr val="008C4F"/>
-              </a:buClr>
-              <a:buSzPct val="80000"/>
-              <a:buFont typeface="Wingdings" charset="2"/>
-              <a:buChar char=""/>
-            </a:pPr>
-            <a:r>
-              <a:rPr lang="en-US" spc="-1" dirty="0">
-                <a:solidFill>
-                  <a:srgbClr val="000000"/>
-                </a:solidFill>
-                <a:latin typeface="DejaVu Sans"/>
-              </a:rPr>
-              <a:t>12.07.2023 </a:t>
-            </a:r>
-            <a:r>
-              <a:rPr lang="en-US" sz="1800" b="0" strike="noStrike" spc="-1" dirty="0">
-                <a:solidFill>
-                  <a:srgbClr val="000000"/>
-                </a:solidFill>
-                <a:latin typeface="DejaVu Sans"/>
-                <a:ea typeface="DejaVu Sans"/>
-              </a:rPr>
-              <a:t>→ Invited Lecture (L12)</a:t>
-            </a:r>
-          </a:p>
-          <a:p>
-            <a:pPr marL="195120" indent="-188640">
-              <a:spcBef>
-                <a:spcPts val="360"/>
-              </a:spcBef>
-              <a:buClr>
-                <a:srgbClr val="008C4F"/>
-              </a:buClr>
-              <a:buSzPct val="80000"/>
-              <a:buFont typeface="Wingdings" charset="2"/>
-              <a:buChar char=""/>
-            </a:pPr>
-            <a:r>
-              <a:rPr lang="en-US" spc="-1" dirty="0">
-                <a:solidFill>
-                  <a:srgbClr val="000000"/>
-                </a:solidFill>
-                <a:latin typeface="DejaVu Sans"/>
-              </a:rPr>
-              <a:t>19.07.2023 → Now What? (L13)</a:t>
-            </a:r>
-          </a:p>
-          <a:p>
-            <a:pPr marL="195120" indent="-188640">
-              <a:lnSpc>
-                <a:spcPct val="100000"/>
-              </a:lnSpc>
-              <a:spcBef>
-                <a:spcPts val="360"/>
-              </a:spcBef>
-              <a:buClr>
-                <a:srgbClr val="008C4F"/>
-              </a:buClr>
-              <a:buSzPct val="80000"/>
-              <a:buFont typeface="Wingdings" charset="2"/>
-              <a:buChar char=""/>
-            </a:pPr>
-            <a:endParaRPr lang="en-US" sz="1800" b="0" strike="noStrike" spc="-1" dirty="0">
-              <a:solidFill>
-                <a:srgbClr val="000000"/>
-              </a:solidFill>
-              <a:latin typeface="DejaVu Sans"/>
-              <a:ea typeface="DejaVu Sans"/>
             </a:endParaRPr>
           </a:p>
         </p:txBody>

</xml_diff>